<commit_message>
officeaddins m2 - fy19q3 quarterly refresh
- added copyright to edited files
- updated slides & code samples to work against all current deps
</commit_message>
<xml_diff>
--- a/OfficeAddin/02 Building Add-ins for Microsoft Excel/01 Tables and Charts in Excel Add-ins.pptx
+++ b/OfficeAddin/02 Building Add-ins for Microsoft Excel/01 Tables and Charts in Excel Add-ins.pptx
@@ -281,7 +281,7 @@
               <a:rPr lang="en-US" smtClean="0">
                 <a:latin typeface="Segoe UI" pitchFamily="34" charset="0"/>
               </a:rPr>
-              <a:t>9/17/18 3:39 PM</a:t>
+              <a:t>3/4/19 8:29 PM</a:t>
             </a:fld>
             <a:endParaRPr lang="en-US" dirty="0">
               <a:latin typeface="Segoe UI" pitchFamily="34" charset="0"/>
@@ -575,7 +575,7 @@
           <a:p>
             <a:fld id="{D18B56EA-E28F-4F92-9F16-7A6F2501B303}" type="datetime8">
               <a:rPr lang="en-US" smtClean="0"/>
-              <a:t>9/17/18 3:39 PM</a:t>
+              <a:t>3/4/19 8:29 PM</a:t>
             </a:fld>
             <a:endParaRPr lang="en-US" dirty="0"/>
           </a:p>
@@ -1063,7 +1063,7 @@
                 <a:tabLst/>
                 <a:defRPr/>
               </a:pPr>
-              <a:t>9/17/18 3:39 PM</a:t>
+              <a:t>3/4/19 8:29 PM</a:t>
             </a:fld>
             <a:endParaRPr kumimoji="0" lang="en-US" sz="1200" b="0" i="0" u="none" strike="noStrike" kern="1200" cap="none" spc="0" normalizeH="0" baseline="0" noProof="0" dirty="0">
               <a:ln>
@@ -1319,7 +1319,7 @@
           <a:p>
             <a:fld id="{D18B56EA-E28F-4F92-9F16-7A6F2501B303}" type="datetime8">
               <a:rPr lang="en-US" smtClean="0"/>
-              <a:t>9/17/18 3:39 PM</a:t>
+              <a:t>3/4/19 8:29 PM</a:t>
             </a:fld>
             <a:endParaRPr lang="en-US" dirty="0"/>
           </a:p>
@@ -1509,7 +1509,7 @@
           <a:p>
             <a:fld id="{D18B56EA-E28F-4F92-9F16-7A6F2501B303}" type="datetime8">
               <a:rPr lang="en-US" smtClean="0"/>
-              <a:t>9/17/18 3:39 PM</a:t>
+              <a:t>3/4/19 8:29 PM</a:t>
             </a:fld>
             <a:endParaRPr lang="en-US" dirty="0"/>
           </a:p>
@@ -1948,7 +1948,7 @@
                 <a:tabLst/>
                 <a:defRPr/>
               </a:pPr>
-              <a:t>9/17/18 3:39 PM</a:t>
+              <a:t>3/4/19 8:29 PM</a:t>
             </a:fld>
             <a:endParaRPr kumimoji="0" lang="en-US" sz="1200" b="0" i="0" u="none" strike="noStrike" kern="1200" cap="none" spc="0" normalizeH="0" baseline="0" noProof="0" dirty="0">
               <a:ln>
@@ -2204,7 +2204,7 @@
           <a:p>
             <a:fld id="{D18B56EA-E28F-4F92-9F16-7A6F2501B303}" type="datetime8">
               <a:rPr lang="en-US" smtClean="0"/>
-              <a:t>9/17/18 3:39 PM</a:t>
+              <a:t>3/4/19 8:29 PM</a:t>
             </a:fld>
             <a:endParaRPr lang="en-US" dirty="0"/>
           </a:p>
@@ -2396,7 +2396,7 @@
           <a:p>
             <a:fld id="{D18B56EA-E28F-4F92-9F16-7A6F2501B303}" type="datetime8">
               <a:rPr lang="en-US" smtClean="0"/>
-              <a:t>9/17/18 3:39 PM</a:t>
+              <a:t>3/4/19 8:29 PM</a:t>
             </a:fld>
             <a:endParaRPr lang="en-US" dirty="0"/>
           </a:p>
@@ -2580,7 +2580,7 @@
           <a:p>
             <a:fld id="{D18B56EA-E28F-4F92-9F16-7A6F2501B303}" type="datetime8">
               <a:rPr lang="en-US" smtClean="0"/>
-              <a:t>9/17/18 3:39 PM</a:t>
+              <a:t>3/4/19 8:29 PM</a:t>
             </a:fld>
             <a:endParaRPr lang="en-US" dirty="0"/>
           </a:p>
@@ -2866,7 +2866,7 @@
           <a:p>
             <a:fld id="{D18B56EA-E28F-4F92-9F16-7A6F2501B303}" type="datetime8">
               <a:rPr lang="en-US" smtClean="0"/>
-              <a:t>9/17/18 3:39 PM</a:t>
+              <a:t>3/4/19 8:29 PM</a:t>
             </a:fld>
             <a:endParaRPr lang="en-US" dirty="0"/>
           </a:p>
@@ -3712,7 +3712,7 @@
           <a:p>
             <a:fld id="{D18B56EA-E28F-4F92-9F16-7A6F2501B303}" type="datetime8">
               <a:rPr lang="en-US" smtClean="0"/>
-              <a:t>9/17/18 3:39 PM</a:t>
+              <a:t>3/4/19 8:29 PM</a:t>
             </a:fld>
             <a:endParaRPr lang="en-US" dirty="0"/>
           </a:p>
@@ -3893,7 +3893,7 @@
           <a:p>
             <a:fld id="{D18B56EA-E28F-4F92-9F16-7A6F2501B303}" type="datetime8">
               <a:rPr lang="en-US" smtClean="0"/>
-              <a:t>9/17/18 3:39 PM</a:t>
+              <a:t>3/4/19 8:29 PM</a:t>
             </a:fld>
             <a:endParaRPr lang="en-US" dirty="0"/>
           </a:p>
@@ -4074,7 +4074,7 @@
           <a:p>
             <a:fld id="{D18B56EA-E28F-4F92-9F16-7A6F2501B303}" type="datetime8">
               <a:rPr lang="en-US" smtClean="0"/>
-              <a:t>9/17/18 3:39 PM</a:t>
+              <a:t>3/4/19 8:29 PM</a:t>
             </a:fld>
             <a:endParaRPr lang="en-US" dirty="0"/>
           </a:p>
@@ -4360,7 +4360,7 @@
                 <a:tabLst/>
                 <a:defRPr/>
               </a:pPr>
-              <a:t>9/17/18 3:39 PM</a:t>
+              <a:t>3/4/19 8:29 PM</a:t>
             </a:fld>
             <a:endParaRPr kumimoji="0" lang="en-US" sz="1200" b="0" i="0" u="none" strike="noStrike" kern="1200" cap="none" spc="0" normalizeH="0" baseline="0" noProof="0" dirty="0">
               <a:ln>
@@ -4613,7 +4613,7 @@
           <a:p>
             <a:fld id="{D18B56EA-E28F-4F92-9F16-7A6F2501B303}" type="datetime8">
               <a:rPr lang="en-US" smtClean="0"/>
-              <a:t>9/17/18 3:39 PM</a:t>
+              <a:t>3/4/19 8:29 PM</a:t>
             </a:fld>
             <a:endParaRPr lang="en-US" dirty="0"/>
           </a:p>
@@ -5058,7 +5058,7 @@
           <a:p>
             <a:fld id="{D18B56EA-E28F-4F92-9F16-7A6F2501B303}" type="datetime8">
               <a:rPr lang="en-US" smtClean="0"/>
-              <a:t>9/17/18 3:39 PM</a:t>
+              <a:t>3/4/19 8:29 PM</a:t>
             </a:fld>
             <a:endParaRPr lang="en-US" dirty="0"/>
           </a:p>
@@ -5674,7 +5674,7 @@
                 <a:tabLst/>
                 <a:defRPr/>
               </a:pPr>
-              <a:t>9/17/18 3:39 PM</a:t>
+              <a:t>3/4/19 8:29 PM</a:t>
             </a:fld>
             <a:endParaRPr kumimoji="0" lang="en-US" sz="1200" b="0" i="0" u="none" strike="noStrike" kern="1200" cap="none" spc="0" normalizeH="0" baseline="0" noProof="0" dirty="0">
               <a:ln>
@@ -6357,7 +6357,7 @@
                 <a:tabLst/>
                 <a:defRPr/>
               </a:pPr>
-              <a:t>9/17/18 3:39 PM</a:t>
+              <a:t>3/4/19 8:29 PM</a:t>
             </a:fld>
             <a:endParaRPr kumimoji="0" lang="en-US" sz="1200" b="0" i="0" u="none" strike="noStrike" kern="1200" cap="none" spc="0" normalizeH="0" baseline="0" noProof="0" dirty="0">
               <a:ln>
@@ -6695,7 +6695,7 @@
           <a:p>
             <a:fld id="{D18B56EA-E28F-4F92-9F16-7A6F2501B303}" type="datetime8">
               <a:rPr lang="en-US" smtClean="0"/>
-              <a:t>9/17/18 3:39 PM</a:t>
+              <a:t>3/4/19 8:29 PM</a:t>
             </a:fld>
             <a:endParaRPr lang="en-US" dirty="0"/>
           </a:p>
@@ -6911,7 +6911,7 @@
           <a:p>
             <a:fld id="{D18B56EA-E28F-4F92-9F16-7A6F2501B303}" type="datetime8">
               <a:rPr lang="en-US" smtClean="0"/>
-              <a:t>9/17/18 3:39 PM</a:t>
+              <a:t>3/4/19 8:29 PM</a:t>
             </a:fld>
             <a:endParaRPr lang="en-US" dirty="0"/>
           </a:p>
@@ -7498,7 +7498,7 @@
                 <a:tabLst/>
                 <a:defRPr/>
               </a:pPr>
-              <a:t>9/17/18 3:39 PM</a:t>
+              <a:t>3/4/19 8:29 PM</a:t>
             </a:fld>
             <a:endParaRPr kumimoji="0" lang="en-US" sz="1200" b="0" i="0" u="none" strike="noStrike" kern="1200" cap="none" spc="0" normalizeH="0" baseline="0" noProof="0" dirty="0">
               <a:ln>
@@ -31249,7 +31249,7 @@
         <p159:morph option="byObject"/>
       </p:transition>
     </mc:Choice>
-    <mc:Fallback xmlns:p14="http://schemas.microsoft.com/office/powerpoint/2010/main" xmlns:a14="http://schemas.microsoft.com/office/drawing/2010/main" xmlns="">
+    <mc:Fallback xmlns="" xmlns:a14="http://schemas.microsoft.com/office/drawing/2010/main" xmlns:p14="http://schemas.microsoft.com/office/powerpoint/2010/main">
       <p:transition spd="slow">
         <p:fade/>
       </p:transition>

</xml_diff>

<commit_message>
OfficeAddins - Module 2: FY2019Q3 Quarterly refresh (#575)
* officeaddins m2 - fy19q3 quarterly refresh

- added copyright to edited files
- updated slides & code samples to work against all current deps

* address reviewer feedback

- fixed copyright placement issues
</commit_message>
<xml_diff>
--- a/OfficeAddin/02 Building Add-ins for Microsoft Excel/01 Tables and Charts in Excel Add-ins.pptx
+++ b/OfficeAddin/02 Building Add-ins for Microsoft Excel/01 Tables and Charts in Excel Add-ins.pptx
@@ -281,7 +281,7 @@
               <a:rPr lang="en-US" smtClean="0">
                 <a:latin typeface="Segoe UI" pitchFamily="34" charset="0"/>
               </a:rPr>
-              <a:t>9/17/18 3:39 PM</a:t>
+              <a:t>3/4/19 8:29 PM</a:t>
             </a:fld>
             <a:endParaRPr lang="en-US" dirty="0">
               <a:latin typeface="Segoe UI" pitchFamily="34" charset="0"/>
@@ -575,7 +575,7 @@
           <a:p>
             <a:fld id="{D18B56EA-E28F-4F92-9F16-7A6F2501B303}" type="datetime8">
               <a:rPr lang="en-US" smtClean="0"/>
-              <a:t>9/17/18 3:39 PM</a:t>
+              <a:t>3/4/19 8:29 PM</a:t>
             </a:fld>
             <a:endParaRPr lang="en-US" dirty="0"/>
           </a:p>
@@ -1063,7 +1063,7 @@
                 <a:tabLst/>
                 <a:defRPr/>
               </a:pPr>
-              <a:t>9/17/18 3:39 PM</a:t>
+              <a:t>3/4/19 8:29 PM</a:t>
             </a:fld>
             <a:endParaRPr kumimoji="0" lang="en-US" sz="1200" b="0" i="0" u="none" strike="noStrike" kern="1200" cap="none" spc="0" normalizeH="0" baseline="0" noProof="0" dirty="0">
               <a:ln>
@@ -1319,7 +1319,7 @@
           <a:p>
             <a:fld id="{D18B56EA-E28F-4F92-9F16-7A6F2501B303}" type="datetime8">
               <a:rPr lang="en-US" smtClean="0"/>
-              <a:t>9/17/18 3:39 PM</a:t>
+              <a:t>3/4/19 8:29 PM</a:t>
             </a:fld>
             <a:endParaRPr lang="en-US" dirty="0"/>
           </a:p>
@@ -1509,7 +1509,7 @@
           <a:p>
             <a:fld id="{D18B56EA-E28F-4F92-9F16-7A6F2501B303}" type="datetime8">
               <a:rPr lang="en-US" smtClean="0"/>
-              <a:t>9/17/18 3:39 PM</a:t>
+              <a:t>3/4/19 8:29 PM</a:t>
             </a:fld>
             <a:endParaRPr lang="en-US" dirty="0"/>
           </a:p>
@@ -1948,7 +1948,7 @@
                 <a:tabLst/>
                 <a:defRPr/>
               </a:pPr>
-              <a:t>9/17/18 3:39 PM</a:t>
+              <a:t>3/4/19 8:29 PM</a:t>
             </a:fld>
             <a:endParaRPr kumimoji="0" lang="en-US" sz="1200" b="0" i="0" u="none" strike="noStrike" kern="1200" cap="none" spc="0" normalizeH="0" baseline="0" noProof="0" dirty="0">
               <a:ln>
@@ -2204,7 +2204,7 @@
           <a:p>
             <a:fld id="{D18B56EA-E28F-4F92-9F16-7A6F2501B303}" type="datetime8">
               <a:rPr lang="en-US" smtClean="0"/>
-              <a:t>9/17/18 3:39 PM</a:t>
+              <a:t>3/4/19 8:29 PM</a:t>
             </a:fld>
             <a:endParaRPr lang="en-US" dirty="0"/>
           </a:p>
@@ -2396,7 +2396,7 @@
           <a:p>
             <a:fld id="{D18B56EA-E28F-4F92-9F16-7A6F2501B303}" type="datetime8">
               <a:rPr lang="en-US" smtClean="0"/>
-              <a:t>9/17/18 3:39 PM</a:t>
+              <a:t>3/4/19 8:29 PM</a:t>
             </a:fld>
             <a:endParaRPr lang="en-US" dirty="0"/>
           </a:p>
@@ -2580,7 +2580,7 @@
           <a:p>
             <a:fld id="{D18B56EA-E28F-4F92-9F16-7A6F2501B303}" type="datetime8">
               <a:rPr lang="en-US" smtClean="0"/>
-              <a:t>9/17/18 3:39 PM</a:t>
+              <a:t>3/4/19 8:29 PM</a:t>
             </a:fld>
             <a:endParaRPr lang="en-US" dirty="0"/>
           </a:p>
@@ -2866,7 +2866,7 @@
           <a:p>
             <a:fld id="{D18B56EA-E28F-4F92-9F16-7A6F2501B303}" type="datetime8">
               <a:rPr lang="en-US" smtClean="0"/>
-              <a:t>9/17/18 3:39 PM</a:t>
+              <a:t>3/4/19 8:29 PM</a:t>
             </a:fld>
             <a:endParaRPr lang="en-US" dirty="0"/>
           </a:p>
@@ -3712,7 +3712,7 @@
           <a:p>
             <a:fld id="{D18B56EA-E28F-4F92-9F16-7A6F2501B303}" type="datetime8">
               <a:rPr lang="en-US" smtClean="0"/>
-              <a:t>9/17/18 3:39 PM</a:t>
+              <a:t>3/4/19 8:29 PM</a:t>
             </a:fld>
             <a:endParaRPr lang="en-US" dirty="0"/>
           </a:p>
@@ -3893,7 +3893,7 @@
           <a:p>
             <a:fld id="{D18B56EA-E28F-4F92-9F16-7A6F2501B303}" type="datetime8">
               <a:rPr lang="en-US" smtClean="0"/>
-              <a:t>9/17/18 3:39 PM</a:t>
+              <a:t>3/4/19 8:29 PM</a:t>
             </a:fld>
             <a:endParaRPr lang="en-US" dirty="0"/>
           </a:p>
@@ -4074,7 +4074,7 @@
           <a:p>
             <a:fld id="{D18B56EA-E28F-4F92-9F16-7A6F2501B303}" type="datetime8">
               <a:rPr lang="en-US" smtClean="0"/>
-              <a:t>9/17/18 3:39 PM</a:t>
+              <a:t>3/4/19 8:29 PM</a:t>
             </a:fld>
             <a:endParaRPr lang="en-US" dirty="0"/>
           </a:p>
@@ -4360,7 +4360,7 @@
                 <a:tabLst/>
                 <a:defRPr/>
               </a:pPr>
-              <a:t>9/17/18 3:39 PM</a:t>
+              <a:t>3/4/19 8:29 PM</a:t>
             </a:fld>
             <a:endParaRPr kumimoji="0" lang="en-US" sz="1200" b="0" i="0" u="none" strike="noStrike" kern="1200" cap="none" spc="0" normalizeH="0" baseline="0" noProof="0" dirty="0">
               <a:ln>
@@ -4613,7 +4613,7 @@
           <a:p>
             <a:fld id="{D18B56EA-E28F-4F92-9F16-7A6F2501B303}" type="datetime8">
               <a:rPr lang="en-US" smtClean="0"/>
-              <a:t>9/17/18 3:39 PM</a:t>
+              <a:t>3/4/19 8:29 PM</a:t>
             </a:fld>
             <a:endParaRPr lang="en-US" dirty="0"/>
           </a:p>
@@ -5058,7 +5058,7 @@
           <a:p>
             <a:fld id="{D18B56EA-E28F-4F92-9F16-7A6F2501B303}" type="datetime8">
               <a:rPr lang="en-US" smtClean="0"/>
-              <a:t>9/17/18 3:39 PM</a:t>
+              <a:t>3/4/19 8:29 PM</a:t>
             </a:fld>
             <a:endParaRPr lang="en-US" dirty="0"/>
           </a:p>
@@ -5674,7 +5674,7 @@
                 <a:tabLst/>
                 <a:defRPr/>
               </a:pPr>
-              <a:t>9/17/18 3:39 PM</a:t>
+              <a:t>3/4/19 8:29 PM</a:t>
             </a:fld>
             <a:endParaRPr kumimoji="0" lang="en-US" sz="1200" b="0" i="0" u="none" strike="noStrike" kern="1200" cap="none" spc="0" normalizeH="0" baseline="0" noProof="0" dirty="0">
               <a:ln>
@@ -6357,7 +6357,7 @@
                 <a:tabLst/>
                 <a:defRPr/>
               </a:pPr>
-              <a:t>9/17/18 3:39 PM</a:t>
+              <a:t>3/4/19 8:29 PM</a:t>
             </a:fld>
             <a:endParaRPr kumimoji="0" lang="en-US" sz="1200" b="0" i="0" u="none" strike="noStrike" kern="1200" cap="none" spc="0" normalizeH="0" baseline="0" noProof="0" dirty="0">
               <a:ln>
@@ -6695,7 +6695,7 @@
           <a:p>
             <a:fld id="{D18B56EA-E28F-4F92-9F16-7A6F2501B303}" type="datetime8">
               <a:rPr lang="en-US" smtClean="0"/>
-              <a:t>9/17/18 3:39 PM</a:t>
+              <a:t>3/4/19 8:29 PM</a:t>
             </a:fld>
             <a:endParaRPr lang="en-US" dirty="0"/>
           </a:p>
@@ -6911,7 +6911,7 @@
           <a:p>
             <a:fld id="{D18B56EA-E28F-4F92-9F16-7A6F2501B303}" type="datetime8">
               <a:rPr lang="en-US" smtClean="0"/>
-              <a:t>9/17/18 3:39 PM</a:t>
+              <a:t>3/4/19 8:29 PM</a:t>
             </a:fld>
             <a:endParaRPr lang="en-US" dirty="0"/>
           </a:p>
@@ -7498,7 +7498,7 @@
                 <a:tabLst/>
                 <a:defRPr/>
               </a:pPr>
-              <a:t>9/17/18 3:39 PM</a:t>
+              <a:t>3/4/19 8:29 PM</a:t>
             </a:fld>
             <a:endParaRPr kumimoji="0" lang="en-US" sz="1200" b="0" i="0" u="none" strike="noStrike" kern="1200" cap="none" spc="0" normalizeH="0" baseline="0" noProof="0" dirty="0">
               <a:ln>
@@ -31249,7 +31249,7 @@
         <p159:morph option="byObject"/>
       </p:transition>
     </mc:Choice>
-    <mc:Fallback xmlns:p14="http://schemas.microsoft.com/office/powerpoint/2010/main" xmlns:a14="http://schemas.microsoft.com/office/drawing/2010/main" xmlns="">
+    <mc:Fallback xmlns="" xmlns:a14="http://schemas.microsoft.com/office/drawing/2010/main" xmlns:p14="http://schemas.microsoft.com/office/powerpoint/2010/main">
       <p:transition spd="slow">
         <p:fade/>
       </p:transition>

</xml_diff>

<commit_message>
FY19Q4 content refresh (#590)
</commit_message>
<xml_diff>
--- a/OfficeAddin/02 Building Add-ins for Microsoft Excel/01 Tables and Charts in Excel Add-ins.pptx
+++ b/OfficeAddin/02 Building Add-ins for Microsoft Excel/01 Tables and Charts in Excel Add-ins.pptx
@@ -281,7 +281,7 @@
               <a:rPr lang="en-US" smtClean="0">
                 <a:latin typeface="Segoe UI" pitchFamily="34" charset="0"/>
               </a:rPr>
-              <a:t>3/4/19 8:29 PM</a:t>
+              <a:t>6/6/19 9:31 PM</a:t>
             </a:fld>
             <a:endParaRPr lang="en-US" dirty="0">
               <a:latin typeface="Segoe UI" pitchFamily="34" charset="0"/>
@@ -575,7 +575,7 @@
           <a:p>
             <a:fld id="{D18B56EA-E28F-4F92-9F16-7A6F2501B303}" type="datetime8">
               <a:rPr lang="en-US" smtClean="0"/>
-              <a:t>3/4/19 8:29 PM</a:t>
+              <a:t>6/6/19 9:31 PM</a:t>
             </a:fld>
             <a:endParaRPr lang="en-US" dirty="0"/>
           </a:p>
@@ -1063,7 +1063,7 @@
                 <a:tabLst/>
                 <a:defRPr/>
               </a:pPr>
-              <a:t>3/4/19 8:29 PM</a:t>
+              <a:t>6/6/19 9:31 PM</a:t>
             </a:fld>
             <a:endParaRPr kumimoji="0" lang="en-US" sz="1200" b="0" i="0" u="none" strike="noStrike" kern="1200" cap="none" spc="0" normalizeH="0" baseline="0" noProof="0" dirty="0">
               <a:ln>
@@ -1319,7 +1319,7 @@
           <a:p>
             <a:fld id="{D18B56EA-E28F-4F92-9F16-7A6F2501B303}" type="datetime8">
               <a:rPr lang="en-US" smtClean="0"/>
-              <a:t>3/4/19 8:29 PM</a:t>
+              <a:t>6/6/19 9:31 PM</a:t>
             </a:fld>
             <a:endParaRPr lang="en-US" dirty="0"/>
           </a:p>
@@ -1509,7 +1509,7 @@
           <a:p>
             <a:fld id="{D18B56EA-E28F-4F92-9F16-7A6F2501B303}" type="datetime8">
               <a:rPr lang="en-US" smtClean="0"/>
-              <a:t>3/4/19 8:29 PM</a:t>
+              <a:t>6/6/19 9:31 PM</a:t>
             </a:fld>
             <a:endParaRPr lang="en-US" dirty="0"/>
           </a:p>
@@ -1948,7 +1948,7 @@
                 <a:tabLst/>
                 <a:defRPr/>
               </a:pPr>
-              <a:t>3/4/19 8:29 PM</a:t>
+              <a:t>6/6/19 9:31 PM</a:t>
             </a:fld>
             <a:endParaRPr kumimoji="0" lang="en-US" sz="1200" b="0" i="0" u="none" strike="noStrike" kern="1200" cap="none" spc="0" normalizeH="0" baseline="0" noProof="0" dirty="0">
               <a:ln>
@@ -2204,7 +2204,7 @@
           <a:p>
             <a:fld id="{D18B56EA-E28F-4F92-9F16-7A6F2501B303}" type="datetime8">
               <a:rPr lang="en-US" smtClean="0"/>
-              <a:t>3/4/19 8:29 PM</a:t>
+              <a:t>6/6/19 9:31 PM</a:t>
             </a:fld>
             <a:endParaRPr lang="en-US" dirty="0"/>
           </a:p>
@@ -2396,7 +2396,7 @@
           <a:p>
             <a:fld id="{D18B56EA-E28F-4F92-9F16-7A6F2501B303}" type="datetime8">
               <a:rPr lang="en-US" smtClean="0"/>
-              <a:t>3/4/19 8:29 PM</a:t>
+              <a:t>6/6/19 9:31 PM</a:t>
             </a:fld>
             <a:endParaRPr lang="en-US" dirty="0"/>
           </a:p>
@@ -2580,7 +2580,7 @@
           <a:p>
             <a:fld id="{D18B56EA-E28F-4F92-9F16-7A6F2501B303}" type="datetime8">
               <a:rPr lang="en-US" smtClean="0"/>
-              <a:t>3/4/19 8:29 PM</a:t>
+              <a:t>6/6/19 9:31 PM</a:t>
             </a:fld>
             <a:endParaRPr lang="en-US" dirty="0"/>
           </a:p>
@@ -2866,7 +2866,7 @@
           <a:p>
             <a:fld id="{D18B56EA-E28F-4F92-9F16-7A6F2501B303}" type="datetime8">
               <a:rPr lang="en-US" smtClean="0"/>
-              <a:t>3/4/19 8:29 PM</a:t>
+              <a:t>6/6/19 9:31 PM</a:t>
             </a:fld>
             <a:endParaRPr lang="en-US" dirty="0"/>
           </a:p>
@@ -3712,7 +3712,7 @@
           <a:p>
             <a:fld id="{D18B56EA-E28F-4F92-9F16-7A6F2501B303}" type="datetime8">
               <a:rPr lang="en-US" smtClean="0"/>
-              <a:t>3/4/19 8:29 PM</a:t>
+              <a:t>6/6/19 9:31 PM</a:t>
             </a:fld>
             <a:endParaRPr lang="en-US" dirty="0"/>
           </a:p>
@@ -3893,7 +3893,7 @@
           <a:p>
             <a:fld id="{D18B56EA-E28F-4F92-9F16-7A6F2501B303}" type="datetime8">
               <a:rPr lang="en-US" smtClean="0"/>
-              <a:t>3/4/19 8:29 PM</a:t>
+              <a:t>6/6/19 9:31 PM</a:t>
             </a:fld>
             <a:endParaRPr lang="en-US" dirty="0"/>
           </a:p>
@@ -4074,7 +4074,7 @@
           <a:p>
             <a:fld id="{D18B56EA-E28F-4F92-9F16-7A6F2501B303}" type="datetime8">
               <a:rPr lang="en-US" smtClean="0"/>
-              <a:t>3/4/19 8:29 PM</a:t>
+              <a:t>6/6/19 9:31 PM</a:t>
             </a:fld>
             <a:endParaRPr lang="en-US" dirty="0"/>
           </a:p>
@@ -4360,7 +4360,7 @@
                 <a:tabLst/>
                 <a:defRPr/>
               </a:pPr>
-              <a:t>3/4/19 8:29 PM</a:t>
+              <a:t>6/6/19 9:31 PM</a:t>
             </a:fld>
             <a:endParaRPr kumimoji="0" lang="en-US" sz="1200" b="0" i="0" u="none" strike="noStrike" kern="1200" cap="none" spc="0" normalizeH="0" baseline="0" noProof="0" dirty="0">
               <a:ln>
@@ -4613,7 +4613,7 @@
           <a:p>
             <a:fld id="{D18B56EA-E28F-4F92-9F16-7A6F2501B303}" type="datetime8">
               <a:rPr lang="en-US" smtClean="0"/>
-              <a:t>3/4/19 8:29 PM</a:t>
+              <a:t>6/6/19 9:31 PM</a:t>
             </a:fld>
             <a:endParaRPr lang="en-US" dirty="0"/>
           </a:p>
@@ -5058,7 +5058,7 @@
           <a:p>
             <a:fld id="{D18B56EA-E28F-4F92-9F16-7A6F2501B303}" type="datetime8">
               <a:rPr lang="en-US" smtClean="0"/>
-              <a:t>3/4/19 8:29 PM</a:t>
+              <a:t>6/6/19 9:31 PM</a:t>
             </a:fld>
             <a:endParaRPr lang="en-US" dirty="0"/>
           </a:p>
@@ -5674,7 +5674,7 @@
                 <a:tabLst/>
                 <a:defRPr/>
               </a:pPr>
-              <a:t>3/4/19 8:29 PM</a:t>
+              <a:t>6/6/19 9:31 PM</a:t>
             </a:fld>
             <a:endParaRPr kumimoji="0" lang="en-US" sz="1200" b="0" i="0" u="none" strike="noStrike" kern="1200" cap="none" spc="0" normalizeH="0" baseline="0" noProof="0" dirty="0">
               <a:ln>
@@ -6357,7 +6357,7 @@
                 <a:tabLst/>
                 <a:defRPr/>
               </a:pPr>
-              <a:t>3/4/19 8:29 PM</a:t>
+              <a:t>6/6/19 9:31 PM</a:t>
             </a:fld>
             <a:endParaRPr kumimoji="0" lang="en-US" sz="1200" b="0" i="0" u="none" strike="noStrike" kern="1200" cap="none" spc="0" normalizeH="0" baseline="0" noProof="0" dirty="0">
               <a:ln>
@@ -6695,7 +6695,7 @@
           <a:p>
             <a:fld id="{D18B56EA-E28F-4F92-9F16-7A6F2501B303}" type="datetime8">
               <a:rPr lang="en-US" smtClean="0"/>
-              <a:t>3/4/19 8:29 PM</a:t>
+              <a:t>6/6/19 9:31 PM</a:t>
             </a:fld>
             <a:endParaRPr lang="en-US" dirty="0"/>
           </a:p>
@@ -6911,7 +6911,7 @@
           <a:p>
             <a:fld id="{D18B56EA-E28F-4F92-9F16-7A6F2501B303}" type="datetime8">
               <a:rPr lang="en-US" smtClean="0"/>
-              <a:t>3/4/19 8:29 PM</a:t>
+              <a:t>6/6/19 9:31 PM</a:t>
             </a:fld>
             <a:endParaRPr lang="en-US" dirty="0"/>
           </a:p>
@@ -7498,7 +7498,7 @@
                 <a:tabLst/>
                 <a:defRPr/>
               </a:pPr>
-              <a:t>3/4/19 8:29 PM</a:t>
+              <a:t>6/6/19 9:31 PM</a:t>
             </a:fld>
             <a:endParaRPr kumimoji="0" lang="en-US" sz="1200" b="0" i="0" u="none" strike="noStrike" kern="1200" cap="none" spc="0" normalizeH="0" baseline="0" noProof="0" dirty="0">
               <a:ln>
@@ -17866,7 +17866,7 @@
       </a:lvl9pPr>
     </p:otherStyle>
   </p:txStyles>
-  <p:extLst mod="1">
+  <p:extLst>
     <p:ext uri="{27BBF7A9-308A-43DC-89C8-2F10F3537804}">
       <p15:sldGuideLst xmlns:p15="http://schemas.microsoft.com/office/powerpoint/2012/main">
         <p15:guide id="3" pos="1381" userDrawn="1">
@@ -25084,8 +25084,17 @@
               <a:rPr lang="en-US" sz="1800" dirty="0">
                 <a:hlinkClick r:id="rId6"/>
               </a:rPr>
-              <a:t>https://dev.office.com/reference/add-ins/excel/table</a:t>
-            </a:r>
+              <a:t>https://dev.office.com/reference/add-ins/excel</a:t>
+            </a:r>
+            <a:r>
+              <a:rPr lang="en-US" sz="1800">
+                <a:hlinkClick r:id="rId6"/>
+              </a:rPr>
+              <a:t>/table</a:t>
+            </a:r>
+            <a:endParaRPr lang="en-US" sz="1800" dirty="0">
+              <a:hlinkClick r:id="rId6"/>
+            </a:endParaRPr>
           </a:p>
           <a:p>
             <a:pPr marL="342900" indent="-342900" defTabSz="914400">
@@ -25850,9 +25859,7 @@
       </p:sp>
       <p:sp>
         <p:nvSpPr>
-          <p:cNvPr id="159" name="Content Placeholder 6">
-            <a:extLst/>
-          </p:cNvPr>
+          <p:cNvPr id="159" name="Content Placeholder 6"/>
           <p:cNvSpPr txBox="1">
             <a:spLocks/>
           </p:cNvSpPr>
@@ -27557,7 +27564,6 @@
                 <a:headEnd/>
                 <a:tailEnd/>
               </a:ln>
-              <a:extLst/>
             </p:spPr>
             <p:txBody>
               <a:bodyPr vert="horz" wrap="square" lIns="91414" tIns="45706" rIns="91414" bIns="45706" numCol="1" anchor="t" anchorCtr="0" compatLnSpc="1">
@@ -30296,7 +30302,6 @@
               <a:headEnd/>
               <a:tailEnd/>
             </a:ln>
-            <a:extLst/>
           </p:spPr>
           <p:txBody>
             <a:bodyPr vert="horz" wrap="square" lIns="91414" tIns="45706" rIns="91414" bIns="45706" numCol="1" anchor="t" anchorCtr="0" compatLnSpc="1">
@@ -30618,9 +30623,7 @@
         </p:sp>
         <p:sp>
           <p:nvSpPr>
-            <p:cNvPr id="297" name="Rectangle 296">
-              <a:extLst/>
-            </p:cNvPr>
+            <p:cNvPr id="297" name="Rectangle 296"/>
             <p:cNvSpPr/>
             <p:nvPr/>
           </p:nvSpPr>
@@ -30699,9 +30702,7 @@
         </p:sp>
         <p:sp>
           <p:nvSpPr>
-            <p:cNvPr id="298" name="Rectangle 297">
-              <a:extLst/>
-            </p:cNvPr>
+            <p:cNvPr id="298" name="Rectangle 297"/>
             <p:cNvSpPr/>
             <p:nvPr/>
           </p:nvSpPr>

</xml_diff>

<commit_message>
FY2020Q1 OfficeAddins M2 content refresh
</commit_message>
<xml_diff>
--- a/OfficeAddin/02 Building Add-ins for Microsoft Excel/01 Tables and Charts in Excel Add-ins.pptx
+++ b/OfficeAddin/02 Building Add-ins for Microsoft Excel/01 Tables and Charts in Excel Add-ins.pptx
@@ -281,7 +281,7 @@
               <a:rPr lang="en-US" smtClean="0">
                 <a:latin typeface="Segoe UI" pitchFamily="34" charset="0"/>
               </a:rPr>
-              <a:t>6/6/19 9:31 PM</a:t>
+              <a:t>9/8/19 8:22 PM</a:t>
             </a:fld>
             <a:endParaRPr lang="en-US" dirty="0">
               <a:latin typeface="Segoe UI" pitchFamily="34" charset="0"/>
@@ -575,7 +575,7 @@
           <a:p>
             <a:fld id="{D18B56EA-E28F-4F92-9F16-7A6F2501B303}" type="datetime8">
               <a:rPr lang="en-US" smtClean="0"/>
-              <a:t>6/6/19 9:31 PM</a:t>
+              <a:t>9/8/19 8:21 PM</a:t>
             </a:fld>
             <a:endParaRPr lang="en-US" dirty="0"/>
           </a:p>
@@ -1063,7 +1063,7 @@
                 <a:tabLst/>
                 <a:defRPr/>
               </a:pPr>
-              <a:t>6/6/19 9:31 PM</a:t>
+              <a:t>9/8/19 8:21 PM</a:t>
             </a:fld>
             <a:endParaRPr kumimoji="0" lang="en-US" sz="1200" b="0" i="0" u="none" strike="noStrike" kern="1200" cap="none" spc="0" normalizeH="0" baseline="0" noProof="0" dirty="0">
               <a:ln>
@@ -1319,7 +1319,7 @@
           <a:p>
             <a:fld id="{D18B56EA-E28F-4F92-9F16-7A6F2501B303}" type="datetime8">
               <a:rPr lang="en-US" smtClean="0"/>
-              <a:t>6/6/19 9:31 PM</a:t>
+              <a:t>9/8/19 8:22 PM</a:t>
             </a:fld>
             <a:endParaRPr lang="en-US" dirty="0"/>
           </a:p>
@@ -1509,7 +1509,7 @@
           <a:p>
             <a:fld id="{D18B56EA-E28F-4F92-9F16-7A6F2501B303}" type="datetime8">
               <a:rPr lang="en-US" smtClean="0"/>
-              <a:t>6/6/19 9:31 PM</a:t>
+              <a:t>9/8/19 8:22 PM</a:t>
             </a:fld>
             <a:endParaRPr lang="en-US" dirty="0"/>
           </a:p>
@@ -1948,7 +1948,7 @@
                 <a:tabLst/>
                 <a:defRPr/>
               </a:pPr>
-              <a:t>6/6/19 9:31 PM</a:t>
+              <a:t>9/8/19 8:22 PM</a:t>
             </a:fld>
             <a:endParaRPr kumimoji="0" lang="en-US" sz="1200" b="0" i="0" u="none" strike="noStrike" kern="1200" cap="none" spc="0" normalizeH="0" baseline="0" noProof="0" dirty="0">
               <a:ln>
@@ -2204,7 +2204,7 @@
           <a:p>
             <a:fld id="{D18B56EA-E28F-4F92-9F16-7A6F2501B303}" type="datetime8">
               <a:rPr lang="en-US" smtClean="0"/>
-              <a:t>6/6/19 9:31 PM</a:t>
+              <a:t>9/8/19 8:22 PM</a:t>
             </a:fld>
             <a:endParaRPr lang="en-US" dirty="0"/>
           </a:p>
@@ -2396,7 +2396,7 @@
           <a:p>
             <a:fld id="{D18B56EA-E28F-4F92-9F16-7A6F2501B303}" type="datetime8">
               <a:rPr lang="en-US" smtClean="0"/>
-              <a:t>6/6/19 9:31 PM</a:t>
+              <a:t>9/8/19 8:22 PM</a:t>
             </a:fld>
             <a:endParaRPr lang="en-US" dirty="0"/>
           </a:p>
@@ -2580,7 +2580,7 @@
           <a:p>
             <a:fld id="{D18B56EA-E28F-4F92-9F16-7A6F2501B303}" type="datetime8">
               <a:rPr lang="en-US" smtClean="0"/>
-              <a:t>6/6/19 9:31 PM</a:t>
+              <a:t>9/8/19 8:22 PM</a:t>
             </a:fld>
             <a:endParaRPr lang="en-US" dirty="0"/>
           </a:p>
@@ -2866,7 +2866,7 @@
           <a:p>
             <a:fld id="{D18B56EA-E28F-4F92-9F16-7A6F2501B303}" type="datetime8">
               <a:rPr lang="en-US" smtClean="0"/>
-              <a:t>6/6/19 9:31 PM</a:t>
+              <a:t>9/8/19 8:22 PM</a:t>
             </a:fld>
             <a:endParaRPr lang="en-US" dirty="0"/>
           </a:p>
@@ -3712,7 +3712,7 @@
           <a:p>
             <a:fld id="{D18B56EA-E28F-4F92-9F16-7A6F2501B303}" type="datetime8">
               <a:rPr lang="en-US" smtClean="0"/>
-              <a:t>6/6/19 9:31 PM</a:t>
+              <a:t>9/8/19 8:22 PM</a:t>
             </a:fld>
             <a:endParaRPr lang="en-US" dirty="0"/>
           </a:p>
@@ -3893,7 +3893,7 @@
           <a:p>
             <a:fld id="{D18B56EA-E28F-4F92-9F16-7A6F2501B303}" type="datetime8">
               <a:rPr lang="en-US" smtClean="0"/>
-              <a:t>6/6/19 9:31 PM</a:t>
+              <a:t>9/8/19 8:27 PM</a:t>
             </a:fld>
             <a:endParaRPr lang="en-US" dirty="0"/>
           </a:p>
@@ -4074,7 +4074,7 @@
           <a:p>
             <a:fld id="{D18B56EA-E28F-4F92-9F16-7A6F2501B303}" type="datetime8">
               <a:rPr lang="en-US" smtClean="0"/>
-              <a:t>6/6/19 9:31 PM</a:t>
+              <a:t>9/8/19 8:22 PM</a:t>
             </a:fld>
             <a:endParaRPr lang="en-US" dirty="0"/>
           </a:p>
@@ -4360,7 +4360,7 @@
                 <a:tabLst/>
                 <a:defRPr/>
               </a:pPr>
-              <a:t>6/6/19 9:31 PM</a:t>
+              <a:t>9/8/19 8:21 PM</a:t>
             </a:fld>
             <a:endParaRPr kumimoji="0" lang="en-US" sz="1200" b="0" i="0" u="none" strike="noStrike" kern="1200" cap="none" spc="0" normalizeH="0" baseline="0" noProof="0" dirty="0">
               <a:ln>
@@ -4613,7 +4613,7 @@
           <a:p>
             <a:fld id="{D18B56EA-E28F-4F92-9F16-7A6F2501B303}" type="datetime8">
               <a:rPr lang="en-US" smtClean="0"/>
-              <a:t>6/6/19 9:31 PM</a:t>
+              <a:t>9/8/19 8:22 PM</a:t>
             </a:fld>
             <a:endParaRPr lang="en-US" dirty="0"/>
           </a:p>
@@ -5058,7 +5058,7 @@
           <a:p>
             <a:fld id="{D18B56EA-E28F-4F92-9F16-7A6F2501B303}" type="datetime8">
               <a:rPr lang="en-US" smtClean="0"/>
-              <a:t>6/6/19 9:31 PM</a:t>
+              <a:t>9/8/19 8:21 PM</a:t>
             </a:fld>
             <a:endParaRPr lang="en-US" dirty="0"/>
           </a:p>
@@ -5674,7 +5674,7 @@
                 <a:tabLst/>
                 <a:defRPr/>
               </a:pPr>
-              <a:t>6/6/19 9:31 PM</a:t>
+              <a:t>9/8/19 8:21 PM</a:t>
             </a:fld>
             <a:endParaRPr kumimoji="0" lang="en-US" sz="1200" b="0" i="0" u="none" strike="noStrike" kern="1200" cap="none" spc="0" normalizeH="0" baseline="0" noProof="0" dirty="0">
               <a:ln>
@@ -6357,7 +6357,7 @@
                 <a:tabLst/>
                 <a:defRPr/>
               </a:pPr>
-              <a:t>6/6/19 9:31 PM</a:t>
+              <a:t>9/8/19 8:22 PM</a:t>
             </a:fld>
             <a:endParaRPr kumimoji="0" lang="en-US" sz="1200" b="0" i="0" u="none" strike="noStrike" kern="1200" cap="none" spc="0" normalizeH="0" baseline="0" noProof="0" dirty="0">
               <a:ln>
@@ -6695,7 +6695,7 @@
           <a:p>
             <a:fld id="{D18B56EA-E28F-4F92-9F16-7A6F2501B303}" type="datetime8">
               <a:rPr lang="en-US" smtClean="0"/>
-              <a:t>6/6/19 9:31 PM</a:t>
+              <a:t>9/8/19 8:22 PM</a:t>
             </a:fld>
             <a:endParaRPr lang="en-US" dirty="0"/>
           </a:p>
@@ -6911,7 +6911,7 @@
           <a:p>
             <a:fld id="{D18B56EA-E28F-4F92-9F16-7A6F2501B303}" type="datetime8">
               <a:rPr lang="en-US" smtClean="0"/>
-              <a:t>6/6/19 9:31 PM</a:t>
+              <a:t>9/8/19 8:22 PM</a:t>
             </a:fld>
             <a:endParaRPr lang="en-US" dirty="0"/>
           </a:p>
@@ -7498,7 +7498,7 @@
                 <a:tabLst/>
                 <a:defRPr/>
               </a:pPr>
-              <a:t>6/6/19 9:31 PM</a:t>
+              <a:t>9/8/19 8:22 PM</a:t>
             </a:fld>
             <a:endParaRPr kumimoji="0" lang="en-US" sz="1200" b="0" i="0" u="none" strike="noStrike" kern="1200" cap="none" spc="0" normalizeH="0" baseline="0" noProof="0" dirty="0">
               <a:ln>
@@ -24853,7 +24853,7 @@
         <p:spPr>
           <a:xfrm>
             <a:off x="465138" y="1930734"/>
-            <a:ext cx="11533187" cy="4816703"/>
+            <a:ext cx="11533187" cy="4170372"/>
           </a:xfrm>
         </p:spPr>
         <p:txBody>
@@ -24962,7 +24962,7 @@
                 <a:latin typeface="+mj-lt"/>
                 <a:hlinkClick r:id="rId4"/>
               </a:rPr>
-              <a:t>https://dev.office.com/reference/add-ins/excel/excel-add-ins-reference-overview</a:t>
+              <a:t>https://docs.microsoft.com/en-us/javascript/api/excel?view=excel-js-preview</a:t>
             </a:r>
             <a:endParaRPr lang="en-US" sz="1800" dirty="0">
               <a:latin typeface="+mj-lt"/>
@@ -25082,18 +25082,13 @@
             </a:pPr>
             <a:r>
               <a:rPr lang="en-US" sz="1800" dirty="0">
+                <a:latin typeface="+mj-lt"/>
                 <a:hlinkClick r:id="rId6"/>
               </a:rPr>
-              <a:t>https://dev.office.com/reference/add-ins/excel</a:t>
-            </a:r>
-            <a:r>
-              <a:rPr lang="en-US" sz="1800">
-                <a:hlinkClick r:id="rId6"/>
-              </a:rPr>
-              <a:t>/table</a:t>
+              <a:t>https://docs.microsoft.com/en-us/javascript/api/excel/excel.table</a:t>
             </a:r>
             <a:endParaRPr lang="en-US" sz="1800" dirty="0">
-              <a:hlinkClick r:id="rId6"/>
+              <a:latin typeface="+mj-lt"/>
             </a:endParaRPr>
           </a:p>
           <a:p>
@@ -25108,35 +25103,21 @@
             </a:pPr>
             <a:r>
               <a:rPr lang="en-US" sz="1800" dirty="0">
-                <a:hlinkClick r:id="rId6"/>
-              </a:rPr>
-              <a:t>https://dev.office.com/reference/add-ins/excel/chart</a:t>
-            </a:r>
-            <a:endParaRPr lang="en-US" sz="1800" dirty="0"/>
-          </a:p>
-          <a:p>
-            <a:pPr marL="342900" indent="-342900" defTabSz="914400">
-              <a:lnSpc>
-                <a:spcPct val="100000"/>
-              </a:lnSpc>
-              <a:spcBef>
-                <a:spcPts val="600"/>
-              </a:spcBef>
-              <a:buSzTx/>
-            </a:pPr>
-            <a:endParaRPr lang="en-US" sz="1600" dirty="0"/>
-          </a:p>
-          <a:p>
-            <a:pPr marL="342900" indent="-342900" defTabSz="914400">
-              <a:lnSpc>
-                <a:spcPct val="100000"/>
-              </a:lnSpc>
-              <a:spcBef>
-                <a:spcPts val="600"/>
-              </a:spcBef>
-              <a:buSzTx/>
-            </a:pPr>
-            <a:endParaRPr lang="en-US" sz="1600" dirty="0"/>
+                <a:latin typeface="+mj-lt"/>
+                <a:hlinkClick r:id="rId7"/>
+              </a:rPr>
+              <a:t>https://docs.microsoft.com/en-us/javascript/api/excel/excel</a:t>
+            </a:r>
+            <a:r>
+              <a:rPr lang="en-US" sz="1800">
+                <a:latin typeface="+mj-lt"/>
+                <a:hlinkClick r:id="rId7"/>
+              </a:rPr>
+              <a:t>.chart</a:t>
+            </a:r>
+            <a:endParaRPr lang="en-US" sz="1800" dirty="0">
+              <a:latin typeface="+mj-lt"/>
+            </a:endParaRPr>
           </a:p>
         </p:txBody>
       </p:sp>
@@ -31250,7 +31231,7 @@
         <p159:morph option="byObject"/>
       </p:transition>
     </mc:Choice>
-    <mc:Fallback xmlns="" xmlns:a14="http://schemas.microsoft.com/office/drawing/2010/main" xmlns:p14="http://schemas.microsoft.com/office/powerpoint/2010/main">
+    <mc:Fallback xmlns:p14="http://schemas.microsoft.com/office/powerpoint/2010/main" xmlns:a14="http://schemas.microsoft.com/office/drawing/2010/main" xmlns="">
       <p:transition spd="slow">
         <p:fade/>
       </p:transition>

</xml_diff>

<commit_message>
FY2020Q1 OfficeAddins M2 content refresh (#619)
</commit_message>
<xml_diff>
--- a/OfficeAddin/02 Building Add-ins for Microsoft Excel/01 Tables and Charts in Excel Add-ins.pptx
+++ b/OfficeAddin/02 Building Add-ins for Microsoft Excel/01 Tables and Charts in Excel Add-ins.pptx
@@ -281,7 +281,7 @@
               <a:rPr lang="en-US" smtClean="0">
                 <a:latin typeface="Segoe UI" pitchFamily="34" charset="0"/>
               </a:rPr>
-              <a:t>6/6/19 9:31 PM</a:t>
+              <a:t>9/8/19 8:22 PM</a:t>
             </a:fld>
             <a:endParaRPr lang="en-US" dirty="0">
               <a:latin typeface="Segoe UI" pitchFamily="34" charset="0"/>
@@ -575,7 +575,7 @@
           <a:p>
             <a:fld id="{D18B56EA-E28F-4F92-9F16-7A6F2501B303}" type="datetime8">
               <a:rPr lang="en-US" smtClean="0"/>
-              <a:t>6/6/19 9:31 PM</a:t>
+              <a:t>9/8/19 8:21 PM</a:t>
             </a:fld>
             <a:endParaRPr lang="en-US" dirty="0"/>
           </a:p>
@@ -1063,7 +1063,7 @@
                 <a:tabLst/>
                 <a:defRPr/>
               </a:pPr>
-              <a:t>6/6/19 9:31 PM</a:t>
+              <a:t>9/8/19 8:21 PM</a:t>
             </a:fld>
             <a:endParaRPr kumimoji="0" lang="en-US" sz="1200" b="0" i="0" u="none" strike="noStrike" kern="1200" cap="none" spc="0" normalizeH="0" baseline="0" noProof="0" dirty="0">
               <a:ln>
@@ -1319,7 +1319,7 @@
           <a:p>
             <a:fld id="{D18B56EA-E28F-4F92-9F16-7A6F2501B303}" type="datetime8">
               <a:rPr lang="en-US" smtClean="0"/>
-              <a:t>6/6/19 9:31 PM</a:t>
+              <a:t>9/8/19 8:22 PM</a:t>
             </a:fld>
             <a:endParaRPr lang="en-US" dirty="0"/>
           </a:p>
@@ -1509,7 +1509,7 @@
           <a:p>
             <a:fld id="{D18B56EA-E28F-4F92-9F16-7A6F2501B303}" type="datetime8">
               <a:rPr lang="en-US" smtClean="0"/>
-              <a:t>6/6/19 9:31 PM</a:t>
+              <a:t>9/8/19 8:22 PM</a:t>
             </a:fld>
             <a:endParaRPr lang="en-US" dirty="0"/>
           </a:p>
@@ -1948,7 +1948,7 @@
                 <a:tabLst/>
                 <a:defRPr/>
               </a:pPr>
-              <a:t>6/6/19 9:31 PM</a:t>
+              <a:t>9/8/19 8:22 PM</a:t>
             </a:fld>
             <a:endParaRPr kumimoji="0" lang="en-US" sz="1200" b="0" i="0" u="none" strike="noStrike" kern="1200" cap="none" spc="0" normalizeH="0" baseline="0" noProof="0" dirty="0">
               <a:ln>
@@ -2204,7 +2204,7 @@
           <a:p>
             <a:fld id="{D18B56EA-E28F-4F92-9F16-7A6F2501B303}" type="datetime8">
               <a:rPr lang="en-US" smtClean="0"/>
-              <a:t>6/6/19 9:31 PM</a:t>
+              <a:t>9/8/19 8:22 PM</a:t>
             </a:fld>
             <a:endParaRPr lang="en-US" dirty="0"/>
           </a:p>
@@ -2396,7 +2396,7 @@
           <a:p>
             <a:fld id="{D18B56EA-E28F-4F92-9F16-7A6F2501B303}" type="datetime8">
               <a:rPr lang="en-US" smtClean="0"/>
-              <a:t>6/6/19 9:31 PM</a:t>
+              <a:t>9/8/19 8:22 PM</a:t>
             </a:fld>
             <a:endParaRPr lang="en-US" dirty="0"/>
           </a:p>
@@ -2580,7 +2580,7 @@
           <a:p>
             <a:fld id="{D18B56EA-E28F-4F92-9F16-7A6F2501B303}" type="datetime8">
               <a:rPr lang="en-US" smtClean="0"/>
-              <a:t>6/6/19 9:31 PM</a:t>
+              <a:t>9/8/19 8:22 PM</a:t>
             </a:fld>
             <a:endParaRPr lang="en-US" dirty="0"/>
           </a:p>
@@ -2866,7 +2866,7 @@
           <a:p>
             <a:fld id="{D18B56EA-E28F-4F92-9F16-7A6F2501B303}" type="datetime8">
               <a:rPr lang="en-US" smtClean="0"/>
-              <a:t>6/6/19 9:31 PM</a:t>
+              <a:t>9/8/19 8:22 PM</a:t>
             </a:fld>
             <a:endParaRPr lang="en-US" dirty="0"/>
           </a:p>
@@ -3712,7 +3712,7 @@
           <a:p>
             <a:fld id="{D18B56EA-E28F-4F92-9F16-7A6F2501B303}" type="datetime8">
               <a:rPr lang="en-US" smtClean="0"/>
-              <a:t>6/6/19 9:31 PM</a:t>
+              <a:t>9/8/19 8:22 PM</a:t>
             </a:fld>
             <a:endParaRPr lang="en-US" dirty="0"/>
           </a:p>
@@ -3893,7 +3893,7 @@
           <a:p>
             <a:fld id="{D18B56EA-E28F-4F92-9F16-7A6F2501B303}" type="datetime8">
               <a:rPr lang="en-US" smtClean="0"/>
-              <a:t>6/6/19 9:31 PM</a:t>
+              <a:t>9/8/19 8:27 PM</a:t>
             </a:fld>
             <a:endParaRPr lang="en-US" dirty="0"/>
           </a:p>
@@ -4074,7 +4074,7 @@
           <a:p>
             <a:fld id="{D18B56EA-E28F-4F92-9F16-7A6F2501B303}" type="datetime8">
               <a:rPr lang="en-US" smtClean="0"/>
-              <a:t>6/6/19 9:31 PM</a:t>
+              <a:t>9/8/19 8:22 PM</a:t>
             </a:fld>
             <a:endParaRPr lang="en-US" dirty="0"/>
           </a:p>
@@ -4360,7 +4360,7 @@
                 <a:tabLst/>
                 <a:defRPr/>
               </a:pPr>
-              <a:t>6/6/19 9:31 PM</a:t>
+              <a:t>9/8/19 8:21 PM</a:t>
             </a:fld>
             <a:endParaRPr kumimoji="0" lang="en-US" sz="1200" b="0" i="0" u="none" strike="noStrike" kern="1200" cap="none" spc="0" normalizeH="0" baseline="0" noProof="0" dirty="0">
               <a:ln>
@@ -4613,7 +4613,7 @@
           <a:p>
             <a:fld id="{D18B56EA-E28F-4F92-9F16-7A6F2501B303}" type="datetime8">
               <a:rPr lang="en-US" smtClean="0"/>
-              <a:t>6/6/19 9:31 PM</a:t>
+              <a:t>9/8/19 8:22 PM</a:t>
             </a:fld>
             <a:endParaRPr lang="en-US" dirty="0"/>
           </a:p>
@@ -5058,7 +5058,7 @@
           <a:p>
             <a:fld id="{D18B56EA-E28F-4F92-9F16-7A6F2501B303}" type="datetime8">
               <a:rPr lang="en-US" smtClean="0"/>
-              <a:t>6/6/19 9:31 PM</a:t>
+              <a:t>9/8/19 8:21 PM</a:t>
             </a:fld>
             <a:endParaRPr lang="en-US" dirty="0"/>
           </a:p>
@@ -5674,7 +5674,7 @@
                 <a:tabLst/>
                 <a:defRPr/>
               </a:pPr>
-              <a:t>6/6/19 9:31 PM</a:t>
+              <a:t>9/8/19 8:21 PM</a:t>
             </a:fld>
             <a:endParaRPr kumimoji="0" lang="en-US" sz="1200" b="0" i="0" u="none" strike="noStrike" kern="1200" cap="none" spc="0" normalizeH="0" baseline="0" noProof="0" dirty="0">
               <a:ln>
@@ -6357,7 +6357,7 @@
                 <a:tabLst/>
                 <a:defRPr/>
               </a:pPr>
-              <a:t>6/6/19 9:31 PM</a:t>
+              <a:t>9/8/19 8:22 PM</a:t>
             </a:fld>
             <a:endParaRPr kumimoji="0" lang="en-US" sz="1200" b="0" i="0" u="none" strike="noStrike" kern="1200" cap="none" spc="0" normalizeH="0" baseline="0" noProof="0" dirty="0">
               <a:ln>
@@ -6695,7 +6695,7 @@
           <a:p>
             <a:fld id="{D18B56EA-E28F-4F92-9F16-7A6F2501B303}" type="datetime8">
               <a:rPr lang="en-US" smtClean="0"/>
-              <a:t>6/6/19 9:31 PM</a:t>
+              <a:t>9/8/19 8:22 PM</a:t>
             </a:fld>
             <a:endParaRPr lang="en-US" dirty="0"/>
           </a:p>
@@ -6911,7 +6911,7 @@
           <a:p>
             <a:fld id="{D18B56EA-E28F-4F92-9F16-7A6F2501B303}" type="datetime8">
               <a:rPr lang="en-US" smtClean="0"/>
-              <a:t>6/6/19 9:31 PM</a:t>
+              <a:t>9/8/19 8:22 PM</a:t>
             </a:fld>
             <a:endParaRPr lang="en-US" dirty="0"/>
           </a:p>
@@ -7498,7 +7498,7 @@
                 <a:tabLst/>
                 <a:defRPr/>
               </a:pPr>
-              <a:t>6/6/19 9:31 PM</a:t>
+              <a:t>9/8/19 8:22 PM</a:t>
             </a:fld>
             <a:endParaRPr kumimoji="0" lang="en-US" sz="1200" b="0" i="0" u="none" strike="noStrike" kern="1200" cap="none" spc="0" normalizeH="0" baseline="0" noProof="0" dirty="0">
               <a:ln>
@@ -24853,7 +24853,7 @@
         <p:spPr>
           <a:xfrm>
             <a:off x="465138" y="1930734"/>
-            <a:ext cx="11533187" cy="4816703"/>
+            <a:ext cx="11533187" cy="4170372"/>
           </a:xfrm>
         </p:spPr>
         <p:txBody>
@@ -24962,7 +24962,7 @@
                 <a:latin typeface="+mj-lt"/>
                 <a:hlinkClick r:id="rId4"/>
               </a:rPr>
-              <a:t>https://dev.office.com/reference/add-ins/excel/excel-add-ins-reference-overview</a:t>
+              <a:t>https://docs.microsoft.com/en-us/javascript/api/excel?view=excel-js-preview</a:t>
             </a:r>
             <a:endParaRPr lang="en-US" sz="1800" dirty="0">
               <a:latin typeface="+mj-lt"/>
@@ -25082,18 +25082,13 @@
             </a:pPr>
             <a:r>
               <a:rPr lang="en-US" sz="1800" dirty="0">
+                <a:latin typeface="+mj-lt"/>
                 <a:hlinkClick r:id="rId6"/>
               </a:rPr>
-              <a:t>https://dev.office.com/reference/add-ins/excel</a:t>
-            </a:r>
-            <a:r>
-              <a:rPr lang="en-US" sz="1800">
-                <a:hlinkClick r:id="rId6"/>
-              </a:rPr>
-              <a:t>/table</a:t>
+              <a:t>https://docs.microsoft.com/en-us/javascript/api/excel/excel.table</a:t>
             </a:r>
             <a:endParaRPr lang="en-US" sz="1800" dirty="0">
-              <a:hlinkClick r:id="rId6"/>
+              <a:latin typeface="+mj-lt"/>
             </a:endParaRPr>
           </a:p>
           <a:p>
@@ -25108,35 +25103,21 @@
             </a:pPr>
             <a:r>
               <a:rPr lang="en-US" sz="1800" dirty="0">
-                <a:hlinkClick r:id="rId6"/>
-              </a:rPr>
-              <a:t>https://dev.office.com/reference/add-ins/excel/chart</a:t>
-            </a:r>
-            <a:endParaRPr lang="en-US" sz="1800" dirty="0"/>
-          </a:p>
-          <a:p>
-            <a:pPr marL="342900" indent="-342900" defTabSz="914400">
-              <a:lnSpc>
-                <a:spcPct val="100000"/>
-              </a:lnSpc>
-              <a:spcBef>
-                <a:spcPts val="600"/>
-              </a:spcBef>
-              <a:buSzTx/>
-            </a:pPr>
-            <a:endParaRPr lang="en-US" sz="1600" dirty="0"/>
-          </a:p>
-          <a:p>
-            <a:pPr marL="342900" indent="-342900" defTabSz="914400">
-              <a:lnSpc>
-                <a:spcPct val="100000"/>
-              </a:lnSpc>
-              <a:spcBef>
-                <a:spcPts val="600"/>
-              </a:spcBef>
-              <a:buSzTx/>
-            </a:pPr>
-            <a:endParaRPr lang="en-US" sz="1600" dirty="0"/>
+                <a:latin typeface="+mj-lt"/>
+                <a:hlinkClick r:id="rId7"/>
+              </a:rPr>
+              <a:t>https://docs.microsoft.com/en-us/javascript/api/excel/excel</a:t>
+            </a:r>
+            <a:r>
+              <a:rPr lang="en-US" sz="1800">
+                <a:latin typeface="+mj-lt"/>
+                <a:hlinkClick r:id="rId7"/>
+              </a:rPr>
+              <a:t>.chart</a:t>
+            </a:r>
+            <a:endParaRPr lang="en-US" sz="1800" dirty="0">
+              <a:latin typeface="+mj-lt"/>
+            </a:endParaRPr>
           </a:p>
         </p:txBody>
       </p:sp>
@@ -31250,7 +31231,7 @@
         <p159:morph option="byObject"/>
       </p:transition>
     </mc:Choice>
-    <mc:Fallback xmlns="" xmlns:a14="http://schemas.microsoft.com/office/drawing/2010/main" xmlns:p14="http://schemas.microsoft.com/office/powerpoint/2010/main">
+    <mc:Fallback xmlns:p14="http://schemas.microsoft.com/office/powerpoint/2010/main" xmlns:a14="http://schemas.microsoft.com/office/drawing/2010/main" xmlns="">
       <p:transition spd="slow">
         <p:fade/>
       </p:transition>

</xml_diff>

<commit_message>
FY2020Q2 content refresh - officeaddins - m02
- update module to use latest yeoman generator for office
</commit_message>
<xml_diff>
--- a/OfficeAddin/02 Building Add-ins for Microsoft Excel/01 Tables and Charts in Excel Add-ins.pptx
+++ b/OfficeAddin/02 Building Add-ins for Microsoft Excel/01 Tables and Charts in Excel Add-ins.pptx
@@ -281,7 +281,7 @@
               <a:rPr lang="en-US" smtClean="0">
                 <a:latin typeface="Segoe UI" pitchFamily="34" charset="0"/>
               </a:rPr>
-              <a:t>9/8/19 8:22 PM</a:t>
+              <a:t>12/8/19 8:31 PM</a:t>
             </a:fld>
             <a:endParaRPr lang="en-US" dirty="0">
               <a:latin typeface="Segoe UI" pitchFamily="34" charset="0"/>
@@ -575,7 +575,7 @@
           <a:p>
             <a:fld id="{D18B56EA-E28F-4F92-9F16-7A6F2501B303}" type="datetime8">
               <a:rPr lang="en-US" smtClean="0"/>
-              <a:t>9/8/19 8:21 PM</a:t>
+              <a:t>12/8/19 8:31 PM</a:t>
             </a:fld>
             <a:endParaRPr lang="en-US" dirty="0"/>
           </a:p>
@@ -1063,7 +1063,7 @@
                 <a:tabLst/>
                 <a:defRPr/>
               </a:pPr>
-              <a:t>9/8/19 8:21 PM</a:t>
+              <a:t>12/8/19 8:31 PM</a:t>
             </a:fld>
             <a:endParaRPr kumimoji="0" lang="en-US" sz="1200" b="0" i="0" u="none" strike="noStrike" kern="1200" cap="none" spc="0" normalizeH="0" baseline="0" noProof="0" dirty="0">
               <a:ln>
@@ -1319,7 +1319,7 @@
           <a:p>
             <a:fld id="{D18B56EA-E28F-4F92-9F16-7A6F2501B303}" type="datetime8">
               <a:rPr lang="en-US" smtClean="0"/>
-              <a:t>9/8/19 8:22 PM</a:t>
+              <a:t>12/8/19 8:31 PM</a:t>
             </a:fld>
             <a:endParaRPr lang="en-US" dirty="0"/>
           </a:p>
@@ -1509,7 +1509,7 @@
           <a:p>
             <a:fld id="{D18B56EA-E28F-4F92-9F16-7A6F2501B303}" type="datetime8">
               <a:rPr lang="en-US" smtClean="0"/>
-              <a:t>9/8/19 8:22 PM</a:t>
+              <a:t>12/8/19 8:31 PM</a:t>
             </a:fld>
             <a:endParaRPr lang="en-US" dirty="0"/>
           </a:p>
@@ -1948,7 +1948,7 @@
                 <a:tabLst/>
                 <a:defRPr/>
               </a:pPr>
-              <a:t>9/8/19 8:22 PM</a:t>
+              <a:t>12/8/19 8:31 PM</a:t>
             </a:fld>
             <a:endParaRPr kumimoji="0" lang="en-US" sz="1200" b="0" i="0" u="none" strike="noStrike" kern="1200" cap="none" spc="0" normalizeH="0" baseline="0" noProof="0" dirty="0">
               <a:ln>
@@ -2204,7 +2204,7 @@
           <a:p>
             <a:fld id="{D18B56EA-E28F-4F92-9F16-7A6F2501B303}" type="datetime8">
               <a:rPr lang="en-US" smtClean="0"/>
-              <a:t>9/8/19 8:22 PM</a:t>
+              <a:t>12/8/19 8:31 PM</a:t>
             </a:fld>
             <a:endParaRPr lang="en-US" dirty="0"/>
           </a:p>
@@ -2396,7 +2396,7 @@
           <a:p>
             <a:fld id="{D18B56EA-E28F-4F92-9F16-7A6F2501B303}" type="datetime8">
               <a:rPr lang="en-US" smtClean="0"/>
-              <a:t>9/8/19 8:22 PM</a:t>
+              <a:t>12/8/19 8:31 PM</a:t>
             </a:fld>
             <a:endParaRPr lang="en-US" dirty="0"/>
           </a:p>
@@ -2580,7 +2580,7 @@
           <a:p>
             <a:fld id="{D18B56EA-E28F-4F92-9F16-7A6F2501B303}" type="datetime8">
               <a:rPr lang="en-US" smtClean="0"/>
-              <a:t>9/8/19 8:22 PM</a:t>
+              <a:t>12/8/19 8:31 PM</a:t>
             </a:fld>
             <a:endParaRPr lang="en-US" dirty="0"/>
           </a:p>
@@ -2866,7 +2866,7 @@
           <a:p>
             <a:fld id="{D18B56EA-E28F-4F92-9F16-7A6F2501B303}" type="datetime8">
               <a:rPr lang="en-US" smtClean="0"/>
-              <a:t>9/8/19 8:22 PM</a:t>
+              <a:t>12/8/19 8:31 PM</a:t>
             </a:fld>
             <a:endParaRPr lang="en-US" dirty="0"/>
           </a:p>
@@ -3712,7 +3712,7 @@
           <a:p>
             <a:fld id="{D18B56EA-E28F-4F92-9F16-7A6F2501B303}" type="datetime8">
               <a:rPr lang="en-US" smtClean="0"/>
-              <a:t>9/8/19 8:22 PM</a:t>
+              <a:t>12/8/19 8:31 PM</a:t>
             </a:fld>
             <a:endParaRPr lang="en-US" dirty="0"/>
           </a:p>
@@ -3893,7 +3893,7 @@
           <a:p>
             <a:fld id="{D18B56EA-E28F-4F92-9F16-7A6F2501B303}" type="datetime8">
               <a:rPr lang="en-US" smtClean="0"/>
-              <a:t>9/8/19 8:27 PM</a:t>
+              <a:t>12/8/19 8:31 PM</a:t>
             </a:fld>
             <a:endParaRPr lang="en-US" dirty="0"/>
           </a:p>
@@ -4074,7 +4074,7 @@
           <a:p>
             <a:fld id="{D18B56EA-E28F-4F92-9F16-7A6F2501B303}" type="datetime8">
               <a:rPr lang="en-US" smtClean="0"/>
-              <a:t>9/8/19 8:22 PM</a:t>
+              <a:t>12/8/19 8:31 PM</a:t>
             </a:fld>
             <a:endParaRPr lang="en-US" dirty="0"/>
           </a:p>
@@ -4360,7 +4360,7 @@
                 <a:tabLst/>
                 <a:defRPr/>
               </a:pPr>
-              <a:t>9/8/19 8:21 PM</a:t>
+              <a:t>12/8/19 8:31 PM</a:t>
             </a:fld>
             <a:endParaRPr kumimoji="0" lang="en-US" sz="1200" b="0" i="0" u="none" strike="noStrike" kern="1200" cap="none" spc="0" normalizeH="0" baseline="0" noProof="0" dirty="0">
               <a:ln>
@@ -4613,7 +4613,7 @@
           <a:p>
             <a:fld id="{D18B56EA-E28F-4F92-9F16-7A6F2501B303}" type="datetime8">
               <a:rPr lang="en-US" smtClean="0"/>
-              <a:t>9/8/19 8:22 PM</a:t>
+              <a:t>12/8/19 8:31 PM</a:t>
             </a:fld>
             <a:endParaRPr lang="en-US" dirty="0"/>
           </a:p>
@@ -5058,7 +5058,7 @@
           <a:p>
             <a:fld id="{D18B56EA-E28F-4F92-9F16-7A6F2501B303}" type="datetime8">
               <a:rPr lang="en-US" smtClean="0"/>
-              <a:t>9/8/19 8:21 PM</a:t>
+              <a:t>12/8/19 8:31 PM</a:t>
             </a:fld>
             <a:endParaRPr lang="en-US" dirty="0"/>
           </a:p>
@@ -5674,7 +5674,7 @@
                 <a:tabLst/>
                 <a:defRPr/>
               </a:pPr>
-              <a:t>9/8/19 8:21 PM</a:t>
+              <a:t>12/8/19 8:31 PM</a:t>
             </a:fld>
             <a:endParaRPr kumimoji="0" lang="en-US" sz="1200" b="0" i="0" u="none" strike="noStrike" kern="1200" cap="none" spc="0" normalizeH="0" baseline="0" noProof="0" dirty="0">
               <a:ln>
@@ -6357,7 +6357,7 @@
                 <a:tabLst/>
                 <a:defRPr/>
               </a:pPr>
-              <a:t>9/8/19 8:22 PM</a:t>
+              <a:t>12/8/19 8:31 PM</a:t>
             </a:fld>
             <a:endParaRPr kumimoji="0" lang="en-US" sz="1200" b="0" i="0" u="none" strike="noStrike" kern="1200" cap="none" spc="0" normalizeH="0" baseline="0" noProof="0" dirty="0">
               <a:ln>
@@ -6695,7 +6695,7 @@
           <a:p>
             <a:fld id="{D18B56EA-E28F-4F92-9F16-7A6F2501B303}" type="datetime8">
               <a:rPr lang="en-US" smtClean="0"/>
-              <a:t>9/8/19 8:22 PM</a:t>
+              <a:t>12/8/19 8:31 PM</a:t>
             </a:fld>
             <a:endParaRPr lang="en-US" dirty="0"/>
           </a:p>
@@ -6911,7 +6911,7 @@
           <a:p>
             <a:fld id="{D18B56EA-E28F-4F92-9F16-7A6F2501B303}" type="datetime8">
               <a:rPr lang="en-US" smtClean="0"/>
-              <a:t>9/8/19 8:22 PM</a:t>
+              <a:t>12/8/19 8:31 PM</a:t>
             </a:fld>
             <a:endParaRPr lang="en-US" dirty="0"/>
           </a:p>
@@ -7498,7 +7498,7 @@
                 <a:tabLst/>
                 <a:defRPr/>
               </a:pPr>
-              <a:t>9/8/19 8:22 PM</a:t>
+              <a:t>12/8/19 8:31 PM</a:t>
             </a:fld>
             <a:endParaRPr kumimoji="0" lang="en-US" sz="1200" b="0" i="0" u="none" strike="noStrike" kern="1200" cap="none" spc="0" normalizeH="0" baseline="0" noProof="0" dirty="0">
               <a:ln>
@@ -24881,8 +24881,17 @@
               <a:rPr lang="en-US" sz="1800" dirty="0">
                 <a:latin typeface="+mj-lt"/>
               </a:rPr>
-              <a:t>Excel Add-ins overview</a:t>
-            </a:r>
+              <a:t>Excel </a:t>
+            </a:r>
+            <a:r>
+              <a:rPr lang="en-US" sz="1800">
+                <a:latin typeface="+mj-lt"/>
+              </a:rPr>
+              <a:t>Add-ins overview </a:t>
+            </a:r>
+            <a:endParaRPr lang="en-US" sz="1800" dirty="0">
+              <a:latin typeface="+mj-lt"/>
+            </a:endParaRPr>
           </a:p>
           <a:p>
             <a:pPr marL="342900" lvl="0" indent="-342900" defTabSz="914400">
@@ -25106,14 +25115,7 @@
                 <a:latin typeface="+mj-lt"/>
                 <a:hlinkClick r:id="rId7"/>
               </a:rPr>
-              <a:t>https://docs.microsoft.com/en-us/javascript/api/excel/excel</a:t>
-            </a:r>
-            <a:r>
-              <a:rPr lang="en-US" sz="1800">
-                <a:latin typeface="+mj-lt"/>
-                <a:hlinkClick r:id="rId7"/>
-              </a:rPr>
-              <a:t>.chart</a:t>
+              <a:t>https://docs.microsoft.com/en-us/javascript/api/excel/excel.chart</a:t>
             </a:r>
             <a:endParaRPr lang="en-US" sz="1800" dirty="0">
               <a:latin typeface="+mj-lt"/>
@@ -31231,7 +31233,7 @@
         <p159:morph option="byObject"/>
       </p:transition>
     </mc:Choice>
-    <mc:Fallback xmlns:p14="http://schemas.microsoft.com/office/powerpoint/2010/main" xmlns:a14="http://schemas.microsoft.com/office/drawing/2010/main" xmlns="">
+    <mc:Fallback xmlns="" xmlns:a14="http://schemas.microsoft.com/office/drawing/2010/main" xmlns:p14="http://schemas.microsoft.com/office/powerpoint/2010/main">
       <p:transition spd="slow">
         <p:fade/>
       </p:transition>

</xml_diff>

<commit_message>
FY2020Q3 content refresh: Office Addins - M02 (Excel)
</commit_message>
<xml_diff>
--- a/OfficeAddin/02 Building Add-ins for Microsoft Excel/01 Tables and Charts in Excel Add-ins.pptx
+++ b/OfficeAddin/02 Building Add-ins for Microsoft Excel/01 Tables and Charts in Excel Add-ins.pptx
@@ -281,7 +281,7 @@
               <a:rPr lang="en-US" smtClean="0">
                 <a:latin typeface="Segoe UI" pitchFamily="34" charset="0"/>
               </a:rPr>
-              <a:t>12/8/19 8:31 PM</a:t>
+              <a:t>3/3/20 8:50 PM</a:t>
             </a:fld>
             <a:endParaRPr lang="en-US" dirty="0">
               <a:latin typeface="Segoe UI" pitchFamily="34" charset="0"/>
@@ -575,7 +575,7 @@
           <a:p>
             <a:fld id="{D18B56EA-E28F-4F92-9F16-7A6F2501B303}" type="datetime8">
               <a:rPr lang="en-US" smtClean="0"/>
-              <a:t>12/8/19 8:31 PM</a:t>
+              <a:t>3/3/20 8:50 PM</a:t>
             </a:fld>
             <a:endParaRPr lang="en-US" dirty="0"/>
           </a:p>
@@ -1063,7 +1063,7 @@
                 <a:tabLst/>
                 <a:defRPr/>
               </a:pPr>
-              <a:t>12/8/19 8:31 PM</a:t>
+              <a:t>3/3/20 8:50 PM</a:t>
             </a:fld>
             <a:endParaRPr kumimoji="0" lang="en-US" sz="1200" b="0" i="0" u="none" strike="noStrike" kern="1200" cap="none" spc="0" normalizeH="0" baseline="0" noProof="0" dirty="0">
               <a:ln>
@@ -1319,7 +1319,7 @@
           <a:p>
             <a:fld id="{D18B56EA-E28F-4F92-9F16-7A6F2501B303}" type="datetime8">
               <a:rPr lang="en-US" smtClean="0"/>
-              <a:t>12/8/19 8:31 PM</a:t>
+              <a:t>3/3/20 8:50 PM</a:t>
             </a:fld>
             <a:endParaRPr lang="en-US" dirty="0"/>
           </a:p>
@@ -1509,7 +1509,7 @@
           <a:p>
             <a:fld id="{D18B56EA-E28F-4F92-9F16-7A6F2501B303}" type="datetime8">
               <a:rPr lang="en-US" smtClean="0"/>
-              <a:t>12/8/19 8:31 PM</a:t>
+              <a:t>3/3/20 8:50 PM</a:t>
             </a:fld>
             <a:endParaRPr lang="en-US" dirty="0"/>
           </a:p>
@@ -1948,7 +1948,7 @@
                 <a:tabLst/>
                 <a:defRPr/>
               </a:pPr>
-              <a:t>12/8/19 8:31 PM</a:t>
+              <a:t>3/3/20 8:50 PM</a:t>
             </a:fld>
             <a:endParaRPr kumimoji="0" lang="en-US" sz="1200" b="0" i="0" u="none" strike="noStrike" kern="1200" cap="none" spc="0" normalizeH="0" baseline="0" noProof="0" dirty="0">
               <a:ln>
@@ -2204,7 +2204,7 @@
           <a:p>
             <a:fld id="{D18B56EA-E28F-4F92-9F16-7A6F2501B303}" type="datetime8">
               <a:rPr lang="en-US" smtClean="0"/>
-              <a:t>12/8/19 8:31 PM</a:t>
+              <a:t>3/3/20 8:50 PM</a:t>
             </a:fld>
             <a:endParaRPr lang="en-US" dirty="0"/>
           </a:p>
@@ -2396,7 +2396,7 @@
           <a:p>
             <a:fld id="{D18B56EA-E28F-4F92-9F16-7A6F2501B303}" type="datetime8">
               <a:rPr lang="en-US" smtClean="0"/>
-              <a:t>12/8/19 8:31 PM</a:t>
+              <a:t>3/3/20 8:50 PM</a:t>
             </a:fld>
             <a:endParaRPr lang="en-US" dirty="0"/>
           </a:p>
@@ -2580,7 +2580,7 @@
           <a:p>
             <a:fld id="{D18B56EA-E28F-4F92-9F16-7A6F2501B303}" type="datetime8">
               <a:rPr lang="en-US" smtClean="0"/>
-              <a:t>12/8/19 8:31 PM</a:t>
+              <a:t>3/3/20 8:50 PM</a:t>
             </a:fld>
             <a:endParaRPr lang="en-US" dirty="0"/>
           </a:p>
@@ -2866,7 +2866,7 @@
           <a:p>
             <a:fld id="{D18B56EA-E28F-4F92-9F16-7A6F2501B303}" type="datetime8">
               <a:rPr lang="en-US" smtClean="0"/>
-              <a:t>12/8/19 8:31 PM</a:t>
+              <a:t>3/3/20 8:50 PM</a:t>
             </a:fld>
             <a:endParaRPr lang="en-US" dirty="0"/>
           </a:p>
@@ -3712,7 +3712,7 @@
           <a:p>
             <a:fld id="{D18B56EA-E28F-4F92-9F16-7A6F2501B303}" type="datetime8">
               <a:rPr lang="en-US" smtClean="0"/>
-              <a:t>12/8/19 8:31 PM</a:t>
+              <a:t>3/3/20 8:50 PM</a:t>
             </a:fld>
             <a:endParaRPr lang="en-US" dirty="0"/>
           </a:p>
@@ -3893,7 +3893,7 @@
           <a:p>
             <a:fld id="{D18B56EA-E28F-4F92-9F16-7A6F2501B303}" type="datetime8">
               <a:rPr lang="en-US" smtClean="0"/>
-              <a:t>12/8/19 8:31 PM</a:t>
+              <a:t>3/3/20 8:50 PM</a:t>
             </a:fld>
             <a:endParaRPr lang="en-US" dirty="0"/>
           </a:p>
@@ -4074,7 +4074,7 @@
           <a:p>
             <a:fld id="{D18B56EA-E28F-4F92-9F16-7A6F2501B303}" type="datetime8">
               <a:rPr lang="en-US" smtClean="0"/>
-              <a:t>12/8/19 8:31 PM</a:t>
+              <a:t>3/3/20 8:50 PM</a:t>
             </a:fld>
             <a:endParaRPr lang="en-US" dirty="0"/>
           </a:p>
@@ -4360,7 +4360,7 @@
                 <a:tabLst/>
                 <a:defRPr/>
               </a:pPr>
-              <a:t>12/8/19 8:31 PM</a:t>
+              <a:t>3/3/20 8:50 PM</a:t>
             </a:fld>
             <a:endParaRPr kumimoji="0" lang="en-US" sz="1200" b="0" i="0" u="none" strike="noStrike" kern="1200" cap="none" spc="0" normalizeH="0" baseline="0" noProof="0" dirty="0">
               <a:ln>
@@ -4613,7 +4613,7 @@
           <a:p>
             <a:fld id="{D18B56EA-E28F-4F92-9F16-7A6F2501B303}" type="datetime8">
               <a:rPr lang="en-US" smtClean="0"/>
-              <a:t>12/8/19 8:31 PM</a:t>
+              <a:t>3/3/20 8:50 PM</a:t>
             </a:fld>
             <a:endParaRPr lang="en-US" dirty="0"/>
           </a:p>
@@ -5058,7 +5058,7 @@
           <a:p>
             <a:fld id="{D18B56EA-E28F-4F92-9F16-7A6F2501B303}" type="datetime8">
               <a:rPr lang="en-US" smtClean="0"/>
-              <a:t>12/8/19 8:31 PM</a:t>
+              <a:t>3/3/20 8:50 PM</a:t>
             </a:fld>
             <a:endParaRPr lang="en-US" dirty="0"/>
           </a:p>
@@ -5674,7 +5674,7 @@
                 <a:tabLst/>
                 <a:defRPr/>
               </a:pPr>
-              <a:t>12/8/19 8:31 PM</a:t>
+              <a:t>3/3/20 8:50 PM</a:t>
             </a:fld>
             <a:endParaRPr kumimoji="0" lang="en-US" sz="1200" b="0" i="0" u="none" strike="noStrike" kern="1200" cap="none" spc="0" normalizeH="0" baseline="0" noProof="0" dirty="0">
               <a:ln>
@@ -6357,7 +6357,7 @@
                 <a:tabLst/>
                 <a:defRPr/>
               </a:pPr>
-              <a:t>12/8/19 8:31 PM</a:t>
+              <a:t>3/3/20 8:50 PM</a:t>
             </a:fld>
             <a:endParaRPr kumimoji="0" lang="en-US" sz="1200" b="0" i="0" u="none" strike="noStrike" kern="1200" cap="none" spc="0" normalizeH="0" baseline="0" noProof="0" dirty="0">
               <a:ln>
@@ -6695,7 +6695,7 @@
           <a:p>
             <a:fld id="{D18B56EA-E28F-4F92-9F16-7A6F2501B303}" type="datetime8">
               <a:rPr lang="en-US" smtClean="0"/>
-              <a:t>12/8/19 8:31 PM</a:t>
+              <a:t>3/3/20 8:50 PM</a:t>
             </a:fld>
             <a:endParaRPr lang="en-US" dirty="0"/>
           </a:p>
@@ -6911,7 +6911,7 @@
           <a:p>
             <a:fld id="{D18B56EA-E28F-4F92-9F16-7A6F2501B303}" type="datetime8">
               <a:rPr lang="en-US" smtClean="0"/>
-              <a:t>12/8/19 8:31 PM</a:t>
+              <a:t>3/3/20 8:50 PM</a:t>
             </a:fld>
             <a:endParaRPr lang="en-US" dirty="0"/>
           </a:p>
@@ -7498,7 +7498,7 @@
                 <a:tabLst/>
                 <a:defRPr/>
               </a:pPr>
-              <a:t>12/8/19 8:31 PM</a:t>
+              <a:t>3/3/20 8:50 PM</a:t>
             </a:fld>
             <a:endParaRPr kumimoji="0" lang="en-US" sz="1200" b="0" i="0" u="none" strike="noStrike" kern="1200" cap="none" spc="0" normalizeH="0" baseline="0" noProof="0" dirty="0">
               <a:ln>
@@ -18053,7 +18053,7 @@
           <a:p>
             <a:r>
               <a:rPr lang="en-US" dirty="0"/>
-              <a:t>Working with Tables and Charts</a:t>
+              <a:t>Working with Tables and Charts </a:t>
             </a:r>
             <a:endParaRPr lang="en-US" dirty="0">
               <a:noFill/>
@@ -24881,17 +24881,8 @@
               <a:rPr lang="en-US" sz="1800" dirty="0">
                 <a:latin typeface="+mj-lt"/>
               </a:rPr>
-              <a:t>Excel </a:t>
-            </a:r>
-            <a:r>
-              <a:rPr lang="en-US" sz="1800">
-                <a:latin typeface="+mj-lt"/>
-              </a:rPr>
-              <a:t>Add-ins overview </a:t>
-            </a:r>
-            <a:endParaRPr lang="en-US" sz="1800" dirty="0">
-              <a:latin typeface="+mj-lt"/>
-            </a:endParaRPr>
+              <a:t>Excel Add-ins overview </a:t>
+            </a:r>
           </a:p>
           <a:p>
             <a:pPr marL="342900" lvl="0" indent="-342900" defTabSz="914400">
@@ -31233,7 +31224,7 @@
         <p159:morph option="byObject"/>
       </p:transition>
     </mc:Choice>
-    <mc:Fallback xmlns="" xmlns:a14="http://schemas.microsoft.com/office/drawing/2010/main" xmlns:p14="http://schemas.microsoft.com/office/powerpoint/2010/main">
+    <mc:Fallback xmlns:p14="http://schemas.microsoft.com/office/powerpoint/2010/main" xmlns:a14="http://schemas.microsoft.com/office/drawing/2010/main" xmlns="">
       <p:transition spd="slow">
         <p:fade/>
       </p:transition>

</xml_diff>

<commit_message>
FY2020Q3 content refresh: Office Addins - M02 (Excel) (#675)
</commit_message>
<xml_diff>
--- a/OfficeAddin/02 Building Add-ins for Microsoft Excel/01 Tables and Charts in Excel Add-ins.pptx
+++ b/OfficeAddin/02 Building Add-ins for Microsoft Excel/01 Tables and Charts in Excel Add-ins.pptx
@@ -281,7 +281,7 @@
               <a:rPr lang="en-US" smtClean="0">
                 <a:latin typeface="Segoe UI" pitchFamily="34" charset="0"/>
               </a:rPr>
-              <a:t>12/8/19 8:31 PM</a:t>
+              <a:t>3/3/20 8:50 PM</a:t>
             </a:fld>
             <a:endParaRPr lang="en-US" dirty="0">
               <a:latin typeface="Segoe UI" pitchFamily="34" charset="0"/>
@@ -575,7 +575,7 @@
           <a:p>
             <a:fld id="{D18B56EA-E28F-4F92-9F16-7A6F2501B303}" type="datetime8">
               <a:rPr lang="en-US" smtClean="0"/>
-              <a:t>12/8/19 8:31 PM</a:t>
+              <a:t>3/3/20 8:50 PM</a:t>
             </a:fld>
             <a:endParaRPr lang="en-US" dirty="0"/>
           </a:p>
@@ -1063,7 +1063,7 @@
                 <a:tabLst/>
                 <a:defRPr/>
               </a:pPr>
-              <a:t>12/8/19 8:31 PM</a:t>
+              <a:t>3/3/20 8:50 PM</a:t>
             </a:fld>
             <a:endParaRPr kumimoji="0" lang="en-US" sz="1200" b="0" i="0" u="none" strike="noStrike" kern="1200" cap="none" spc="0" normalizeH="0" baseline="0" noProof="0" dirty="0">
               <a:ln>
@@ -1319,7 +1319,7 @@
           <a:p>
             <a:fld id="{D18B56EA-E28F-4F92-9F16-7A6F2501B303}" type="datetime8">
               <a:rPr lang="en-US" smtClean="0"/>
-              <a:t>12/8/19 8:31 PM</a:t>
+              <a:t>3/3/20 8:50 PM</a:t>
             </a:fld>
             <a:endParaRPr lang="en-US" dirty="0"/>
           </a:p>
@@ -1509,7 +1509,7 @@
           <a:p>
             <a:fld id="{D18B56EA-E28F-4F92-9F16-7A6F2501B303}" type="datetime8">
               <a:rPr lang="en-US" smtClean="0"/>
-              <a:t>12/8/19 8:31 PM</a:t>
+              <a:t>3/3/20 8:50 PM</a:t>
             </a:fld>
             <a:endParaRPr lang="en-US" dirty="0"/>
           </a:p>
@@ -1948,7 +1948,7 @@
                 <a:tabLst/>
                 <a:defRPr/>
               </a:pPr>
-              <a:t>12/8/19 8:31 PM</a:t>
+              <a:t>3/3/20 8:50 PM</a:t>
             </a:fld>
             <a:endParaRPr kumimoji="0" lang="en-US" sz="1200" b="0" i="0" u="none" strike="noStrike" kern="1200" cap="none" spc="0" normalizeH="0" baseline="0" noProof="0" dirty="0">
               <a:ln>
@@ -2204,7 +2204,7 @@
           <a:p>
             <a:fld id="{D18B56EA-E28F-4F92-9F16-7A6F2501B303}" type="datetime8">
               <a:rPr lang="en-US" smtClean="0"/>
-              <a:t>12/8/19 8:31 PM</a:t>
+              <a:t>3/3/20 8:50 PM</a:t>
             </a:fld>
             <a:endParaRPr lang="en-US" dirty="0"/>
           </a:p>
@@ -2396,7 +2396,7 @@
           <a:p>
             <a:fld id="{D18B56EA-E28F-4F92-9F16-7A6F2501B303}" type="datetime8">
               <a:rPr lang="en-US" smtClean="0"/>
-              <a:t>12/8/19 8:31 PM</a:t>
+              <a:t>3/3/20 8:50 PM</a:t>
             </a:fld>
             <a:endParaRPr lang="en-US" dirty="0"/>
           </a:p>
@@ -2580,7 +2580,7 @@
           <a:p>
             <a:fld id="{D18B56EA-E28F-4F92-9F16-7A6F2501B303}" type="datetime8">
               <a:rPr lang="en-US" smtClean="0"/>
-              <a:t>12/8/19 8:31 PM</a:t>
+              <a:t>3/3/20 8:50 PM</a:t>
             </a:fld>
             <a:endParaRPr lang="en-US" dirty="0"/>
           </a:p>
@@ -2866,7 +2866,7 @@
           <a:p>
             <a:fld id="{D18B56EA-E28F-4F92-9F16-7A6F2501B303}" type="datetime8">
               <a:rPr lang="en-US" smtClean="0"/>
-              <a:t>12/8/19 8:31 PM</a:t>
+              <a:t>3/3/20 8:50 PM</a:t>
             </a:fld>
             <a:endParaRPr lang="en-US" dirty="0"/>
           </a:p>
@@ -3712,7 +3712,7 @@
           <a:p>
             <a:fld id="{D18B56EA-E28F-4F92-9F16-7A6F2501B303}" type="datetime8">
               <a:rPr lang="en-US" smtClean="0"/>
-              <a:t>12/8/19 8:31 PM</a:t>
+              <a:t>3/3/20 8:50 PM</a:t>
             </a:fld>
             <a:endParaRPr lang="en-US" dirty="0"/>
           </a:p>
@@ -3893,7 +3893,7 @@
           <a:p>
             <a:fld id="{D18B56EA-E28F-4F92-9F16-7A6F2501B303}" type="datetime8">
               <a:rPr lang="en-US" smtClean="0"/>
-              <a:t>12/8/19 8:31 PM</a:t>
+              <a:t>3/3/20 8:50 PM</a:t>
             </a:fld>
             <a:endParaRPr lang="en-US" dirty="0"/>
           </a:p>
@@ -4074,7 +4074,7 @@
           <a:p>
             <a:fld id="{D18B56EA-E28F-4F92-9F16-7A6F2501B303}" type="datetime8">
               <a:rPr lang="en-US" smtClean="0"/>
-              <a:t>12/8/19 8:31 PM</a:t>
+              <a:t>3/3/20 8:50 PM</a:t>
             </a:fld>
             <a:endParaRPr lang="en-US" dirty="0"/>
           </a:p>
@@ -4360,7 +4360,7 @@
                 <a:tabLst/>
                 <a:defRPr/>
               </a:pPr>
-              <a:t>12/8/19 8:31 PM</a:t>
+              <a:t>3/3/20 8:50 PM</a:t>
             </a:fld>
             <a:endParaRPr kumimoji="0" lang="en-US" sz="1200" b="0" i="0" u="none" strike="noStrike" kern="1200" cap="none" spc="0" normalizeH="0" baseline="0" noProof="0" dirty="0">
               <a:ln>
@@ -4613,7 +4613,7 @@
           <a:p>
             <a:fld id="{D18B56EA-E28F-4F92-9F16-7A6F2501B303}" type="datetime8">
               <a:rPr lang="en-US" smtClean="0"/>
-              <a:t>12/8/19 8:31 PM</a:t>
+              <a:t>3/3/20 8:50 PM</a:t>
             </a:fld>
             <a:endParaRPr lang="en-US" dirty="0"/>
           </a:p>
@@ -5058,7 +5058,7 @@
           <a:p>
             <a:fld id="{D18B56EA-E28F-4F92-9F16-7A6F2501B303}" type="datetime8">
               <a:rPr lang="en-US" smtClean="0"/>
-              <a:t>12/8/19 8:31 PM</a:t>
+              <a:t>3/3/20 8:50 PM</a:t>
             </a:fld>
             <a:endParaRPr lang="en-US" dirty="0"/>
           </a:p>
@@ -5674,7 +5674,7 @@
                 <a:tabLst/>
                 <a:defRPr/>
               </a:pPr>
-              <a:t>12/8/19 8:31 PM</a:t>
+              <a:t>3/3/20 8:50 PM</a:t>
             </a:fld>
             <a:endParaRPr kumimoji="0" lang="en-US" sz="1200" b="0" i="0" u="none" strike="noStrike" kern="1200" cap="none" spc="0" normalizeH="0" baseline="0" noProof="0" dirty="0">
               <a:ln>
@@ -6357,7 +6357,7 @@
                 <a:tabLst/>
                 <a:defRPr/>
               </a:pPr>
-              <a:t>12/8/19 8:31 PM</a:t>
+              <a:t>3/3/20 8:50 PM</a:t>
             </a:fld>
             <a:endParaRPr kumimoji="0" lang="en-US" sz="1200" b="0" i="0" u="none" strike="noStrike" kern="1200" cap="none" spc="0" normalizeH="0" baseline="0" noProof="0" dirty="0">
               <a:ln>
@@ -6695,7 +6695,7 @@
           <a:p>
             <a:fld id="{D18B56EA-E28F-4F92-9F16-7A6F2501B303}" type="datetime8">
               <a:rPr lang="en-US" smtClean="0"/>
-              <a:t>12/8/19 8:31 PM</a:t>
+              <a:t>3/3/20 8:50 PM</a:t>
             </a:fld>
             <a:endParaRPr lang="en-US" dirty="0"/>
           </a:p>
@@ -6911,7 +6911,7 @@
           <a:p>
             <a:fld id="{D18B56EA-E28F-4F92-9F16-7A6F2501B303}" type="datetime8">
               <a:rPr lang="en-US" smtClean="0"/>
-              <a:t>12/8/19 8:31 PM</a:t>
+              <a:t>3/3/20 8:50 PM</a:t>
             </a:fld>
             <a:endParaRPr lang="en-US" dirty="0"/>
           </a:p>
@@ -7498,7 +7498,7 @@
                 <a:tabLst/>
                 <a:defRPr/>
               </a:pPr>
-              <a:t>12/8/19 8:31 PM</a:t>
+              <a:t>3/3/20 8:50 PM</a:t>
             </a:fld>
             <a:endParaRPr kumimoji="0" lang="en-US" sz="1200" b="0" i="0" u="none" strike="noStrike" kern="1200" cap="none" spc="0" normalizeH="0" baseline="0" noProof="0" dirty="0">
               <a:ln>
@@ -18053,7 +18053,7 @@
           <a:p>
             <a:r>
               <a:rPr lang="en-US" dirty="0"/>
-              <a:t>Working with Tables and Charts</a:t>
+              <a:t>Working with Tables and Charts </a:t>
             </a:r>
             <a:endParaRPr lang="en-US" dirty="0">
               <a:noFill/>
@@ -24881,17 +24881,8 @@
               <a:rPr lang="en-US" sz="1800" dirty="0">
                 <a:latin typeface="+mj-lt"/>
               </a:rPr>
-              <a:t>Excel </a:t>
-            </a:r>
-            <a:r>
-              <a:rPr lang="en-US" sz="1800">
-                <a:latin typeface="+mj-lt"/>
-              </a:rPr>
-              <a:t>Add-ins overview </a:t>
-            </a:r>
-            <a:endParaRPr lang="en-US" sz="1800" dirty="0">
-              <a:latin typeface="+mj-lt"/>
-            </a:endParaRPr>
+              <a:t>Excel Add-ins overview </a:t>
+            </a:r>
           </a:p>
           <a:p>
             <a:pPr marL="342900" lvl="0" indent="-342900" defTabSz="914400">
@@ -31233,7 +31224,7 @@
         <p159:morph option="byObject"/>
       </p:transition>
     </mc:Choice>
-    <mc:Fallback xmlns="" xmlns:a14="http://schemas.microsoft.com/office/drawing/2010/main" xmlns:p14="http://schemas.microsoft.com/office/powerpoint/2010/main">
+    <mc:Fallback xmlns:p14="http://schemas.microsoft.com/office/powerpoint/2010/main" xmlns:a14="http://schemas.microsoft.com/office/drawing/2010/main" xmlns="">
       <p:transition spd="slow">
         <p:fade/>
       </p:transition>

</xml_diff>

<commit_message>
Port module to Microsoft Learn format (OfficeAddin): "Build Office add-ins for Microsoft Excel"
</commit_message>
<xml_diff>
--- a/OfficeAddin/02 Building Add-ins for Microsoft Excel/01 Tables and Charts in Excel Add-ins.pptx
+++ b/OfficeAddin/02 Building Add-ins for Microsoft Excel/01 Tables and Charts in Excel Add-ins.pptx
@@ -281,7 +281,7 @@
               <a:rPr lang="en-US" smtClean="0">
                 <a:latin typeface="Segoe UI" pitchFamily="34" charset="0"/>
               </a:rPr>
-              <a:t>3/3/20 8:50 PM</a:t>
+              <a:t>4/6/20 6:02 AM</a:t>
             </a:fld>
             <a:endParaRPr lang="en-US" dirty="0">
               <a:latin typeface="Segoe UI" pitchFamily="34" charset="0"/>
@@ -575,7 +575,7 @@
           <a:p>
             <a:fld id="{D18B56EA-E28F-4F92-9F16-7A6F2501B303}" type="datetime8">
               <a:rPr lang="en-US" smtClean="0"/>
-              <a:t>3/3/20 8:50 PM</a:t>
+              <a:t>4/6/20 6:02 AM</a:t>
             </a:fld>
             <a:endParaRPr lang="en-US" dirty="0"/>
           </a:p>
@@ -864,7 +864,10 @@
           <a:bodyPr/>
           <a:lstStyle/>
           <a:p>
-            <a:endParaRPr lang="en-US"/>
+            <a:r>
+              <a:rPr lang="en-US" dirty="0"/>
+              <a:t>Microsoft Office clients enable developers to create add-ins that extend Microsoft Excel with custom functionality. Through a JavaScript API, developers can manipulate the content in an Excel workbook from an app running in the task pane. In this module, you'll learn how to build an Excel add-in that inserts (and replaces) text ranges, tables, charts, and dialogs.</a:t>
+            </a:r>
           </a:p>
         </p:txBody>
       </p:sp>
@@ -1063,7 +1066,7 @@
                 <a:tabLst/>
                 <a:defRPr/>
               </a:pPr>
-              <a:t>3/3/20 8:50 PM</a:t>
+              <a:t>4/6/20 6:52 AM</a:t>
             </a:fld>
             <a:endParaRPr kumimoji="0" lang="en-US" sz="1200" b="0" i="0" u="none" strike="noStrike" kern="1200" cap="none" spc="0" normalizeH="0" baseline="0" noProof="0" dirty="0">
               <a:ln>
@@ -1319,7 +1322,7 @@
           <a:p>
             <a:fld id="{D18B56EA-E28F-4F92-9F16-7A6F2501B303}" type="datetime8">
               <a:rPr lang="en-US" smtClean="0"/>
-              <a:t>3/3/20 8:50 PM</a:t>
+              <a:t>4/6/20 6:02 AM</a:t>
             </a:fld>
             <a:endParaRPr lang="en-US" dirty="0"/>
           </a:p>
@@ -1509,7 +1512,7 @@
           <a:p>
             <a:fld id="{D18B56EA-E28F-4F92-9F16-7A6F2501B303}" type="datetime8">
               <a:rPr lang="en-US" smtClean="0"/>
-              <a:t>3/3/20 8:50 PM</a:t>
+              <a:t>4/6/20 6:02 AM</a:t>
             </a:fld>
             <a:endParaRPr lang="en-US" dirty="0"/>
           </a:p>
@@ -1605,13 +1608,13 @@
               </a:spcBef>
             </a:pPr>
             <a:r>
-              <a:rPr lang="en-US" b="1" dirty="0">
+              <a:rPr lang="en-US" b="0" dirty="0">
                 <a:solidFill>
                   <a:srgbClr val="D83B01"/>
                 </a:solidFill>
                 <a:latin typeface="Segoe UI Semibold"/>
               </a:rPr>
-              <a:t>Charts</a:t>
+              <a:t>Microsoft Excel has become a playground for data manipulation and visualization. So it's no surprise that the Excel JavaScript APIs allow developers to add and manipulate charts.</a:t>
             </a:r>
           </a:p>
           <a:p>
@@ -1623,17 +1626,12 @@
                 <a:spcPts val="600"/>
               </a:spcBef>
             </a:pPr>
-            <a:r>
-              <a:rPr lang="en-US" sz="900" kern="1200" dirty="0">
-                <a:solidFill>
-                  <a:srgbClr val="2F2F2F"/>
-                </a:solidFill>
-                <a:latin typeface="Segoe UI Light" pitchFamily="34" charset="0"/>
-                <a:ea typeface="+mn-ea"/>
-                <a:cs typeface="+mn-cs"/>
-              </a:rPr>
-              <a:t>Microsoft Excel has become a playground for data manipulation and visualization. So it no surprise that the Excel JavaScript APIs allow developers to add and manipulate charts.</a:t>
-            </a:r>
+            <a:endParaRPr lang="en-US" b="0" dirty="0">
+              <a:solidFill>
+                <a:srgbClr val="D83B01"/>
+              </a:solidFill>
+              <a:latin typeface="Segoe UI Semibold"/>
+            </a:endParaRPr>
           </a:p>
           <a:p>
             <a:pPr lvl="0">
@@ -1645,13 +1643,11 @@
               </a:spcBef>
             </a:pPr>
             <a:r>
-              <a:rPr lang="en-US" sz="900" kern="1200" dirty="0">
-                <a:solidFill>
-                  <a:srgbClr val="2F2F2F"/>
-                </a:solidFill>
-                <a:latin typeface="Segoe UI Light" pitchFamily="34" charset="0"/>
-                <a:ea typeface="+mn-ea"/>
-                <a:cs typeface="+mn-cs"/>
+              <a:rPr lang="en-US" b="0" dirty="0">
+                <a:solidFill>
+                  <a:srgbClr val="D83B01"/>
+                </a:solidFill>
+                <a:latin typeface="Segoe UI Semibold"/>
               </a:rPr>
               <a:t>Charts exist within worksheets, but can also be accessed directly from the workbook object.</a:t>
             </a:r>
@@ -1665,17 +1661,12 @@
                 <a:spcPts val="600"/>
               </a:spcBef>
             </a:pPr>
-            <a:r>
-              <a:rPr lang="en-US" sz="900" kern="1200" dirty="0">
-                <a:solidFill>
-                  <a:srgbClr val="2F2F2F"/>
-                </a:solidFill>
-                <a:latin typeface="Segoe UI Light" pitchFamily="34" charset="0"/>
-                <a:ea typeface="+mn-ea"/>
-                <a:cs typeface="+mn-cs"/>
-              </a:rPr>
-              <a:t>Charts have a number of complex relational properties that can be used to fine-tune the look of a chart. These include titles, legends, axes, series, labels, format, and much more.</a:t>
-            </a:r>
+            <a:endParaRPr lang="en-US" b="0" dirty="0">
+              <a:solidFill>
+                <a:srgbClr val="D83B01"/>
+              </a:solidFill>
+              <a:latin typeface="Segoe UI Semibold"/>
+            </a:endParaRPr>
           </a:p>
           <a:p>
             <a:pPr lvl="0">
@@ -1687,13 +1678,13 @@
               </a:spcBef>
             </a:pPr>
             <a:r>
-              <a:rPr lang="en-US" sz="900" dirty="0">
-                <a:solidFill>
-                  <a:srgbClr val="2F2F2F"/>
+              <a:rPr lang="en-US" b="0" dirty="0">
+                <a:solidFill>
+                  <a:srgbClr val="D83B01"/>
                 </a:solidFill>
                 <a:latin typeface="Segoe UI Semibold"/>
               </a:rPr>
-              <a:t>Charts are created based on a data range and are often created in conjunction with tables.</a:t>
+              <a:t>Charts have a number of complex relational properties that can be used to fine-tune the look of a chart. These include titles, legends, axes, series, labels, and format.</a:t>
             </a:r>
           </a:p>
           <a:p>
@@ -1705,51 +1696,199 @@
                 <a:spcPts val="600"/>
               </a:spcBef>
             </a:pPr>
-            <a:r>
-              <a:rPr lang="en-US" sz="900" dirty="0">
-                <a:solidFill>
-                  <a:srgbClr val="2F2F2F"/>
+            <a:endParaRPr lang="en-US" b="0" dirty="0">
+              <a:solidFill>
+                <a:srgbClr val="D83B01"/>
+              </a:solidFill>
+              <a:latin typeface="Segoe UI Semibold"/>
+            </a:endParaRPr>
+          </a:p>
+          <a:p>
+            <a:pPr lvl="0">
+              <a:lnSpc>
+                <a:spcPct val="90000"/>
+              </a:lnSpc>
+              <a:spcBef>
+                <a:spcPts val="600"/>
+              </a:spcBef>
+            </a:pPr>
+            <a:r>
+              <a:rPr lang="en-US" b="0" dirty="0">
+                <a:solidFill>
+                  <a:srgbClr val="D83B01"/>
                 </a:solidFill>
                 <a:latin typeface="Segoe UI Semibold"/>
               </a:rPr>
-              <a:t>The </a:t>
-            </a:r>
-            <a:r>
-              <a:rPr lang="en-US" sz="900" dirty="0" err="1">
-                <a:solidFill>
-                  <a:srgbClr val="2F2F2F"/>
+              <a:t>Users and developers can create a chart based on a data range and are often created in conjunction with tables.</a:t>
+            </a:r>
+          </a:p>
+          <a:p>
+            <a:pPr lvl="0">
+              <a:lnSpc>
+                <a:spcPct val="90000"/>
+              </a:lnSpc>
+              <a:spcBef>
+                <a:spcPts val="600"/>
+              </a:spcBef>
+            </a:pPr>
+            <a:endParaRPr lang="en-US" b="0" dirty="0">
+              <a:solidFill>
+                <a:srgbClr val="D83B01"/>
+              </a:solidFill>
+              <a:latin typeface="Segoe UI Semibold"/>
+            </a:endParaRPr>
+          </a:p>
+          <a:p>
+            <a:pPr lvl="0">
+              <a:lnSpc>
+                <a:spcPct val="90000"/>
+              </a:lnSpc>
+              <a:spcBef>
+                <a:spcPts val="600"/>
+              </a:spcBef>
+            </a:pPr>
+            <a:r>
+              <a:rPr lang="en-US" b="0" dirty="0">
+                <a:solidFill>
+                  <a:srgbClr val="D83B01"/>
                 </a:solidFill>
                 <a:latin typeface="Segoe UI Semibold"/>
               </a:rPr>
+              <a:t>The `</a:t>
+            </a:r>
+            <a:r>
+              <a:rPr lang="en-US" b="0" dirty="0" err="1">
+                <a:solidFill>
+                  <a:srgbClr val="D83B01"/>
+                </a:solidFill>
+                <a:latin typeface="Segoe UI Semibold"/>
+              </a:rPr>
               <a:t>worksheet.charts.add</a:t>
             </a:r>
             <a:r>
-              <a:rPr lang="en-US" sz="900" dirty="0">
-                <a:solidFill>
-                  <a:srgbClr val="2F2F2F"/>
+              <a:rPr lang="en-US" b="0" dirty="0">
+                <a:solidFill>
+                  <a:srgbClr val="D83B01"/>
                 </a:solidFill>
                 <a:latin typeface="Segoe UI Semibold"/>
               </a:rPr>
-              <a:t> function is used to create a chart, which accepts a chart type (discussed more in the next slide), a data range, and </a:t>
-            </a:r>
-            <a:r>
-              <a:rPr lang="en-US" sz="900" dirty="0" err="1">
-                <a:solidFill>
-                  <a:srgbClr val="2F2F2F"/>
+              <a:t>()` function is used to create a chart, which accepts a chart `type`, a data `range`, and `</a:t>
+            </a:r>
+            <a:r>
+              <a:rPr lang="en-US" b="0" dirty="0" err="1">
+                <a:solidFill>
+                  <a:srgbClr val="D83B01"/>
                 </a:solidFill>
                 <a:latin typeface="Segoe UI Semibold"/>
               </a:rPr>
               <a:t>seriesBy</a:t>
             </a:r>
             <a:r>
-              <a:rPr lang="en-US" sz="900" dirty="0">
-                <a:solidFill>
-                  <a:srgbClr val="2F2F2F"/>
+              <a:rPr lang="en-US" b="0" dirty="0">
+                <a:solidFill>
+                  <a:srgbClr val="D83B01"/>
                 </a:solidFill>
                 <a:latin typeface="Segoe UI Semibold"/>
               </a:rPr>
-              <a:t> (possible values include Auto, Scalar, Matrix).</a:t>
-            </a:r>
+              <a:t>`. The `</a:t>
+            </a:r>
+            <a:r>
+              <a:rPr lang="en-US" b="0" dirty="0" err="1">
+                <a:solidFill>
+                  <a:srgbClr val="D83B01"/>
+                </a:solidFill>
+                <a:latin typeface="Segoe UI Semibold"/>
+              </a:rPr>
+              <a:t>seriesBy</a:t>
+            </a:r>
+            <a:r>
+              <a:rPr lang="en-US" b="0" dirty="0">
+                <a:solidFill>
+                  <a:srgbClr val="D83B01"/>
+                </a:solidFill>
+                <a:latin typeface="Segoe UI Semibold"/>
+              </a:rPr>
+              <a:t>` argument supports the following values</a:t>
+            </a:r>
+          </a:p>
+          <a:p>
+            <a:pPr lvl="0">
+              <a:lnSpc>
+                <a:spcPct val="90000"/>
+              </a:lnSpc>
+              <a:spcBef>
+                <a:spcPts val="600"/>
+              </a:spcBef>
+            </a:pPr>
+            <a:endParaRPr lang="en-US" b="0" dirty="0">
+              <a:solidFill>
+                <a:srgbClr val="D83B01"/>
+              </a:solidFill>
+              <a:latin typeface="Segoe UI Semibold"/>
+            </a:endParaRPr>
+          </a:p>
+          <a:p>
+            <a:pPr lvl="0">
+              <a:lnSpc>
+                <a:spcPct val="90000"/>
+              </a:lnSpc>
+              <a:spcBef>
+                <a:spcPts val="600"/>
+              </a:spcBef>
+            </a:pPr>
+            <a:r>
+              <a:rPr lang="en-US" b="0" dirty="0">
+                <a:solidFill>
+                  <a:srgbClr val="D83B01"/>
+                </a:solidFill>
+                <a:latin typeface="Segoe UI Semibold"/>
+              </a:rPr>
+              <a:t>- Auto</a:t>
+            </a:r>
+          </a:p>
+          <a:p>
+            <a:pPr lvl="0">
+              <a:lnSpc>
+                <a:spcPct val="90000"/>
+              </a:lnSpc>
+              <a:spcBef>
+                <a:spcPts val="600"/>
+              </a:spcBef>
+            </a:pPr>
+            <a:r>
+              <a:rPr lang="en-US" b="0" dirty="0">
+                <a:solidFill>
+                  <a:srgbClr val="D83B01"/>
+                </a:solidFill>
+                <a:latin typeface="Segoe UI Semibold"/>
+              </a:rPr>
+              <a:t>- Scalar</a:t>
+            </a:r>
+          </a:p>
+          <a:p>
+            <a:pPr lvl="0">
+              <a:lnSpc>
+                <a:spcPct val="90000"/>
+              </a:lnSpc>
+              <a:spcBef>
+                <a:spcPts val="600"/>
+              </a:spcBef>
+            </a:pPr>
+            <a:r>
+              <a:rPr lang="en-US" b="0" dirty="0">
+                <a:solidFill>
+                  <a:srgbClr val="D83B01"/>
+                </a:solidFill>
+                <a:latin typeface="Segoe UI Semibold"/>
+              </a:rPr>
+              <a:t>- Matrix</a:t>
+            </a:r>
+            <a:endParaRPr lang="en-US" sz="900" b="0" dirty="0">
+              <a:solidFill>
+                <a:srgbClr val="2F2F2F"/>
+              </a:solidFill>
+              <a:latin typeface="Segoe UI Semibold"/>
+            </a:endParaRPr>
           </a:p>
         </p:txBody>
       </p:sp>
@@ -1948,7 +2087,7 @@
                 <a:tabLst/>
                 <a:defRPr/>
               </a:pPr>
-              <a:t>3/3/20 8:50 PM</a:t>
+              <a:t>4/6/20 10:45 AM</a:t>
             </a:fld>
             <a:endParaRPr kumimoji="0" lang="en-US" sz="1200" b="0" i="0" u="none" strike="noStrike" kern="1200" cap="none" spc="0" normalizeH="0" baseline="0" noProof="0" dirty="0">
               <a:ln>
@@ -2109,7 +2248,145 @@
           <a:p>
             <a:r>
               <a:rPr lang="en-US" dirty="0"/>
-              <a:t>The slide shows the script for adding a chart and all the support chart types…just about every chart type imaginable is supported.</a:t>
+              <a:t>Excel supports many different types of charts. Developers can add a chart to a worksheet using the `</a:t>
+            </a:r>
+            <a:r>
+              <a:rPr lang="en-US" dirty="0" err="1"/>
+              <a:t>worksheet.carts.add</a:t>
+            </a:r>
+            <a:r>
+              <a:rPr lang="en-US" dirty="0"/>
+              <a:t>("{REPLACE_WITH_CHARTTYPE_ENUM}", range, "{REPLACE_WITH_CHARTSERIESBY_ENUM}")` method.</a:t>
+            </a:r>
+          </a:p>
+          <a:p>
+            <a:endParaRPr lang="en-US" dirty="0"/>
+          </a:p>
+          <a:p>
+            <a:r>
+              <a:rPr lang="en-US" dirty="0"/>
+              <a:t>The `</a:t>
+            </a:r>
+            <a:r>
+              <a:rPr lang="en-US" dirty="0" err="1"/>
+              <a:t>ChartType</a:t>
+            </a:r>
+            <a:r>
+              <a:rPr lang="en-US" dirty="0"/>
+              <a:t>` argument specifies the type of chart to use. Refer to the SDK for the available options on the [</a:t>
+            </a:r>
+            <a:r>
+              <a:rPr lang="en-US" dirty="0" err="1"/>
+              <a:t>Excel.ChartType</a:t>
+            </a:r>
+            <a:r>
+              <a:rPr lang="en-US" dirty="0"/>
+              <a:t> </a:t>
+            </a:r>
+            <a:r>
+              <a:rPr lang="en-US" dirty="0" err="1"/>
+              <a:t>enum</a:t>
+            </a:r>
+            <a:r>
+              <a:rPr lang="en-US" dirty="0"/>
+              <a:t>](https://</a:t>
+            </a:r>
+            <a:r>
+              <a:rPr lang="en-US" dirty="0" err="1"/>
+              <a:t>docs.microsoft.com</a:t>
+            </a:r>
+            <a:r>
+              <a:rPr lang="en-US" dirty="0"/>
+              <a:t>/</a:t>
+            </a:r>
+            <a:r>
+              <a:rPr lang="en-US" dirty="0" err="1"/>
+              <a:t>javascript</a:t>
+            </a:r>
+            <a:r>
+              <a:rPr lang="en-US" dirty="0"/>
+              <a:t>/</a:t>
+            </a:r>
+            <a:r>
+              <a:rPr lang="en-US" dirty="0" err="1"/>
+              <a:t>api</a:t>
+            </a:r>
+            <a:r>
+              <a:rPr lang="en-US" dirty="0"/>
+              <a:t>/excel/</a:t>
+            </a:r>
+            <a:r>
+              <a:rPr lang="en-US" dirty="0" err="1"/>
+              <a:t>excel.charttype</a:t>
+            </a:r>
+            <a:r>
+              <a:rPr lang="en-US" dirty="0"/>
+              <a:t>).</a:t>
+            </a:r>
+          </a:p>
+          <a:p>
+            <a:endParaRPr lang="en-US" dirty="0"/>
+          </a:p>
+          <a:p>
+            <a:r>
+              <a:rPr lang="en-US" dirty="0"/>
+              <a:t>The `</a:t>
+            </a:r>
+            <a:r>
+              <a:rPr lang="en-US" dirty="0" err="1"/>
+              <a:t>ChartSeriesBy</a:t>
+            </a:r>
+            <a:r>
+              <a:rPr lang="en-US" dirty="0"/>
+              <a:t>` argument specifies whether the series are by rows or by columns. Refer to the SDK for the available options on the [</a:t>
+            </a:r>
+            <a:r>
+              <a:rPr lang="en-US" dirty="0" err="1"/>
+              <a:t>Excel.ChartSeriesBy</a:t>
+            </a:r>
+            <a:r>
+              <a:rPr lang="en-US" dirty="0"/>
+              <a:t> </a:t>
+            </a:r>
+            <a:r>
+              <a:rPr lang="en-US" dirty="0" err="1"/>
+              <a:t>enum</a:t>
+            </a:r>
+            <a:r>
+              <a:rPr lang="en-US" dirty="0"/>
+              <a:t>](https://</a:t>
+            </a:r>
+            <a:r>
+              <a:rPr lang="en-US" dirty="0" err="1"/>
+              <a:t>docs.microsoft.com</a:t>
+            </a:r>
+            <a:r>
+              <a:rPr lang="en-US" dirty="0"/>
+              <a:t>/</a:t>
+            </a:r>
+            <a:r>
+              <a:rPr lang="en-US" dirty="0" err="1"/>
+              <a:t>javascript</a:t>
+            </a:r>
+            <a:r>
+              <a:rPr lang="en-US" dirty="0"/>
+              <a:t>/</a:t>
+            </a:r>
+            <a:r>
+              <a:rPr lang="en-US" dirty="0" err="1"/>
+              <a:t>api</a:t>
+            </a:r>
+            <a:r>
+              <a:rPr lang="en-US" dirty="0"/>
+              <a:t>/excel/</a:t>
+            </a:r>
+            <a:r>
+              <a:rPr lang="en-US" dirty="0" err="1"/>
+              <a:t>excel.chartseriesby</a:t>
+            </a:r>
+            <a:r>
+              <a:rPr lang="en-US" dirty="0"/>
+              <a:t>).</a:t>
             </a:r>
           </a:p>
         </p:txBody>
@@ -2204,7 +2481,7 @@
           <a:p>
             <a:fld id="{D18B56EA-E28F-4F92-9F16-7A6F2501B303}" type="datetime8">
               <a:rPr lang="en-US" smtClean="0"/>
-              <a:t>3/3/20 8:50 PM</a:t>
+              <a:t>4/6/20 10:54 AM</a:t>
             </a:fld>
             <a:endParaRPr lang="en-US" dirty="0"/>
           </a:p>
@@ -2396,7 +2673,7 @@
           <a:p>
             <a:fld id="{D18B56EA-E28F-4F92-9F16-7A6F2501B303}" type="datetime8">
               <a:rPr lang="en-US" smtClean="0"/>
-              <a:t>3/3/20 8:50 PM</a:t>
+              <a:t>4/6/20 6:02 AM</a:t>
             </a:fld>
             <a:endParaRPr lang="en-US" dirty="0"/>
           </a:p>
@@ -2580,7 +2857,7 @@
           <a:p>
             <a:fld id="{D18B56EA-E28F-4F92-9F16-7A6F2501B303}" type="datetime8">
               <a:rPr lang="en-US" smtClean="0"/>
-              <a:t>3/3/20 8:50 PM</a:t>
+              <a:t>4/6/20 6:02 AM</a:t>
             </a:fld>
             <a:endParaRPr lang="en-US" dirty="0"/>
           </a:p>
@@ -2866,7 +3143,7 @@
           <a:p>
             <a:fld id="{D18B56EA-E28F-4F92-9F16-7A6F2501B303}" type="datetime8">
               <a:rPr lang="en-US" smtClean="0"/>
-              <a:t>3/3/20 8:50 PM</a:t>
+              <a:t>4/6/20 6:02 AM</a:t>
             </a:fld>
             <a:endParaRPr lang="en-US" dirty="0"/>
           </a:p>
@@ -3712,7 +3989,7 @@
           <a:p>
             <a:fld id="{D18B56EA-E28F-4F92-9F16-7A6F2501B303}" type="datetime8">
               <a:rPr lang="en-US" smtClean="0"/>
-              <a:t>3/3/20 8:50 PM</a:t>
+              <a:t>4/6/20 6:02 AM</a:t>
             </a:fld>
             <a:endParaRPr lang="en-US" dirty="0"/>
           </a:p>
@@ -3893,7 +4170,7 @@
           <a:p>
             <a:fld id="{D18B56EA-E28F-4F92-9F16-7A6F2501B303}" type="datetime8">
               <a:rPr lang="en-US" smtClean="0"/>
-              <a:t>3/3/20 8:50 PM</a:t>
+              <a:t>4/6/20 6:02 AM</a:t>
             </a:fld>
             <a:endParaRPr lang="en-US" dirty="0"/>
           </a:p>
@@ -4074,7 +4351,7 @@
           <a:p>
             <a:fld id="{D18B56EA-E28F-4F92-9F16-7A6F2501B303}" type="datetime8">
               <a:rPr lang="en-US" smtClean="0"/>
-              <a:t>3/3/20 8:50 PM</a:t>
+              <a:t>4/6/20 6:02 AM</a:t>
             </a:fld>
             <a:endParaRPr lang="en-US" dirty="0"/>
           </a:p>
@@ -4161,6 +4438,12 @@
           <a:bodyPr/>
           <a:lstStyle/>
           <a:p>
+            <a:r>
+              <a:rPr lang="en-US" dirty="0"/>
+              <a:t>The Excel JavaScript API makes programmatic control over text, tables, and charts in Excel workbooks. In this unit, you'll learn how to work with tables including formatting options, how to filter data, and sort the data within the table. You'll also learn how to add and customize charts to your worksheets.</a:t>
+            </a:r>
+          </a:p>
+          <a:p>
             <a:endParaRPr lang="en-US" dirty="0"/>
           </a:p>
         </p:txBody>
@@ -4360,7 +4643,7 @@
                 <a:tabLst/>
                 <a:defRPr/>
               </a:pPr>
-              <a:t>3/3/20 8:50 PM</a:t>
+              <a:t>4/6/20 6:52 AM</a:t>
             </a:fld>
             <a:endParaRPr kumimoji="0" lang="en-US" sz="1200" b="0" i="0" u="none" strike="noStrike" kern="1200" cap="none" spc="0" normalizeH="0" baseline="0" noProof="0" dirty="0">
               <a:ln>
@@ -4613,7 +4896,7 @@
           <a:p>
             <a:fld id="{D18B56EA-E28F-4F92-9F16-7A6F2501B303}" type="datetime8">
               <a:rPr lang="en-US" smtClean="0"/>
-              <a:t>3/3/20 8:50 PM</a:t>
+              <a:t>4/6/20 6:02 AM</a:t>
             </a:fld>
             <a:endParaRPr lang="en-US" dirty="0"/>
           </a:p>
@@ -4791,7 +5074,34 @@
           <a:p>
             <a:r>
               <a:rPr lang="en-US" dirty="0"/>
-              <a:t>The Office 365 Platform offers a number of canvases for developers to embed customizations. Office add-ins are one of those canvases.</a:t>
+              <a:t>The Microsoft Office 365 platform offers a number of canvases for developers to embed customizations and Office add-ins are one of three canvases: documents, conversations  and pages.</a:t>
+            </a:r>
+          </a:p>
+          <a:p>
+            <a:endParaRPr lang="en-US" dirty="0"/>
+          </a:p>
+          <a:p>
+            <a:r>
+              <a:rPr lang="en-US" dirty="0"/>
+              <a:t>Microsoft Teams makes conversations between users and enables developers to extend the experience using messaging extensions, conversational bots, and other customization options.</a:t>
+            </a:r>
+          </a:p>
+          <a:p>
+            <a:endParaRPr lang="en-US" dirty="0"/>
+          </a:p>
+          <a:p>
+            <a:r>
+              <a:rPr lang="en-US" dirty="0"/>
+              <a:t>Developers customize pages in SharePoint Server and SharePoint online using the SharePoint Framework.</a:t>
+            </a:r>
+          </a:p>
+          <a:p>
+            <a:endParaRPr lang="en-US" dirty="0"/>
+          </a:p>
+          <a:p>
+            <a:r>
+              <a:rPr lang="en-US" dirty="0"/>
+              <a:t>Office clients, such as Word, Excel, PowerPoint, OneNote, and Outlook can also be extended to implement custom task panes, actions, and additional customizations using add-ins.</a:t>
             </a:r>
           </a:p>
         </p:txBody>
@@ -4853,13 +5163,38 @@
           <a:bodyPr/>
           <a:lstStyle/>
           <a:p>
-            <a:pPr marL="228600" indent="-228600">
+            <a:pPr marL="0" indent="0">
               <a:buFont typeface="+mj-lt"/>
-              <a:buAutoNum type="arabicPeriod"/>
+              <a:buNone/>
             </a:pPr>
             <a:r>
               <a:rPr lang="en-US" dirty="0"/>
-              <a:t>All Office add-ins must call </a:t>
+              <a:t>We'll start by looking at an anatomy of an </a:t>
+            </a:r>
+            <a:r>
+              <a:rPr lang="en-US" dirty="0" err="1"/>
+              <a:t>Office.js</a:t>
+            </a:r>
+            <a:r>
+              <a:rPr lang="en-US" dirty="0"/>
+              <a:t> for Microsoft Excel:</a:t>
+            </a:r>
+          </a:p>
+          <a:p>
+            <a:pPr marL="0" indent="0">
+              <a:buFont typeface="+mj-lt"/>
+              <a:buNone/>
+            </a:pPr>
+            <a:endParaRPr lang="en-US" dirty="0"/>
+          </a:p>
+          <a:p>
+            <a:pPr marL="0" indent="0">
+              <a:buFont typeface="+mj-lt"/>
+              <a:buNone/>
+            </a:pPr>
+            <a:r>
+              <a:rPr lang="en-US" dirty="0"/>
+              <a:t>- All Office add-ins must call off the `</a:t>
             </a:r>
             <a:r>
               <a:rPr lang="en-US" dirty="0" err="1"/>
@@ -4867,17 +5202,17 @@
             </a:r>
             <a:r>
               <a:rPr lang="en-US" dirty="0"/>
-              <a:t> when a page first loads in the add-in</a:t>
-            </a:r>
-          </a:p>
-          <a:p>
-            <a:pPr marL="228600" indent="-228600">
+              <a:t>()` method when a page first loads the add-in.</a:t>
+            </a:r>
+          </a:p>
+          <a:p>
+            <a:pPr marL="0" indent="0">
               <a:buFont typeface="+mj-lt"/>
-              <a:buAutoNum type="arabicPeriod"/>
+              <a:buNone/>
             </a:pPr>
             <a:r>
               <a:rPr lang="en-US" dirty="0"/>
-              <a:t>If using newer </a:t>
+              <a:t>- If you're using a newer </a:t>
             </a:r>
             <a:r>
               <a:rPr lang="en-US" dirty="0" err="1"/>
@@ -4885,25 +5220,17 @@
             </a:r>
             <a:r>
               <a:rPr lang="en-US" dirty="0"/>
-              <a:t> capabilities, it is important to check if the client supports those extensions. You can check this using the </a:t>
-            </a:r>
-            <a:r>
-              <a:rPr lang="en-US" dirty="0" err="1"/>
-              <a:t>requirements.isSetSupported</a:t>
-            </a:r>
-            <a:r>
-              <a:rPr lang="en-US" dirty="0"/>
-              <a:t> operation.</a:t>
-            </a:r>
-          </a:p>
-          <a:p>
-            <a:pPr marL="228600" indent="-228600">
+              <a:t> capability in your add-in, it's important to check if the client supports those extensions using the `requirements` API.</a:t>
+            </a:r>
+          </a:p>
+          <a:p>
+            <a:pPr marL="0" indent="0">
               <a:buFont typeface="+mj-lt"/>
-              <a:buAutoNum type="arabicPeriod"/>
+              <a:buNone/>
             </a:pPr>
             <a:r>
               <a:rPr lang="en-US" dirty="0"/>
-              <a:t>For Excel JavaScript APIs, you should get context using the </a:t>
+              <a:t>- For the Excel JavaScript APIs, you'll use the `</a:t>
             </a:r>
             <a:r>
               <a:rPr lang="en-US" dirty="0" err="1"/>
@@ -4911,27 +5238,45 @@
             </a:r>
             <a:r>
               <a:rPr lang="en-US" dirty="0"/>
-              <a:t> operation.</a:t>
-            </a:r>
-          </a:p>
-          <a:p>
-            <a:pPr marL="228600" indent="-228600">
+              <a:t>()` method to get an instance of the current document `context`.</a:t>
+            </a:r>
+          </a:p>
+          <a:p>
+            <a:pPr marL="0" indent="0">
               <a:buFont typeface="+mj-lt"/>
-              <a:buAutoNum type="arabicPeriod"/>
+              <a:buNone/>
             </a:pPr>
             <a:r>
               <a:rPr lang="en-US" dirty="0"/>
-              <a:t>Using the context, you can load any properties you might need to work with.</a:t>
-            </a:r>
-          </a:p>
-          <a:p>
-            <a:pPr marL="228600" indent="-228600">
+              <a:t>- Once you have a reference to the current Excel document's `context`, you can load any properties on the context using the `load()` method. This method will add the request queue, allowing you to chain multiple requests together for performance reasons.</a:t>
+            </a:r>
+          </a:p>
+          <a:p>
+            <a:pPr marL="0" indent="0">
               <a:buFont typeface="+mj-lt"/>
-              <a:buAutoNum type="arabicPeriod"/>
+              <a:buNone/>
             </a:pPr>
             <a:r>
               <a:rPr lang="en-US" dirty="0"/>
-              <a:t>Calling </a:t>
+              <a:t>- When you're ready to retrieve the properties you queued, or to do any queued actions, use </a:t>
+            </a:r>
+            <a:r>
+              <a:rPr lang="en-US" dirty="0" err="1"/>
+              <a:t>the`context.sync</a:t>
+            </a:r>
+            <a:r>
+              <a:rPr lang="en-US" dirty="0"/>
+              <a:t>()` method to execute the batch of queued operations defined using the `load()` method.</a:t>
+            </a:r>
+          </a:p>
+          <a:p>
+            <a:pPr marL="0" indent="0">
+              <a:buFont typeface="+mj-lt"/>
+              <a:buNone/>
+            </a:pPr>
+            <a:r>
+              <a:rPr lang="en-US" dirty="0"/>
+              <a:t>- The `</a:t>
             </a:r>
             <a:r>
               <a:rPr lang="en-US" dirty="0" err="1"/>
@@ -4939,31 +5284,17 @@
             </a:r>
             <a:r>
               <a:rPr lang="en-US" dirty="0"/>
-              <a:t> will execute a batch of operations.</a:t>
-            </a:r>
-          </a:p>
-          <a:p>
-            <a:pPr marL="228600" indent="-228600">
+              <a:t>()` method returns a JavaScript promise that can be used to get results or a previous operation and do new operations.</a:t>
+            </a:r>
+          </a:p>
+          <a:p>
+            <a:pPr marL="0" indent="0">
               <a:buFont typeface="+mj-lt"/>
-              <a:buAutoNum type="arabicPeriod"/>
+              <a:buNone/>
             </a:pPr>
             <a:r>
-              <a:rPr lang="en-US" dirty="0" err="1"/>
-              <a:t>Context.sync</a:t>
-            </a:r>
-            <a:r>
-              <a:rPr lang="en-US" dirty="0"/>
-              <a:t> returns a promise that can be used to get results or a previous operation and/or perform new operations.</a:t>
-            </a:r>
-          </a:p>
-          <a:p>
-            <a:pPr marL="228600" indent="-228600">
-              <a:buFont typeface="+mj-lt"/>
-              <a:buAutoNum type="arabicPeriod"/>
-            </a:pPr>
-            <a:r>
-              <a:rPr lang="en-US" dirty="0"/>
-              <a:t>It is a best practice to catch and handle errors that might occur when working with the Excel APIs</a:t>
+              <a:rPr lang="en-US" dirty="0"/>
+              <a:t>- As a best practice, you should listen for, catch, and handle any errors that might occur when working with the Excel JavaScript APIs.</a:t>
             </a:r>
           </a:p>
         </p:txBody>
@@ -5058,7 +5389,7 @@
           <a:p>
             <a:fld id="{D18B56EA-E28F-4F92-9F16-7A6F2501B303}" type="datetime8">
               <a:rPr lang="en-US" smtClean="0"/>
-              <a:t>3/3/20 8:50 PM</a:t>
+              <a:t>4/6/20 6:51 AM</a:t>
             </a:fld>
             <a:endParaRPr lang="en-US" dirty="0"/>
           </a:p>
@@ -5147,7 +5478,15 @@
           <a:p>
             <a:r>
               <a:rPr lang="en-US" dirty="0"/>
-              <a:t>Before manipulating a Excel workbook, it is important to understand it’s hierarchy and how that relates to the objects you will work with in </a:t>
+              <a:t>Excel add-in developers should understand an Excel </a:t>
+            </a:r>
+            <a:r>
+              <a:rPr lang="en-US" dirty="0" err="1"/>
+              <a:t>workbook's's</a:t>
+            </a:r>
+            <a:r>
+              <a:rPr lang="en-US" dirty="0"/>
+              <a:t> hierarchy and how that relates to the objects in </a:t>
             </a:r>
             <a:r>
               <a:rPr lang="en-US" dirty="0" err="1"/>
@@ -5159,17 +5498,25 @@
             </a:r>
           </a:p>
           <a:p>
-            <a:r>
-              <a:rPr lang="en-US" dirty="0"/>
-              <a:t>As seen in the previous slide, </a:t>
-            </a:r>
+            <a:endParaRPr lang="en-US" dirty="0"/>
+          </a:p>
+          <a:p>
+            <a:r>
+              <a:rPr lang="en-US" dirty="0"/>
+              <a:t>### Hierarchy of a workbook</a:t>
+            </a:r>
+          </a:p>
+          <a:p>
+            <a:endParaRPr lang="en-US" dirty="0"/>
+          </a:p>
+          <a:p>
             <a:r>
               <a:rPr lang="en-US" dirty="0" err="1"/>
               <a:t>Office.js</a:t>
             </a:r>
             <a:r>
               <a:rPr lang="en-US" dirty="0"/>
-              <a:t> provides context to an add-in via </a:t>
+              <a:t> provides context to an Excel workbook through </a:t>
             </a:r>
             <a:r>
               <a:rPr lang="en-US" dirty="0" err="1"/>
@@ -5177,305 +5524,152 @@
             </a:r>
             <a:r>
               <a:rPr lang="en-US" dirty="0"/>
-              <a:t>…that context contains a workbook property.</a:t>
-            </a:r>
-          </a:p>
-          <a:p>
-            <a:pPr marL="0" marR="0" lvl="0" indent="0" algn="l" defTabSz="932742" rtl="0" eaLnBrk="1" fontAlgn="auto" latinLnBrk="0" hangingPunct="1">
-              <a:lnSpc>
-                <a:spcPct val="90000"/>
-              </a:lnSpc>
-              <a:spcBef>
-                <a:spcPts val="0"/>
-              </a:spcBef>
-              <a:spcAft>
-                <a:spcPts val="340"/>
-              </a:spcAft>
-              <a:buClrTx/>
-              <a:buSzTx/>
-              <a:buFontTx/>
-              <a:buNone/>
-              <a:tabLst/>
-              <a:defRPr/>
-            </a:pPr>
-            <a:r>
-              <a:rPr lang="en-US" dirty="0"/>
-              <a:t>A workbook </a:t>
-            </a:r>
-            <a:r>
-              <a:rPr lang="en-US" sz="900" kern="1200" dirty="0">
-                <a:solidFill>
-                  <a:srgbClr val="2F2F2F"/>
-                </a:solidFill>
-                <a:latin typeface="Segoe UI Light" pitchFamily="34" charset="0"/>
-                <a:ea typeface="+mn-ea"/>
-                <a:cs typeface="+mn-cs"/>
-              </a:rPr>
-              <a:t>contains worksheets, which contains a number of collections, including charts, tables, </a:t>
-            </a:r>
-            <a:r>
-              <a:rPr lang="en-US" sz="900" kern="1200" dirty="0" err="1">
-                <a:solidFill>
-                  <a:srgbClr val="2F2F2F"/>
-                </a:solidFill>
-                <a:latin typeface="Segoe UI Light" pitchFamily="34" charset="0"/>
-                <a:ea typeface="+mn-ea"/>
-                <a:cs typeface="+mn-cs"/>
-              </a:rPr>
+              <a:t> and the </a:t>
+            </a:r>
+            <a:r>
+              <a:rPr lang="en-US" dirty="0" err="1"/>
+              <a:t>context.workbook</a:t>
+            </a:r>
+            <a:r>
+              <a:rPr lang="en-US" dirty="0"/>
+              <a:t> property.</a:t>
+            </a:r>
+          </a:p>
+          <a:p>
+            <a:endParaRPr lang="en-US" dirty="0"/>
+          </a:p>
+          <a:p>
+            <a:r>
+              <a:rPr lang="en-US" dirty="0"/>
+              <a:t>The workbook contains worksheets that contain a number of collections. These collections include things such as charts, tables, and </a:t>
+            </a:r>
+            <a:r>
+              <a:rPr lang="en-US" dirty="0" err="1"/>
               <a:t>pivotTables</a:t>
             </a:r>
             <a:r>
-              <a:rPr lang="en-US" sz="900" kern="1200" dirty="0">
-                <a:solidFill>
-                  <a:srgbClr val="2F2F2F"/>
-                </a:solidFill>
-                <a:latin typeface="Segoe UI Light" pitchFamily="34" charset="0"/>
-                <a:ea typeface="+mn-ea"/>
-                <a:cs typeface="+mn-cs"/>
-              </a:rPr>
-              <a:t>, and more</a:t>
-            </a:r>
-            <a:r>
               <a:rPr lang="en-US" dirty="0"/>
               <a:t>.</a:t>
             </a:r>
           </a:p>
           <a:p>
+            <a:endParaRPr lang="en-US" dirty="0"/>
+          </a:p>
+          <a:p>
+            <a:r>
+              <a:rPr lang="en-US" dirty="0"/>
+              <a:t>Many objects within a worksheet can be accessed directly from the workbook object, including tables and </a:t>
+            </a:r>
+            <a:r>
+              <a:rPr lang="en-US" dirty="0" err="1"/>
+              <a:t>pivotTables</a:t>
+            </a:r>
+            <a:r>
+              <a:rPr lang="en-US" dirty="0"/>
+              <a:t>.</a:t>
+            </a:r>
+          </a:p>
+          <a:p>
+            <a:endParaRPr lang="en-US" dirty="0"/>
+          </a:p>
+          <a:p>
+            <a:r>
+              <a:rPr lang="en-US" dirty="0"/>
+              <a:t>### Worksheets</a:t>
+            </a:r>
+          </a:p>
+          <a:p>
+            <a:endParaRPr lang="en-US" dirty="0"/>
+          </a:p>
+          <a:p>
+            <a:r>
+              <a:rPr lang="en-US" dirty="0"/>
+              <a:t>Worksheets are aware of their siblings using `</a:t>
+            </a:r>
+            <a:r>
+              <a:rPr lang="en-US" dirty="0" err="1"/>
+              <a:t>getNext</a:t>
+            </a:r>
+            <a:r>
+              <a:rPr lang="en-US" dirty="0"/>
+              <a:t>()` and `</a:t>
+            </a:r>
+            <a:r>
+              <a:rPr lang="en-US" dirty="0" err="1"/>
+              <a:t>getPrevious</a:t>
+            </a:r>
+            <a:r>
+              <a:rPr lang="en-US" dirty="0"/>
+              <a:t>()` methods.</a:t>
+            </a:r>
+          </a:p>
+          <a:p>
+            <a:endParaRPr lang="en-US" dirty="0"/>
+          </a:p>
+          <a:p>
+            <a:r>
+              <a:rPr lang="en-US" dirty="0"/>
+              <a:t>You can get the active worksheet using the `</a:t>
+            </a:r>
+            <a:r>
+              <a:rPr lang="en-US" dirty="0" err="1"/>
+              <a:t>workbook.worksheets.getActiveWorkshee</a:t>
+            </a:r>
+            <a:r>
+              <a:rPr lang="en-US" dirty="0"/>
+              <a:t>()` method and set the active worksheet using `</a:t>
+            </a:r>
+            <a:r>
+              <a:rPr lang="en-US" dirty="0" err="1"/>
+              <a:t>worksheet.activate</a:t>
+            </a:r>
+            <a:r>
+              <a:rPr lang="en-US" dirty="0"/>
+              <a:t>()` method.</a:t>
+            </a:r>
+          </a:p>
+          <a:p>
+            <a:endParaRPr lang="en-US" dirty="0"/>
+          </a:p>
+          <a:p>
             <a:r>
               <a:rPr lang="en-US" dirty="0" err="1"/>
               <a:t>Office.js</a:t>
             </a:r>
             <a:r>
               <a:rPr lang="en-US" dirty="0"/>
-              <a:t> allows you to easily traverse and manipulate this hierarchy.</a:t>
-            </a:r>
-          </a:p>
-          <a:p>
-            <a:pPr marL="0" marR="0" lvl="0" indent="0" algn="l" defTabSz="932742" rtl="0" eaLnBrk="1" fontAlgn="auto" latinLnBrk="0" hangingPunct="1">
-              <a:lnSpc>
-                <a:spcPct val="90000"/>
-              </a:lnSpc>
-              <a:spcBef>
-                <a:spcPts val="0"/>
-              </a:spcBef>
-              <a:spcAft>
-                <a:spcPts val="340"/>
-              </a:spcAft>
-              <a:buClrTx/>
-              <a:buSzTx/>
-              <a:buFontTx/>
-              <a:buNone/>
-              <a:tabLst/>
-              <a:defRPr/>
-            </a:pPr>
-            <a:r>
-              <a:rPr lang="en-US" sz="900" kern="1200" dirty="0">
-                <a:solidFill>
-                  <a:srgbClr val="2F2F2F"/>
-                </a:solidFill>
-                <a:latin typeface="Segoe UI Light" pitchFamily="34" charset="0"/>
-                <a:ea typeface="+mn-ea"/>
-                <a:cs typeface="+mn-cs"/>
-              </a:rPr>
-              <a:t>Many objects within a worksheet can be accessed directly from the workbook object, including tables and </a:t>
-            </a:r>
-            <a:r>
-              <a:rPr lang="en-US" sz="900" kern="1200" dirty="0" err="1">
-                <a:solidFill>
-                  <a:srgbClr val="2F2F2F"/>
-                </a:solidFill>
-                <a:latin typeface="Segoe UI Light" pitchFamily="34" charset="0"/>
-                <a:ea typeface="+mn-ea"/>
-                <a:cs typeface="+mn-cs"/>
-              </a:rPr>
-              <a:t>pivotTables</a:t>
-            </a:r>
-            <a:r>
-              <a:rPr lang="en-US" sz="900" kern="1200" dirty="0">
-                <a:solidFill>
-                  <a:srgbClr val="2F2F2F"/>
-                </a:solidFill>
-                <a:latin typeface="Segoe UI Light" pitchFamily="34" charset="0"/>
-                <a:ea typeface="+mn-ea"/>
-                <a:cs typeface="+mn-cs"/>
-              </a:rPr>
-              <a:t>.</a:t>
-            </a:r>
-            <a:endParaRPr lang="en-US" dirty="0"/>
-          </a:p>
-          <a:p>
-            <a:r>
-              <a:rPr lang="en-US" dirty="0"/>
-              <a:t>Worksheets are aware of their siblings, with abilities to </a:t>
-            </a:r>
-            <a:r>
-              <a:rPr lang="en-US" dirty="0" err="1"/>
-              <a:t>getNext</a:t>
-            </a:r>
-            <a:r>
-              <a:rPr lang="en-US" dirty="0"/>
-              <a:t> and </a:t>
-            </a:r>
-            <a:r>
-              <a:rPr lang="en-US" dirty="0" err="1"/>
-              <a:t>getPrevious</a:t>
-            </a:r>
-            <a:endParaRPr lang="en-US" dirty="0"/>
-          </a:p>
-          <a:p>
-            <a:pPr marL="0" marR="0" lvl="0" indent="0" algn="l" defTabSz="932742" rtl="0" eaLnBrk="1" fontAlgn="auto" latinLnBrk="0" hangingPunct="1">
-              <a:lnSpc>
-                <a:spcPct val="90000"/>
-              </a:lnSpc>
-              <a:spcBef>
-                <a:spcPts val="0"/>
-              </a:spcBef>
-              <a:spcAft>
-                <a:spcPts val="340"/>
-              </a:spcAft>
-              <a:buClrTx/>
-              <a:buSzTx/>
-              <a:buFontTx/>
-              <a:buNone/>
-              <a:tabLst/>
-              <a:defRPr/>
-            </a:pPr>
-            <a:r>
-              <a:rPr lang="en-US" sz="900" dirty="0">
-                <a:solidFill>
-                  <a:srgbClr val="2F2F2F"/>
-                </a:solidFill>
-                <a:latin typeface="Segoe UI Semibold"/>
-              </a:rPr>
-              <a:t>You can get the active worksheet using </a:t>
-            </a:r>
-            <a:r>
-              <a:rPr lang="en-US" sz="900" dirty="0" err="1">
-                <a:solidFill>
-                  <a:srgbClr val="2F2F2F"/>
-                </a:solidFill>
-                <a:latin typeface="Segoe UI Semibold"/>
-              </a:rPr>
-              <a:t>workbook.worksheets.getActiveWorkshee</a:t>
-            </a:r>
-            <a:r>
-              <a:rPr lang="en-US" sz="900" dirty="0">
-                <a:solidFill>
-                  <a:srgbClr val="2F2F2F"/>
-                </a:solidFill>
-                <a:latin typeface="Segoe UI Semibold"/>
-              </a:rPr>
-              <a:t>() and set the active worksheet using </a:t>
-            </a:r>
-            <a:r>
-              <a:rPr lang="en-US" sz="900" dirty="0" err="1">
-                <a:solidFill>
-                  <a:srgbClr val="2F2F2F"/>
-                </a:solidFill>
-                <a:latin typeface="Segoe UI Semibold"/>
-              </a:rPr>
-              <a:t>worksheet.activate</a:t>
-            </a:r>
-            <a:r>
-              <a:rPr lang="en-US" sz="900" dirty="0">
-                <a:solidFill>
-                  <a:srgbClr val="2F2F2F"/>
-                </a:solidFill>
-                <a:latin typeface="Segoe UI Semibold"/>
-              </a:rPr>
-              <a:t>().</a:t>
-            </a:r>
-          </a:p>
-          <a:p>
-            <a:pPr marL="0" marR="0" lvl="0" indent="0" algn="l" defTabSz="932742" rtl="0" eaLnBrk="1" fontAlgn="auto" latinLnBrk="0" hangingPunct="1">
-              <a:lnSpc>
-                <a:spcPct val="90000"/>
-              </a:lnSpc>
-              <a:spcBef>
-                <a:spcPts val="0"/>
-              </a:spcBef>
-              <a:spcAft>
-                <a:spcPts val="340"/>
-              </a:spcAft>
-              <a:buClrTx/>
-              <a:buSzTx/>
-              <a:buFontTx/>
-              <a:buNone/>
-              <a:tabLst/>
-              <a:defRPr/>
-            </a:pPr>
-            <a:r>
-              <a:rPr lang="en-US" sz="900" dirty="0" err="1">
-                <a:solidFill>
-                  <a:srgbClr val="2F2F2F"/>
-                </a:solidFill>
-                <a:latin typeface="Segoe UI Semibold"/>
-              </a:rPr>
-              <a:t>Office.js</a:t>
-            </a:r>
-            <a:r>
-              <a:rPr lang="en-US" sz="900" dirty="0">
-                <a:solidFill>
-                  <a:srgbClr val="2F2F2F"/>
-                </a:solidFill>
-                <a:latin typeface="Segoe UI Semibold"/>
-              </a:rPr>
-              <a:t> also offers a number of events that developers can hook into for various worksheet actions by a user including </a:t>
-            </a:r>
-            <a:r>
-              <a:rPr lang="en-US" sz="900" dirty="0" err="1">
-                <a:solidFill>
-                  <a:srgbClr val="2F2F2F"/>
-                </a:solidFill>
-                <a:latin typeface="Segoe UI Semibold"/>
-              </a:rPr>
+              <a:t> also offers a number of worksheet events such as `</a:t>
+            </a:r>
+            <a:r>
+              <a:rPr lang="en-US" dirty="0" err="1"/>
               <a:t>onActivated</a:t>
             </a:r>
             <a:r>
-              <a:rPr lang="en-US" sz="900" dirty="0">
-                <a:solidFill>
-                  <a:srgbClr val="2F2F2F"/>
-                </a:solidFill>
-                <a:latin typeface="Segoe UI Semibold"/>
-              </a:rPr>
-              <a:t>, </a:t>
-            </a:r>
-            <a:r>
-              <a:rPr lang="en-US" sz="900" dirty="0" err="1">
-                <a:solidFill>
-                  <a:srgbClr val="2F2F2F"/>
-                </a:solidFill>
-                <a:latin typeface="Segoe UI Semibold"/>
-              </a:rPr>
+              <a:rPr lang="en-US" dirty="0"/>
+              <a:t>`, `</a:t>
+            </a:r>
+            <a:r>
+              <a:rPr lang="en-US" dirty="0" err="1"/>
               <a:t>onDeactivated</a:t>
             </a:r>
             <a:r>
-              <a:rPr lang="en-US" sz="900" dirty="0">
-                <a:solidFill>
-                  <a:srgbClr val="2F2F2F"/>
-                </a:solidFill>
-                <a:latin typeface="Segoe UI Semibold"/>
-              </a:rPr>
-              <a:t>, </a:t>
-            </a:r>
-            <a:r>
-              <a:rPr lang="en-US" sz="900" dirty="0" err="1">
-                <a:solidFill>
-                  <a:srgbClr val="2F2F2F"/>
-                </a:solidFill>
-                <a:latin typeface="Segoe UI Semibold"/>
-              </a:rPr>
+              <a:rPr lang="en-US" dirty="0"/>
+              <a:t>`, and `</a:t>
+            </a:r>
+            <a:r>
+              <a:rPr lang="en-US" dirty="0" err="1"/>
               <a:t>onSelectionChanged</a:t>
             </a:r>
             <a:r>
-              <a:rPr lang="en-US" sz="900" dirty="0">
-                <a:solidFill>
-                  <a:srgbClr val="2F2F2F"/>
-                </a:solidFill>
-                <a:latin typeface="Segoe UI Semibold"/>
-              </a:rPr>
-              <a:t> and more.</a:t>
-            </a:r>
+              <a:rPr lang="en-US" dirty="0"/>
+              <a:t>` that developers can use in their custom add-ins.</a:t>
+            </a:r>
+            <a:endParaRPr lang="en-US" sz="900" dirty="0">
+              <a:solidFill>
+                <a:srgbClr val="2F2F2F"/>
+              </a:solidFill>
+              <a:latin typeface="Segoe UI Semibold"/>
+            </a:endParaRPr>
           </a:p>
         </p:txBody>
       </p:sp>
@@ -5674,7 +5868,7 @@
                 <a:tabLst/>
                 <a:defRPr/>
               </a:pPr>
-              <a:t>3/3/20 8:50 PM</a:t>
+              <a:t>4/6/20 7:10 AM</a:t>
             </a:fld>
             <a:endParaRPr kumimoji="0" lang="en-US" sz="1200" b="0" i="0" u="none" strike="noStrike" kern="1200" cap="none" spc="0" normalizeH="0" baseline="0" noProof="0" dirty="0">
               <a:ln>
@@ -5848,7 +6042,7 @@
                 </a:solidFill>
                 <a:latin typeface="Segoe UI Semibold"/>
               </a:rPr>
-              <a:t>Ranges</a:t>
+              <a:t>Tables are at the heart of a spreadsheet. Excel supports defining a range of data that is the foundation of a table of data.</a:t>
             </a:r>
           </a:p>
           <a:p>
@@ -5860,17 +6054,12 @@
                 <a:spcPts val="600"/>
               </a:spcBef>
             </a:pPr>
-            <a:r>
-              <a:rPr lang="en-US" sz="900" kern="1200" dirty="0">
-                <a:solidFill>
-                  <a:srgbClr val="2F2F2F"/>
-                </a:solidFill>
-                <a:latin typeface="Segoe UI Light" pitchFamily="34" charset="0"/>
-                <a:ea typeface="+mn-ea"/>
-                <a:cs typeface="+mn-cs"/>
-              </a:rPr>
-              <a:t>A range represents a set of one or more contiguous cells such as a cell, a row, a column, block of cells, etc.</a:t>
-            </a:r>
+            <a:endParaRPr lang="en-US" b="1" dirty="0">
+              <a:solidFill>
+                <a:srgbClr val="D83B01"/>
+              </a:solidFill>
+              <a:latin typeface="Segoe UI Semibold"/>
+            </a:endParaRPr>
           </a:p>
           <a:p>
             <a:pPr lvl="0">
@@ -5882,60 +6071,13 @@
               </a:spcBef>
             </a:pPr>
             <a:r>
-              <a:rPr lang="en-US" sz="900" dirty="0">
-                <a:solidFill>
-                  <a:srgbClr val="2F2F2F"/>
-                </a:solidFill>
-              </a:rPr>
-              <a:t>You can get a range object with </a:t>
-            </a:r>
-            <a:r>
-              <a:rPr lang="en-US" sz="900" dirty="0" err="1">
-                <a:solidFill>
-                  <a:srgbClr val="2F2F2F"/>
-                </a:solidFill>
-              </a:rPr>
-              <a:t>Office.js</a:t>
-            </a:r>
-            <a:r>
-              <a:rPr lang="en-US" sz="900" dirty="0">
-                <a:solidFill>
-                  <a:srgbClr val="2F2F2F"/>
-                </a:solidFill>
-              </a:rPr>
-              <a:t> using a worksheet and address (ex: “A1:D4” represents a range from </a:t>
-            </a:r>
-            <a:r>
-              <a:rPr lang="en-US" sz="900" dirty="0" err="1">
-                <a:solidFill>
-                  <a:srgbClr val="2F2F2F"/>
-                </a:solidFill>
-              </a:rPr>
-              <a:t>topLeft</a:t>
-            </a:r>
-            <a:r>
-              <a:rPr lang="en-US" sz="900" dirty="0">
-                <a:solidFill>
-                  <a:srgbClr val="2F2F2F"/>
-                </a:solidFill>
-              </a:rPr>
-              <a:t> to </a:t>
-            </a:r>
-            <a:r>
-              <a:rPr lang="en-US" sz="900" dirty="0" err="1">
-                <a:solidFill>
-                  <a:srgbClr val="2F2F2F"/>
-                </a:solidFill>
-              </a:rPr>
-              <a:t>bottomRight</a:t>
-            </a:r>
-            <a:r>
-              <a:rPr lang="en-US" sz="900" dirty="0">
-                <a:solidFill>
-                  <a:srgbClr val="2F2F2F"/>
-                </a:solidFill>
-              </a:rPr>
-              <a:t> cells)</a:t>
+              <a:rPr lang="en-US" b="1" dirty="0">
+                <a:solidFill>
+                  <a:srgbClr val="D83B01"/>
+                </a:solidFill>
+                <a:latin typeface="Segoe UI Semibold"/>
+              </a:rPr>
+              <a:t>### Ranges</a:t>
             </a:r>
           </a:p>
           <a:p>
@@ -5947,9 +6089,9 @@
                 <a:spcPts val="600"/>
               </a:spcBef>
             </a:pPr>
-            <a:endParaRPr lang="en-US" sz="900" dirty="0">
+            <a:endParaRPr lang="en-US" b="1" dirty="0">
               <a:solidFill>
-                <a:srgbClr val="2F2F2F"/>
+                <a:srgbClr val="D83B01"/>
               </a:solidFill>
               <a:latin typeface="Segoe UI Semibold"/>
             </a:endParaRPr>
@@ -5970,7 +6112,7 @@
                 </a:solidFill>
                 <a:latin typeface="Segoe UI Semibold"/>
               </a:rPr>
-              <a:t>Tables</a:t>
+              <a:t>A range represents a set of one or more contiguous cells such as a cell, a row, a column, block of cells, etc.</a:t>
             </a:r>
           </a:p>
           <a:p>
@@ -5982,14 +6124,12 @@
                 <a:spcPts val="600"/>
               </a:spcBef>
             </a:pPr>
-            <a:r>
-              <a:rPr lang="en-US" sz="900" dirty="0">
-                <a:solidFill>
-                  <a:srgbClr val="2F2F2F"/>
-                </a:solidFill>
-              </a:rPr>
-              <a:t>A table is established based on a range of data.</a:t>
-            </a:r>
+            <a:endParaRPr lang="en-US" b="1" dirty="0">
+              <a:solidFill>
+                <a:srgbClr val="D83B01"/>
+              </a:solidFill>
+              <a:latin typeface="Segoe UI Semibold"/>
+            </a:endParaRPr>
           </a:p>
           <a:p>
             <a:pPr lvl="0">
@@ -6001,31 +6141,31 @@
               </a:spcBef>
             </a:pPr>
             <a:r>
-              <a:rPr lang="en-US" sz="900" dirty="0">
-                <a:solidFill>
-                  <a:srgbClr val="2F2F2F"/>
+              <a:rPr lang="en-US" b="1" dirty="0">
+                <a:solidFill>
+                  <a:srgbClr val="D83B01"/>
                 </a:solidFill>
                 <a:latin typeface="Segoe UI Semibold"/>
               </a:rPr>
-              <a:t>The </a:t>
-            </a:r>
-            <a:r>
-              <a:rPr lang="en-US" sz="900" dirty="0" err="1">
-                <a:solidFill>
-                  <a:srgbClr val="2F2F2F"/>
+              <a:t>You can get a range object with </a:t>
+            </a:r>
+            <a:r>
+              <a:rPr lang="en-US" b="1" dirty="0" err="1">
+                <a:solidFill>
+                  <a:srgbClr val="D83B01"/>
                 </a:solidFill>
                 <a:latin typeface="Segoe UI Semibold"/>
               </a:rPr>
-              <a:t>tables.add</a:t>
-            </a:r>
-            <a:r>
-              <a:rPr lang="en-US" sz="900" dirty="0">
-                <a:solidFill>
-                  <a:srgbClr val="2F2F2F"/>
+              <a:t>Office.js</a:t>
+            </a:r>
+            <a:r>
+              <a:rPr lang="en-US" b="1" dirty="0">
+                <a:solidFill>
+                  <a:srgbClr val="D83B01"/>
                 </a:solidFill>
                 <a:latin typeface="Segoe UI Semibold"/>
               </a:rPr>
-              <a:t> function accepts a data range with a flag to indicate of the table has headers or not.</a:t>
+              <a:t> using a worksheet and address. For example, range "A1:D4" represents a range from top left to bottom right cells in this screenshot.</a:t>
             </a:r>
           </a:p>
           <a:p>
@@ -6037,15 +6177,12 @@
                 <a:spcPts val="600"/>
               </a:spcBef>
             </a:pPr>
-            <a:r>
-              <a:rPr lang="en-US" sz="900" dirty="0">
-                <a:solidFill>
-                  <a:srgbClr val="2F2F2F"/>
-                </a:solidFill>
-                <a:latin typeface="Segoe UI Semibold"/>
-              </a:rPr>
-              <a:t>Existing tables can be retrieved by name/id or iterated through.</a:t>
-            </a:r>
+            <a:endParaRPr lang="en-US" b="1" dirty="0">
+              <a:solidFill>
+                <a:srgbClr val="D83B01"/>
+              </a:solidFill>
+              <a:latin typeface="Segoe UI Semibold"/>
+            </a:endParaRPr>
           </a:p>
           <a:p>
             <a:pPr lvl="0">
@@ -6057,13 +6194,13 @@
               </a:spcBef>
             </a:pPr>
             <a:r>
-              <a:rPr lang="en-US" sz="900" dirty="0">
-                <a:solidFill>
-                  <a:srgbClr val="2F2F2F"/>
+              <a:rPr lang="en-US" b="1" dirty="0">
+                <a:solidFill>
+                  <a:srgbClr val="D83B01"/>
                 </a:solidFill>
                 <a:latin typeface="Segoe UI Semibold"/>
               </a:rPr>
-              <a:t>After the table is added, headers and table rows can be added using 2D arrays.</a:t>
+              <a:t>### Tables</a:t>
             </a:r>
           </a:p>
           <a:p>
@@ -6075,9 +6212,9 @@
                 <a:spcPts val="600"/>
               </a:spcBef>
             </a:pPr>
-            <a:endParaRPr lang="en-US" sz="900" dirty="0">
+            <a:endParaRPr lang="en-US" b="1" dirty="0">
               <a:solidFill>
-                <a:srgbClr val="2F2F2F"/>
+                <a:srgbClr val="D83B01"/>
               </a:solidFill>
               <a:latin typeface="Segoe UI Semibold"/>
             </a:endParaRPr>
@@ -6098,7 +6235,7 @@
                 </a:solidFill>
                 <a:latin typeface="Segoe UI Semibold"/>
               </a:rPr>
-              <a:t>Headers</a:t>
+              <a:t>A table is established based on a range of data.</a:t>
             </a:r>
           </a:p>
           <a:p>
@@ -6110,15 +6247,12 @@
                 <a:spcPts val="600"/>
               </a:spcBef>
             </a:pPr>
-            <a:r>
-              <a:rPr lang="en-US" sz="900" dirty="0">
-                <a:solidFill>
-                  <a:srgbClr val="2F2F2F"/>
-                </a:solidFill>
-                <a:latin typeface="Segoe UI Semibold"/>
-              </a:rPr>
-              <a:t>A table created with a header flag will use the first row in the data range for its headers.</a:t>
-            </a:r>
+            <a:endParaRPr lang="en-US" b="1" dirty="0">
+              <a:solidFill>
+                <a:srgbClr val="D83B01"/>
+              </a:solidFill>
+              <a:latin typeface="Segoe UI Semibold"/>
+            </a:endParaRPr>
           </a:p>
           <a:p>
             <a:pPr lvl="0">
@@ -6130,35 +6264,225 @@
               </a:spcBef>
             </a:pPr>
             <a:r>
-              <a:rPr lang="en-US" sz="900" dirty="0">
-                <a:solidFill>
-                  <a:srgbClr val="2F2F2F"/>
+              <a:rPr lang="en-US" b="1" dirty="0">
+                <a:solidFill>
+                  <a:srgbClr val="D83B01"/>
                 </a:solidFill>
                 <a:latin typeface="Segoe UI Semibold"/>
               </a:rPr>
-              <a:t>You can also set headers using the </a:t>
-            </a:r>
-            <a:r>
-              <a:rPr lang="en-US" sz="900" dirty="0" err="1">
-                <a:solidFill>
-                  <a:srgbClr val="2F2F2F"/>
+              <a:t>The `</a:t>
+            </a:r>
+            <a:r>
+              <a:rPr lang="en-US" b="1" dirty="0" err="1">
+                <a:solidFill>
+                  <a:srgbClr val="D83B01"/>
                 </a:solidFill>
                 <a:latin typeface="Segoe UI Semibold"/>
               </a:rPr>
+              <a:t>tables.add</a:t>
+            </a:r>
+            <a:r>
+              <a:rPr lang="en-US" b="1" dirty="0">
+                <a:solidFill>
+                  <a:srgbClr val="D83B01"/>
+                </a:solidFill>
+                <a:latin typeface="Segoe UI Semibold"/>
+              </a:rPr>
+              <a:t>()` function accepts a data range with a flag to indicate if the table has headers or not.</a:t>
+            </a:r>
+          </a:p>
+          <a:p>
+            <a:pPr lvl="0">
+              <a:lnSpc>
+                <a:spcPct val="90000"/>
+              </a:lnSpc>
+              <a:spcBef>
+                <a:spcPts val="600"/>
+              </a:spcBef>
+            </a:pPr>
+            <a:endParaRPr lang="en-US" b="1" dirty="0">
+              <a:solidFill>
+                <a:srgbClr val="D83B01"/>
+              </a:solidFill>
+              <a:latin typeface="Segoe UI Semibold"/>
+            </a:endParaRPr>
+          </a:p>
+          <a:p>
+            <a:pPr lvl="0">
+              <a:lnSpc>
+                <a:spcPct val="90000"/>
+              </a:lnSpc>
+              <a:spcBef>
+                <a:spcPts val="600"/>
+              </a:spcBef>
+            </a:pPr>
+            <a:r>
+              <a:rPr lang="en-US" b="1" dirty="0">
+                <a:solidFill>
+                  <a:srgbClr val="D83B01"/>
+                </a:solidFill>
+                <a:latin typeface="Segoe UI Semibold"/>
+              </a:rPr>
+              <a:t>Existing tables can be retrieved by their named range or ID. Developers can also iterate through a collection of tables in the worksheet.</a:t>
+            </a:r>
+          </a:p>
+          <a:p>
+            <a:pPr lvl="0">
+              <a:lnSpc>
+                <a:spcPct val="90000"/>
+              </a:lnSpc>
+              <a:spcBef>
+                <a:spcPts val="600"/>
+              </a:spcBef>
+            </a:pPr>
+            <a:endParaRPr lang="en-US" b="1" dirty="0">
+              <a:solidFill>
+                <a:srgbClr val="D83B01"/>
+              </a:solidFill>
+              <a:latin typeface="Segoe UI Semibold"/>
+            </a:endParaRPr>
+          </a:p>
+          <a:p>
+            <a:pPr lvl="0">
+              <a:lnSpc>
+                <a:spcPct val="90000"/>
+              </a:lnSpc>
+              <a:spcBef>
+                <a:spcPts val="600"/>
+              </a:spcBef>
+            </a:pPr>
+            <a:r>
+              <a:rPr lang="en-US" b="1" dirty="0">
+                <a:solidFill>
+                  <a:srgbClr val="D83B01"/>
+                </a:solidFill>
+                <a:latin typeface="Segoe UI Semibold"/>
+              </a:rPr>
+              <a:t>After the table is added, headers and table rows can be added using two dimensional arrays.</a:t>
+            </a:r>
+          </a:p>
+          <a:p>
+            <a:pPr lvl="0">
+              <a:lnSpc>
+                <a:spcPct val="90000"/>
+              </a:lnSpc>
+              <a:spcBef>
+                <a:spcPts val="600"/>
+              </a:spcBef>
+            </a:pPr>
+            <a:endParaRPr lang="en-US" b="1" dirty="0">
+              <a:solidFill>
+                <a:srgbClr val="D83B01"/>
+              </a:solidFill>
+              <a:latin typeface="Segoe UI Semibold"/>
+            </a:endParaRPr>
+          </a:p>
+          <a:p>
+            <a:pPr lvl="0">
+              <a:lnSpc>
+                <a:spcPct val="90000"/>
+              </a:lnSpc>
+              <a:spcBef>
+                <a:spcPts val="600"/>
+              </a:spcBef>
+            </a:pPr>
+            <a:r>
+              <a:rPr lang="en-US" b="1" dirty="0">
+                <a:solidFill>
+                  <a:srgbClr val="D83B01"/>
+                </a:solidFill>
+                <a:latin typeface="Segoe UI Semibold"/>
+              </a:rPr>
+              <a:t>### Headers</a:t>
+            </a:r>
+          </a:p>
+          <a:p>
+            <a:pPr lvl="0">
+              <a:lnSpc>
+                <a:spcPct val="90000"/>
+              </a:lnSpc>
+              <a:spcBef>
+                <a:spcPts val="600"/>
+              </a:spcBef>
+            </a:pPr>
+            <a:endParaRPr lang="en-US" b="1" dirty="0">
+              <a:solidFill>
+                <a:srgbClr val="D83B01"/>
+              </a:solidFill>
+              <a:latin typeface="Segoe UI Semibold"/>
+            </a:endParaRPr>
+          </a:p>
+          <a:p>
+            <a:pPr lvl="0">
+              <a:lnSpc>
+                <a:spcPct val="90000"/>
+              </a:lnSpc>
+              <a:spcBef>
+                <a:spcPts val="600"/>
+              </a:spcBef>
+            </a:pPr>
+            <a:r>
+              <a:rPr lang="en-US" b="1" dirty="0">
+                <a:solidFill>
+                  <a:srgbClr val="D83B01"/>
+                </a:solidFill>
+                <a:latin typeface="Segoe UI Semibold"/>
+              </a:rPr>
+              <a:t>A table created with a header flag will use the first row in the data range for its headers.</a:t>
+            </a:r>
+          </a:p>
+          <a:p>
+            <a:pPr lvl="0">
+              <a:lnSpc>
+                <a:spcPct val="90000"/>
+              </a:lnSpc>
+              <a:spcBef>
+                <a:spcPts val="600"/>
+              </a:spcBef>
+            </a:pPr>
+            <a:endParaRPr lang="en-US" b="1" dirty="0">
+              <a:solidFill>
+                <a:srgbClr val="D83B01"/>
+              </a:solidFill>
+              <a:latin typeface="Segoe UI Semibold"/>
+            </a:endParaRPr>
+          </a:p>
+          <a:p>
+            <a:pPr lvl="0">
+              <a:lnSpc>
+                <a:spcPct val="90000"/>
+              </a:lnSpc>
+              <a:spcBef>
+                <a:spcPts val="600"/>
+              </a:spcBef>
+            </a:pPr>
+            <a:r>
+              <a:rPr lang="en-US" b="1" dirty="0">
+                <a:solidFill>
+                  <a:srgbClr val="D83B01"/>
+                </a:solidFill>
+                <a:latin typeface="Segoe UI Semibold"/>
+              </a:rPr>
+              <a:t>You can also set header values using the `</a:t>
+            </a:r>
+            <a:r>
+              <a:rPr lang="en-US" b="1" dirty="0" err="1">
+                <a:solidFill>
+                  <a:srgbClr val="D83B01"/>
+                </a:solidFill>
+                <a:latin typeface="Segoe UI Semibold"/>
+              </a:rPr>
               <a:t>getHeaderRowRange</a:t>
             </a:r>
             <a:r>
-              <a:rPr lang="en-US" sz="900" dirty="0">
-                <a:solidFill>
-                  <a:srgbClr val="2F2F2F"/>
+              <a:rPr lang="en-US" b="1" dirty="0">
+                <a:solidFill>
+                  <a:srgbClr val="D83B01"/>
                 </a:solidFill>
                 <a:latin typeface="Segoe UI Semibold"/>
               </a:rPr>
-              <a:t>().values property with a 2D array.</a:t>
-            </a:r>
-          </a:p>
-          <a:p>
-            <a:endParaRPr lang="en-US" dirty="0"/>
+              <a:t>().values` property with a two dimensional array.</a:t>
+            </a:r>
           </a:p>
         </p:txBody>
       </p:sp>
@@ -6357,7 +6681,7 @@
                 <a:tabLst/>
                 <a:defRPr/>
               </a:pPr>
-              <a:t>3/3/20 8:50 PM</a:t>
+              <a:t>4/6/20 7:16 AM</a:t>
             </a:fld>
             <a:endParaRPr kumimoji="0" lang="en-US" sz="1200" b="0" i="0" u="none" strike="noStrike" kern="1200" cap="none" spc="0" normalizeH="0" baseline="0" noProof="0" dirty="0">
               <a:ln>
@@ -6695,7 +7019,7 @@
           <a:p>
             <a:fld id="{D18B56EA-E28F-4F92-9F16-7A6F2501B303}" type="datetime8">
               <a:rPr lang="en-US" smtClean="0"/>
-              <a:t>3/3/20 8:50 PM</a:t>
+              <a:t>4/6/20 6:02 AM</a:t>
             </a:fld>
             <a:endParaRPr lang="en-US" dirty="0"/>
           </a:p>
@@ -6911,7 +7235,7 @@
           <a:p>
             <a:fld id="{D18B56EA-E28F-4F92-9F16-7A6F2501B303}" type="datetime8">
               <a:rPr lang="en-US" smtClean="0"/>
-              <a:t>3/3/20 8:50 PM</a:t>
+              <a:t>4/6/20 6:02 AM</a:t>
             </a:fld>
             <a:endParaRPr lang="en-US" dirty="0"/>
           </a:p>
@@ -7007,13 +7331,31 @@
               </a:spcBef>
             </a:pPr>
             <a:r>
-              <a:rPr lang="en-US" b="1" dirty="0">
+              <a:rPr lang="en-US" b="0" dirty="0">
                 <a:solidFill>
                   <a:srgbClr val="D83B01"/>
                 </a:solidFill>
                 <a:latin typeface="Segoe UI Semibold"/>
               </a:rPr>
-              <a:t>Filtering</a:t>
+              <a:t>Any column in a table can be filtered using </a:t>
+            </a:r>
+            <a:r>
+              <a:rPr lang="en-US" b="0" dirty="0" err="1">
+                <a:solidFill>
+                  <a:srgbClr val="D83B01"/>
+                </a:solidFill>
+                <a:latin typeface="Segoe UI Semibold"/>
+              </a:rPr>
+              <a:t>Office.js</a:t>
+            </a:r>
+            <a:r>
+              <a:rPr lang="en-US" b="0" dirty="0">
+                <a:solidFill>
+                  <a:srgbClr val="D83B01"/>
+                </a:solidFill>
+                <a:latin typeface="Segoe UI Semibold"/>
+              </a:rPr>
+              <a:t>.</a:t>
             </a:r>
           </a:p>
           <a:p>
@@ -7025,39 +7367,12 @@
                 <a:spcPts val="600"/>
               </a:spcBef>
             </a:pPr>
-            <a:r>
-              <a:rPr lang="en-US" sz="900" kern="1200" dirty="0">
-                <a:solidFill>
-                  <a:srgbClr val="2F2F2F"/>
-                </a:solidFill>
-                <a:latin typeface="Segoe UI Light" pitchFamily="34" charset="0"/>
-                <a:ea typeface="+mn-ea"/>
-                <a:cs typeface="+mn-cs"/>
-              </a:rPr>
-              <a:t>Any column of a table can be filtered using </a:t>
-            </a:r>
-            <a:r>
-              <a:rPr lang="en-US" sz="900" kern="1200" dirty="0" err="1">
-                <a:solidFill>
-                  <a:srgbClr val="2F2F2F"/>
-                </a:solidFill>
-                <a:latin typeface="Segoe UI Light" pitchFamily="34" charset="0"/>
-                <a:ea typeface="+mn-ea"/>
-                <a:cs typeface="+mn-cs"/>
-              </a:rPr>
-              <a:t>Office.js</a:t>
-            </a:r>
-            <a:r>
-              <a:rPr lang="en-US" sz="900" kern="1200" dirty="0">
-                <a:solidFill>
-                  <a:srgbClr val="2F2F2F"/>
-                </a:solidFill>
-                <a:latin typeface="Segoe UI Light" pitchFamily="34" charset="0"/>
-                <a:ea typeface="+mn-ea"/>
-                <a:cs typeface="+mn-cs"/>
-              </a:rPr>
-              <a:t>.</a:t>
-            </a:r>
+            <a:endParaRPr lang="en-US" b="0" dirty="0">
+              <a:solidFill>
+                <a:srgbClr val="D83B01"/>
+              </a:solidFill>
+              <a:latin typeface="Segoe UI Semibold"/>
+            </a:endParaRPr>
           </a:p>
           <a:p>
             <a:pPr lvl="0">
@@ -7069,37 +7384,49 @@
               </a:spcBef>
             </a:pPr>
             <a:r>
-              <a:rPr lang="en-US" sz="900" kern="1200" dirty="0">
-                <a:solidFill>
-                  <a:srgbClr val="2F2F2F"/>
-                </a:solidFill>
-                <a:latin typeface="Segoe UI Light" pitchFamily="34" charset="0"/>
-                <a:ea typeface="+mn-ea"/>
-                <a:cs typeface="+mn-cs"/>
-              </a:rPr>
-              <a:t>Filter a column by getting the column and using the </a:t>
-            </a:r>
-            <a:r>
-              <a:rPr lang="en-US" sz="900" kern="1200" dirty="0" err="1">
-                <a:solidFill>
-                  <a:srgbClr val="2F2F2F"/>
-                </a:solidFill>
-                <a:latin typeface="Segoe UI Light" pitchFamily="34" charset="0"/>
-                <a:ea typeface="+mn-ea"/>
-                <a:cs typeface="+mn-cs"/>
+              <a:rPr lang="en-US" b="0" dirty="0">
+                <a:solidFill>
+                  <a:srgbClr val="D83B01"/>
+                </a:solidFill>
+                <a:latin typeface="Segoe UI Semibold"/>
+              </a:rPr>
+              <a:t>Filter a column by by first getting a reference </a:t>
+            </a:r>
+            <a:r>
+              <a:rPr lang="en-US" b="0" dirty="0" err="1">
+                <a:solidFill>
+                  <a:srgbClr val="D83B01"/>
+                </a:solidFill>
+                <a:latin typeface="Segoe UI Semibold"/>
+              </a:rPr>
+              <a:t>ot</a:t>
+            </a:r>
+            <a:r>
+              <a:rPr lang="en-US" b="0" dirty="0">
+                <a:solidFill>
+                  <a:srgbClr val="D83B01"/>
+                </a:solidFill>
+                <a:latin typeface="Segoe UI Semibold"/>
+              </a:rPr>
+              <a:t> the column and then use the `</a:t>
+            </a:r>
+            <a:r>
+              <a:rPr lang="en-US" b="0" dirty="0" err="1">
+                <a:solidFill>
+                  <a:srgbClr val="D83B01"/>
+                </a:solidFill>
+                <a:latin typeface="Segoe UI Semibold"/>
               </a:rPr>
               <a:t>applyValuesFilter</a:t>
             </a:r>
             <a:r>
-              <a:rPr lang="en-US" sz="900" kern="1200" dirty="0">
-                <a:solidFill>
-                  <a:srgbClr val="2F2F2F"/>
-                </a:solidFill>
-                <a:latin typeface="Segoe UI Light" pitchFamily="34" charset="0"/>
-                <a:ea typeface="+mn-ea"/>
-                <a:cs typeface="+mn-cs"/>
-              </a:rPr>
-              <a:t> function on its filter property</a:t>
+              <a:rPr lang="en-US" b="0" dirty="0">
+                <a:solidFill>
+                  <a:srgbClr val="D83B01"/>
+                </a:solidFill>
+                <a:latin typeface="Segoe UI Semibold"/>
+              </a:rPr>
+              <a:t>()` method to filter on specific values.</a:t>
             </a:r>
           </a:p>
           <a:p>
@@ -7111,55 +7438,12 @@
                 <a:spcPts val="600"/>
               </a:spcBef>
             </a:pPr>
-            <a:r>
-              <a:rPr lang="en-US" sz="900" kern="1200" dirty="0">
-                <a:solidFill>
-                  <a:srgbClr val="2F2F2F"/>
-                </a:solidFill>
-                <a:latin typeface="Segoe UI Light" pitchFamily="34" charset="0"/>
-                <a:ea typeface="+mn-ea"/>
-                <a:cs typeface="+mn-cs"/>
-              </a:rPr>
-              <a:t>You can also programmatically re-apply filters and and clear filters on a table using the table functions </a:t>
-            </a:r>
-            <a:r>
-              <a:rPr lang="en-US" sz="900" kern="1200" dirty="0" err="1">
-                <a:solidFill>
-                  <a:srgbClr val="2F2F2F"/>
-                </a:solidFill>
-                <a:latin typeface="Segoe UI Light" pitchFamily="34" charset="0"/>
-                <a:ea typeface="+mn-ea"/>
-                <a:cs typeface="+mn-cs"/>
-              </a:rPr>
-              <a:t>reapplyFilters</a:t>
-            </a:r>
-            <a:r>
-              <a:rPr lang="en-US" sz="900" kern="1200" dirty="0">
-                <a:solidFill>
-                  <a:srgbClr val="2F2F2F"/>
-                </a:solidFill>
-                <a:latin typeface="Segoe UI Light" pitchFamily="34" charset="0"/>
-                <a:ea typeface="+mn-ea"/>
-                <a:cs typeface="+mn-cs"/>
-              </a:rPr>
-              <a:t> and </a:t>
-            </a:r>
-            <a:r>
-              <a:rPr lang="en-US" sz="900" dirty="0" err="1">
-                <a:solidFill>
-                  <a:srgbClr val="2F2F2F"/>
-                </a:solidFill>
-              </a:rPr>
-              <a:t>clearFilters</a:t>
-            </a:r>
-            <a:r>
-              <a:rPr lang="en-US" sz="900" dirty="0">
-                <a:solidFill>
-                  <a:srgbClr val="2F2F2F"/>
-                </a:solidFill>
-              </a:rPr>
-              <a:t> respectively</a:t>
-            </a:r>
+            <a:endParaRPr lang="en-US" b="0" dirty="0">
+              <a:solidFill>
+                <a:srgbClr val="D83B01"/>
+              </a:solidFill>
+              <a:latin typeface="Segoe UI Semibold"/>
+            </a:endParaRPr>
           </a:p>
           <a:p>
             <a:pPr lvl="0">
@@ -7170,12 +7454,51 @@
                 <a:spcPts val="600"/>
               </a:spcBef>
             </a:pPr>
-            <a:endParaRPr lang="en-US" sz="900" dirty="0">
-              <a:solidFill>
-                <a:srgbClr val="2F2F2F"/>
-              </a:solidFill>
-              <a:latin typeface="Segoe UI Semibold"/>
-            </a:endParaRPr>
+            <a:r>
+              <a:rPr lang="en-US" b="0" dirty="0">
+                <a:solidFill>
+                  <a:srgbClr val="D83B01"/>
+                </a:solidFill>
+                <a:latin typeface="Segoe UI Semibold"/>
+              </a:rPr>
+              <a:t>You can also programmatically re-apply filters and clear filters on a table using the table functions `</a:t>
+            </a:r>
+            <a:r>
+              <a:rPr lang="en-US" b="0" dirty="0" err="1">
+                <a:solidFill>
+                  <a:srgbClr val="D83B01"/>
+                </a:solidFill>
+                <a:latin typeface="Segoe UI Semibold"/>
+              </a:rPr>
+              <a:t>reapplyFilters</a:t>
+            </a:r>
+            <a:r>
+              <a:rPr lang="en-US" b="0" dirty="0">
+                <a:solidFill>
+                  <a:srgbClr val="D83B01"/>
+                </a:solidFill>
+                <a:latin typeface="Segoe UI Semibold"/>
+              </a:rPr>
+              <a:t>()` and `</a:t>
+            </a:r>
+            <a:r>
+              <a:rPr lang="en-US" b="0" dirty="0" err="1">
+                <a:solidFill>
+                  <a:srgbClr val="D83B01"/>
+                </a:solidFill>
+                <a:latin typeface="Segoe UI Semibold"/>
+              </a:rPr>
+              <a:t>clearFilters</a:t>
+            </a:r>
+            <a:r>
+              <a:rPr lang="en-US" b="0" dirty="0">
+                <a:solidFill>
+                  <a:srgbClr val="D83B01"/>
+                </a:solidFill>
+                <a:latin typeface="Segoe UI Semibold"/>
+              </a:rPr>
+              <a:t>()` respectively.</a:t>
+            </a:r>
           </a:p>
           <a:p>
             <a:pPr lvl="0">
@@ -7186,15 +7509,12 @@
                 <a:spcPts val="600"/>
               </a:spcBef>
             </a:pPr>
-            <a:r>
-              <a:rPr lang="en-US" b="1" dirty="0">
-                <a:solidFill>
-                  <a:srgbClr val="D83B01"/>
-                </a:solidFill>
-                <a:latin typeface="Segoe UI Semibold"/>
-              </a:rPr>
-              <a:t>Sorting</a:t>
-            </a:r>
+            <a:endParaRPr lang="en-US" b="0" dirty="0">
+              <a:solidFill>
+                <a:srgbClr val="D83B01"/>
+              </a:solidFill>
+              <a:latin typeface="Segoe UI Semibold"/>
+            </a:endParaRPr>
           </a:p>
           <a:p>
             <a:pPr lvl="0">
@@ -7206,44 +7526,13 @@
               </a:spcBef>
             </a:pPr>
             <a:r>
-              <a:rPr lang="en-US" sz="900" dirty="0">
-                <a:solidFill>
-                  <a:srgbClr val="2F2F2F"/>
-                </a:solidFill>
-              </a:rPr>
-              <a:t>Table sorting can be applied by passing an array of </a:t>
-            </a:r>
-            <a:r>
-              <a:rPr lang="en-US" sz="900" dirty="0" err="1">
-                <a:solidFill>
-                  <a:srgbClr val="2F2F2F"/>
-                </a:solidFill>
-              </a:rPr>
-              <a:t>SortFields</a:t>
-            </a:r>
-            <a:r>
-              <a:rPr lang="en-US" sz="900" dirty="0">
-                <a:solidFill>
-                  <a:srgbClr val="2F2F2F"/>
-                </a:solidFill>
-              </a:rPr>
-              <a:t> to the </a:t>
-            </a:r>
-            <a:r>
-              <a:rPr lang="en-US" sz="900" dirty="0" err="1">
-                <a:solidFill>
-                  <a:srgbClr val="2F2F2F"/>
-                </a:solidFill>
-              </a:rPr>
-              <a:t>table.sort.apply</a:t>
-            </a:r>
-            <a:r>
-              <a:rPr lang="en-US" sz="900" dirty="0">
-                <a:solidFill>
-                  <a:srgbClr val="2F2F2F"/>
-                </a:solidFill>
-              </a:rPr>
-              <a:t>() function.</a:t>
+              <a:rPr lang="en-US" b="0" dirty="0">
+                <a:solidFill>
+                  <a:srgbClr val="D83B01"/>
+                </a:solidFill>
+                <a:latin typeface="Segoe UI Semibold"/>
+              </a:rPr>
+              <a:t>## Sorting tables</a:t>
             </a:r>
           </a:p>
           <a:p>
@@ -7255,50 +7544,155 @@
                 <a:spcPts val="600"/>
               </a:spcBef>
             </a:pPr>
-            <a:r>
-              <a:rPr lang="en-US" sz="900" dirty="0">
-                <a:solidFill>
-                  <a:srgbClr val="2F2F2F"/>
+            <a:endParaRPr lang="en-US" b="0" dirty="0">
+              <a:solidFill>
+                <a:srgbClr val="D83B01"/>
+              </a:solidFill>
+              <a:latin typeface="Segoe UI Semibold"/>
+            </a:endParaRPr>
+          </a:p>
+          <a:p>
+            <a:pPr lvl="0">
+              <a:lnSpc>
+                <a:spcPct val="90000"/>
+              </a:lnSpc>
+              <a:spcBef>
+                <a:spcPts val="600"/>
+              </a:spcBef>
+            </a:pPr>
+            <a:r>
+              <a:rPr lang="en-US" b="0" dirty="0">
+                <a:solidFill>
+                  <a:srgbClr val="D83B01"/>
                 </a:solidFill>
                 <a:latin typeface="Segoe UI Semibold"/>
               </a:rPr>
-              <a:t>You can re-apply and clear table sorts using </a:t>
-            </a:r>
-            <a:r>
-              <a:rPr lang="en-US" sz="900" dirty="0" err="1">
-                <a:solidFill>
-                  <a:srgbClr val="2F2F2F"/>
+              <a:t>Developers can sort table data using the </a:t>
+            </a:r>
+            <a:r>
+              <a:rPr lang="en-US" b="0" dirty="0" err="1">
+                <a:solidFill>
+                  <a:srgbClr val="D83B01"/>
                 </a:solidFill>
                 <a:latin typeface="Segoe UI Semibold"/>
               </a:rPr>
+              <a:t>Office.js</a:t>
+            </a:r>
+            <a:r>
+              <a:rPr lang="en-US" b="0" dirty="0">
+                <a:solidFill>
+                  <a:srgbClr val="D83B01"/>
+                </a:solidFill>
+                <a:latin typeface="Segoe UI Semibold"/>
+              </a:rPr>
+              <a:t> API from Excel add-ins. To sort, call the `</a:t>
+            </a:r>
+            <a:r>
+              <a:rPr lang="en-US" b="0" dirty="0" err="1">
+                <a:solidFill>
+                  <a:srgbClr val="D83B01"/>
+                </a:solidFill>
+                <a:latin typeface="Segoe UI Semibold"/>
+              </a:rPr>
+              <a:t>table.sort.apply</a:t>
+            </a:r>
+            <a:r>
+              <a:rPr lang="en-US" b="0" dirty="0">
+                <a:solidFill>
+                  <a:srgbClr val="D83B01"/>
+                </a:solidFill>
+                <a:latin typeface="Segoe UI Semibold"/>
+              </a:rPr>
+              <a:t>()` method and include the `</a:t>
+            </a:r>
+            <a:r>
+              <a:rPr lang="en-US" b="0" dirty="0" err="1">
+                <a:solidFill>
+                  <a:srgbClr val="D83B01"/>
+                </a:solidFill>
+                <a:latin typeface="Segoe UI Semibold"/>
+              </a:rPr>
+              <a:t>SortFields</a:t>
+            </a:r>
+            <a:r>
+              <a:rPr lang="en-US" b="0" dirty="0">
+                <a:solidFill>
+                  <a:srgbClr val="D83B01"/>
+                </a:solidFill>
+                <a:latin typeface="Segoe UI Semibold"/>
+              </a:rPr>
+              <a:t>` argument to specify the fields to sort on.</a:t>
+            </a:r>
+          </a:p>
+          <a:p>
+            <a:pPr lvl="0">
+              <a:lnSpc>
+                <a:spcPct val="90000"/>
+              </a:lnSpc>
+              <a:spcBef>
+                <a:spcPts val="600"/>
+              </a:spcBef>
+            </a:pPr>
+            <a:endParaRPr lang="en-US" b="0" dirty="0">
+              <a:solidFill>
+                <a:srgbClr val="D83B01"/>
+              </a:solidFill>
+              <a:latin typeface="Segoe UI Semibold"/>
+            </a:endParaRPr>
+          </a:p>
+          <a:p>
+            <a:pPr lvl="0">
+              <a:lnSpc>
+                <a:spcPct val="90000"/>
+              </a:lnSpc>
+              <a:spcBef>
+                <a:spcPts val="600"/>
+              </a:spcBef>
+            </a:pPr>
+            <a:r>
+              <a:rPr lang="en-US" b="0" dirty="0">
+                <a:solidFill>
+                  <a:srgbClr val="D83B01"/>
+                </a:solidFill>
+                <a:latin typeface="Segoe UI Semibold"/>
+              </a:rPr>
+              <a:t>You can re-apply and clear table sorts using `</a:t>
+            </a:r>
+            <a:r>
+              <a:rPr lang="en-US" b="0" dirty="0" err="1">
+                <a:solidFill>
+                  <a:srgbClr val="D83B01"/>
+                </a:solidFill>
+                <a:latin typeface="Segoe UI Semibold"/>
+              </a:rPr>
               <a:t>table.sort.reapply</a:t>
             </a:r>
             <a:r>
-              <a:rPr lang="en-US" sz="900" dirty="0">
-                <a:solidFill>
-                  <a:srgbClr val="2F2F2F"/>
+              <a:rPr lang="en-US" b="0" dirty="0">
+                <a:solidFill>
+                  <a:srgbClr val="D83B01"/>
                 </a:solidFill>
                 <a:latin typeface="Segoe UI Semibold"/>
               </a:rPr>
-              <a:t>() and </a:t>
-            </a:r>
-            <a:r>
-              <a:rPr lang="en-US" sz="900" dirty="0" err="1">
-                <a:solidFill>
-                  <a:srgbClr val="2F2F2F"/>
+              <a:t>()` and `</a:t>
+            </a:r>
+            <a:r>
+              <a:rPr lang="en-US" b="0" dirty="0" err="1">
+                <a:solidFill>
+                  <a:srgbClr val="D83B01"/>
                 </a:solidFill>
                 <a:latin typeface="Segoe UI Semibold"/>
               </a:rPr>
               <a:t>table.sort.clear</a:t>
             </a:r>
             <a:r>
-              <a:rPr lang="en-US" sz="900" dirty="0">
-                <a:solidFill>
-                  <a:srgbClr val="2F2F2F"/>
+              <a:rPr lang="en-US" b="0" dirty="0">
+                <a:solidFill>
+                  <a:srgbClr val="D83B01"/>
                 </a:solidFill>
                 <a:latin typeface="Segoe UI Semibold"/>
               </a:rPr>
-              <a:t>() respectively.</a:t>
+              <a:t>()` methods.</a:t>
             </a:r>
           </a:p>
         </p:txBody>
@@ -7498,7 +7892,7 @@
                 <a:tabLst/>
                 <a:defRPr/>
               </a:pPr>
-              <a:t>3/3/20 8:50 PM</a:t>
+              <a:t>4/6/20 10:34 AM</a:t>
             </a:fld>
             <a:endParaRPr kumimoji="0" lang="en-US" sz="1200" b="0" i="0" u="none" strike="noStrike" kern="1200" cap="none" spc="0" normalizeH="0" baseline="0" noProof="0" dirty="0">
               <a:ln>
@@ -21877,7 +22271,7 @@
         </p:nvGraphicFramePr>
         <p:xfrm>
           <a:off x="465138" y="1391285"/>
-          <a:ext cx="10976811" cy="3870960"/>
+          <a:ext cx="10976811" cy="4175760"/>
         </p:xfrm>
         <a:graphic>
           <a:graphicData uri="http://schemas.openxmlformats.org/drawingml/2006/table">
@@ -22288,7 +22682,7 @@
         </p:nvGraphicFramePr>
         <p:xfrm>
           <a:off x="465137" y="1454847"/>
-          <a:ext cx="11533188" cy="3962400"/>
+          <a:ext cx="11533188" cy="4572000"/>
         </p:xfrm>
         <a:graphic>
           <a:graphicData uri="http://schemas.openxmlformats.org/drawingml/2006/table">
@@ -31224,7 +31618,7 @@
         <p159:morph option="byObject"/>
       </p:transition>
     </mc:Choice>
-    <mc:Fallback xmlns:p14="http://schemas.microsoft.com/office/powerpoint/2010/main" xmlns:a14="http://schemas.microsoft.com/office/drawing/2010/main" xmlns="">
+    <mc:Fallback xmlns="" xmlns:a14="http://schemas.microsoft.com/office/drawing/2010/main" xmlns:p14="http://schemas.microsoft.com/office/powerpoint/2010/main">
       <p:transition spd="slow">
         <p:fade/>
       </p:transition>
@@ -40082,7 +40476,6 @@
                 <a:solidFill>
                   <a:srgbClr val="2F2F2F"/>
                 </a:solidFill>
-                <a:latin typeface="+mj-lt"/>
               </a:rPr>
               <a:t>Any column of a table can be filtered using </a:t>
             </a:r>
@@ -40091,7 +40484,6 @@
                 <a:solidFill>
                   <a:srgbClr val="2F2F2F"/>
                 </a:solidFill>
-                <a:latin typeface="+mj-lt"/>
               </a:rPr>
               <a:t>Office.js</a:t>
             </a:r>
@@ -40100,7 +40492,6 @@
                 <a:solidFill>
                   <a:srgbClr val="2F2F2F"/>
                 </a:solidFill>
-                <a:latin typeface="+mj-lt"/>
               </a:rPr>
               <a:t>.</a:t>
             </a:r>
@@ -40119,7 +40510,6 @@
                 <a:solidFill>
                   <a:srgbClr val="2F2F2F"/>
                 </a:solidFill>
-                <a:latin typeface="+mj-lt"/>
               </a:rPr>
               <a:t>Filter a column by getting the column and using the </a:t>
             </a:r>
@@ -40128,7 +40518,6 @@
                 <a:solidFill>
                   <a:srgbClr val="2F2F2F"/>
                 </a:solidFill>
-                <a:latin typeface="+mj-lt"/>
               </a:rPr>
               <a:t>applyValuesFilter</a:t>
             </a:r>
@@ -40137,7 +40526,6 @@
                 <a:solidFill>
                   <a:srgbClr val="2F2F2F"/>
                 </a:solidFill>
-                <a:latin typeface="+mj-lt"/>
               </a:rPr>
               <a:t> function on its filter property.</a:t>
             </a:r>
@@ -40156,7 +40544,6 @@
                 <a:solidFill>
                   <a:srgbClr val="2F2F2F"/>
                 </a:solidFill>
-                <a:latin typeface="+mj-lt"/>
               </a:rPr>
               <a:t>You can also programmatically re-apply filters and clear filters on a table using the table functions </a:t>
             </a:r>
@@ -40165,7 +40552,6 @@
                 <a:solidFill>
                   <a:srgbClr val="2F2F2F"/>
                 </a:solidFill>
-                <a:latin typeface="+mj-lt"/>
               </a:rPr>
               <a:t>reapplyFilters</a:t>
             </a:r>
@@ -40174,7 +40560,6 @@
                 <a:solidFill>
                   <a:srgbClr val="2F2F2F"/>
                 </a:solidFill>
-                <a:latin typeface="+mj-lt"/>
               </a:rPr>
               <a:t> and </a:t>
             </a:r>
@@ -40231,7 +40616,7 @@
             </a:r>
           </a:p>
           <a:p>
-            <a:pPr lvl="0">
+            <a:pPr>
               <a:lnSpc>
                 <a:spcPct val="90000"/>
               </a:lnSpc>
@@ -40281,7 +40666,7 @@
             </a:r>
           </a:p>
           <a:p>
-            <a:pPr lvl="0">
+            <a:pPr>
               <a:lnSpc>
                 <a:spcPct val="90000"/>
               </a:lnSpc>
@@ -40294,7 +40679,6 @@
                 <a:solidFill>
                   <a:srgbClr val="2F2F2F"/>
                 </a:solidFill>
-                <a:latin typeface="Segoe UI Semibold"/>
               </a:rPr>
               <a:t>You can re-apply and clear table sorts using </a:t>
             </a:r>
@@ -40303,7 +40687,6 @@
                 <a:solidFill>
                   <a:srgbClr val="2F2F2F"/>
                 </a:solidFill>
-                <a:latin typeface="Segoe UI Semibold"/>
               </a:rPr>
               <a:t>table.sort.reapply</a:t>
             </a:r>
@@ -40312,7 +40695,6 @@
                 <a:solidFill>
                   <a:srgbClr val="2F2F2F"/>
                 </a:solidFill>
-                <a:latin typeface="Segoe UI Semibold"/>
               </a:rPr>
               <a:t>() and </a:t>
             </a:r>
@@ -40321,7 +40703,6 @@
                 <a:solidFill>
                   <a:srgbClr val="2F2F2F"/>
                 </a:solidFill>
-                <a:latin typeface="Segoe UI Semibold"/>
               </a:rPr>
               <a:t>table.sort.clear</a:t>
             </a:r>
@@ -40330,7 +40711,6 @@
                 <a:solidFill>
                   <a:srgbClr val="2F2F2F"/>
                 </a:solidFill>
-                <a:latin typeface="Segoe UI Semibold"/>
               </a:rPr>
               <a:t>() respectively.</a:t>
             </a:r>

</xml_diff>

<commit_message>
FY21Q4 refresh - office-add-ins-excel
- run through all exercise steps in associated MSLearn module to validate good working order
- updated steps & fixed typos where necessary
- updated slides where necessary
- update references to add-ins & OUIF to casing & references per PG feedback
- update code samples to reflect MSLearn HOL exercise refresh & updates
- any & all users/names/company names/pictures/IDs are not real people/tenants... all are from M365 demo tenants provided by Microsoft
</commit_message>
<xml_diff>
--- a/OfficeAddin/02 Building Add-ins for Microsoft Excel/01 Tables and Charts in Excel Add-ins.pptx
+++ b/OfficeAddin/02 Building Add-ins for Microsoft Excel/01 Tables and Charts in Excel Add-ins.pptx
@@ -281,7 +281,7 @@
               <a:rPr lang="en-US" smtClean="0">
                 <a:latin typeface="Segoe UI" pitchFamily="34" charset="0"/>
               </a:rPr>
-              <a:t>4/6/20 6:02 AM</a:t>
+              <a:t>6/17/21 10:50 AM</a:t>
             </a:fld>
             <a:endParaRPr lang="en-US" dirty="0">
               <a:latin typeface="Segoe UI" pitchFamily="34" charset="0"/>
@@ -575,7 +575,7 @@
           <a:p>
             <a:fld id="{D18B56EA-E28F-4F92-9F16-7A6F2501B303}" type="datetime8">
               <a:rPr lang="en-US" smtClean="0"/>
-              <a:t>4/6/20 6:02 AM</a:t>
+              <a:t>6/17/21 10:50 AM</a:t>
             </a:fld>
             <a:endParaRPr lang="en-US" dirty="0"/>
           </a:p>
@@ -1066,7 +1066,7 @@
                 <a:tabLst/>
                 <a:defRPr/>
               </a:pPr>
-              <a:t>4/6/20 6:52 AM</a:t>
+              <a:t>6/17/21 10:50 AM</a:t>
             </a:fld>
             <a:endParaRPr kumimoji="0" lang="en-US" sz="1200" b="0" i="0" u="none" strike="noStrike" kern="1200" cap="none" spc="0" normalizeH="0" baseline="0" noProof="0" dirty="0">
               <a:ln>
@@ -1322,7 +1322,7 @@
           <a:p>
             <a:fld id="{D18B56EA-E28F-4F92-9F16-7A6F2501B303}" type="datetime8">
               <a:rPr lang="en-US" smtClean="0"/>
-              <a:t>4/6/20 6:02 AM</a:t>
+              <a:t>6/17/21 10:50 AM</a:t>
             </a:fld>
             <a:endParaRPr lang="en-US" dirty="0"/>
           </a:p>
@@ -1512,7 +1512,7 @@
           <a:p>
             <a:fld id="{D18B56EA-E28F-4F92-9F16-7A6F2501B303}" type="datetime8">
               <a:rPr lang="en-US" smtClean="0"/>
-              <a:t>4/6/20 6:02 AM</a:t>
+              <a:t>6/17/21 10:50 AM</a:t>
             </a:fld>
             <a:endParaRPr lang="en-US" dirty="0"/>
           </a:p>
@@ -2087,7 +2087,7 @@
                 <a:tabLst/>
                 <a:defRPr/>
               </a:pPr>
-              <a:t>4/6/20 10:45 AM</a:t>
+              <a:t>6/17/21 10:50 AM</a:t>
             </a:fld>
             <a:endParaRPr kumimoji="0" lang="en-US" sz="1200" b="0" i="0" u="none" strike="noStrike" kern="1200" cap="none" spc="0" normalizeH="0" baseline="0" noProof="0" dirty="0">
               <a:ln>
@@ -2481,7 +2481,7 @@
           <a:p>
             <a:fld id="{D18B56EA-E28F-4F92-9F16-7A6F2501B303}" type="datetime8">
               <a:rPr lang="en-US" smtClean="0"/>
-              <a:t>4/6/20 10:54 AM</a:t>
+              <a:t>6/17/21 10:50 AM</a:t>
             </a:fld>
             <a:endParaRPr lang="en-US" dirty="0"/>
           </a:p>
@@ -2673,7 +2673,7 @@
           <a:p>
             <a:fld id="{D18B56EA-E28F-4F92-9F16-7A6F2501B303}" type="datetime8">
               <a:rPr lang="en-US" smtClean="0"/>
-              <a:t>4/6/20 6:02 AM</a:t>
+              <a:t>6/17/21 10:50 AM</a:t>
             </a:fld>
             <a:endParaRPr lang="en-US" dirty="0"/>
           </a:p>
@@ -2857,7 +2857,7 @@
           <a:p>
             <a:fld id="{D18B56EA-E28F-4F92-9F16-7A6F2501B303}" type="datetime8">
               <a:rPr lang="en-US" smtClean="0"/>
-              <a:t>4/6/20 6:02 AM</a:t>
+              <a:t>6/17/21 10:50 AM</a:t>
             </a:fld>
             <a:endParaRPr lang="en-US" dirty="0"/>
           </a:p>
@@ -3143,7 +3143,7 @@
           <a:p>
             <a:fld id="{D18B56EA-E28F-4F92-9F16-7A6F2501B303}" type="datetime8">
               <a:rPr lang="en-US" smtClean="0"/>
-              <a:t>4/6/20 6:02 AM</a:t>
+              <a:t>6/17/21 10:50 AM</a:t>
             </a:fld>
             <a:endParaRPr lang="en-US" dirty="0"/>
           </a:p>
@@ -3989,7 +3989,7 @@
           <a:p>
             <a:fld id="{D18B56EA-E28F-4F92-9F16-7A6F2501B303}" type="datetime8">
               <a:rPr lang="en-US" smtClean="0"/>
-              <a:t>4/6/20 6:02 AM</a:t>
+              <a:t>6/17/21 10:50 AM</a:t>
             </a:fld>
             <a:endParaRPr lang="en-US" dirty="0"/>
           </a:p>
@@ -4170,7 +4170,7 @@
           <a:p>
             <a:fld id="{D18B56EA-E28F-4F92-9F16-7A6F2501B303}" type="datetime8">
               <a:rPr lang="en-US" smtClean="0"/>
-              <a:t>4/6/20 6:02 AM</a:t>
+              <a:t>6/17/21 10:50 AM</a:t>
             </a:fld>
             <a:endParaRPr lang="en-US" dirty="0"/>
           </a:p>
@@ -4351,7 +4351,7 @@
           <a:p>
             <a:fld id="{D18B56EA-E28F-4F92-9F16-7A6F2501B303}" type="datetime8">
               <a:rPr lang="en-US" smtClean="0"/>
-              <a:t>4/6/20 6:02 AM</a:t>
+              <a:t>6/17/21 10:50 AM</a:t>
             </a:fld>
             <a:endParaRPr lang="en-US" dirty="0"/>
           </a:p>
@@ -4643,7 +4643,7 @@
                 <a:tabLst/>
                 <a:defRPr/>
               </a:pPr>
-              <a:t>4/6/20 6:52 AM</a:t>
+              <a:t>6/17/21 10:50 AM</a:t>
             </a:fld>
             <a:endParaRPr kumimoji="0" lang="en-US" sz="1200" b="0" i="0" u="none" strike="noStrike" kern="1200" cap="none" spc="0" normalizeH="0" baseline="0" noProof="0" dirty="0">
               <a:ln>
@@ -4896,7 +4896,7 @@
           <a:p>
             <a:fld id="{D18B56EA-E28F-4F92-9F16-7A6F2501B303}" type="datetime8">
               <a:rPr lang="en-US" smtClean="0"/>
-              <a:t>4/6/20 6:02 AM</a:t>
+              <a:t>6/17/21 10:50 AM</a:t>
             </a:fld>
             <a:endParaRPr lang="en-US" dirty="0"/>
           </a:p>
@@ -5389,7 +5389,7 @@
           <a:p>
             <a:fld id="{D18B56EA-E28F-4F92-9F16-7A6F2501B303}" type="datetime8">
               <a:rPr lang="en-US" smtClean="0"/>
-              <a:t>4/6/20 6:51 AM</a:t>
+              <a:t>6/17/21 10:50 AM</a:t>
             </a:fld>
             <a:endParaRPr lang="en-US" dirty="0"/>
           </a:p>
@@ -5868,7 +5868,7 @@
                 <a:tabLst/>
                 <a:defRPr/>
               </a:pPr>
-              <a:t>4/6/20 7:10 AM</a:t>
+              <a:t>6/17/21 10:50 AM</a:t>
             </a:fld>
             <a:endParaRPr kumimoji="0" lang="en-US" sz="1200" b="0" i="0" u="none" strike="noStrike" kern="1200" cap="none" spc="0" normalizeH="0" baseline="0" noProof="0" dirty="0">
               <a:ln>
@@ -6681,7 +6681,7 @@
                 <a:tabLst/>
                 <a:defRPr/>
               </a:pPr>
-              <a:t>4/6/20 7:16 AM</a:t>
+              <a:t>6/17/21 10:50 AM</a:t>
             </a:fld>
             <a:endParaRPr kumimoji="0" lang="en-US" sz="1200" b="0" i="0" u="none" strike="noStrike" kern="1200" cap="none" spc="0" normalizeH="0" baseline="0" noProof="0" dirty="0">
               <a:ln>
@@ -7019,7 +7019,7 @@
           <a:p>
             <a:fld id="{D18B56EA-E28F-4F92-9F16-7A6F2501B303}" type="datetime8">
               <a:rPr lang="en-US" smtClean="0"/>
-              <a:t>4/6/20 6:02 AM</a:t>
+              <a:t>6/17/21 10:50 AM</a:t>
             </a:fld>
             <a:endParaRPr lang="en-US" dirty="0"/>
           </a:p>
@@ -7235,7 +7235,7 @@
           <a:p>
             <a:fld id="{D18B56EA-E28F-4F92-9F16-7A6F2501B303}" type="datetime8">
               <a:rPr lang="en-US" smtClean="0"/>
-              <a:t>4/6/20 6:02 AM</a:t>
+              <a:t>6/17/21 10:50 AM</a:t>
             </a:fld>
             <a:endParaRPr lang="en-US" dirty="0"/>
           </a:p>
@@ -7892,7 +7892,7 @@
                 <a:tabLst/>
                 <a:defRPr/>
               </a:pPr>
-              <a:t>4/6/20 10:34 AM</a:t>
+              <a:t>6/17/21 10:50 AM</a:t>
             </a:fld>
             <a:endParaRPr kumimoji="0" lang="en-US" sz="1200" b="0" i="0" u="none" strike="noStrike" kern="1200" cap="none" spc="0" normalizeH="0" baseline="0" noProof="0" dirty="0">
               <a:ln>
@@ -19916,7 +19916,7 @@
         <p:spPr>
           <a:xfrm>
             <a:off x="465139" y="1500487"/>
-            <a:ext cx="5905181" cy="3542508"/>
+            <a:ext cx="5905181" cy="3764107"/>
           </a:xfrm>
           <a:prstGeom prst="rect">
             <a:avLst/>
@@ -20178,7 +20178,7 @@
                 </a:solidFill>
                 <a:latin typeface="+mj-lt"/>
               </a:rPr>
-              <a:t>Microsoft Excel has become a playground for data manipulation and visualization. So it no surprise that the Excel JavaScript APIs allow developers to add and manipulate charts.</a:t>
+              <a:t>Microsoft Excel has become a playground for data manipulation and visualization. So it is no surprise that the Excel JavaScript APIs allow developers to add and manipulate charts.</a:t>
             </a:r>
           </a:p>
           <a:p>
@@ -20261,18 +20261,67 @@
                 <a:solidFill>
                   <a:srgbClr val="2F2F2F"/>
                 </a:solidFill>
+                <a:latin typeface="Courier New" panose="02070309020205020404" pitchFamily="49" charset="0"/>
+                <a:cs typeface="Courier New" panose="02070309020205020404" pitchFamily="49" charset="0"/>
+              </a:rPr>
+              <a:t>worksheet.charts.add</a:t>
+            </a:r>
+            <a:r>
+              <a:rPr lang="en-US" sz="1600" dirty="0">
+                <a:solidFill>
+                  <a:srgbClr val="2F2F2F"/>
+                </a:solidFill>
+                <a:latin typeface="Courier New" panose="02070309020205020404" pitchFamily="49" charset="0"/>
+                <a:cs typeface="Courier New" panose="02070309020205020404" pitchFamily="49" charset="0"/>
+              </a:rPr>
+              <a:t>()</a:t>
+            </a:r>
+            <a:r>
+              <a:rPr lang="en-US" sz="1600" dirty="0">
+                <a:solidFill>
+                  <a:srgbClr val="2F2F2F"/>
+                </a:solidFill>
                 <a:latin typeface="Segoe UI Semibold"/>
               </a:rPr>
-              <a:t>worksheet.charts.add</a:t>
+              <a:t> function is used to create a chart, which accepts a chart type </a:t>
             </a:r>
             <a:r>
               <a:rPr lang="en-US" sz="1600" dirty="0">
                 <a:solidFill>
                   <a:srgbClr val="2F2F2F"/>
                 </a:solidFill>
+                <a:latin typeface="Segoe UI Symbol" panose="020B0502040204020203" pitchFamily="34" charset="0"/>
+                <a:ea typeface="Segoe UI Symbol" panose="020B0502040204020203" pitchFamily="34" charset="0"/>
+              </a:rPr>
+              <a:t>(</a:t>
+            </a:r>
+            <a:r>
+              <a:rPr lang="en-US" sz="1600" dirty="0">
+                <a:solidFill>
+                  <a:srgbClr val="2F2F2F"/>
+                </a:solidFill>
                 <a:latin typeface="Segoe UI Semibold"/>
               </a:rPr>
-              <a:t> function is used to create a chart, which accepts a chart type (discussed more in the next slide), a data range, and </a:t>
+              <a:t>discussed more in the next slide</a:t>
+            </a:r>
+            <a:r>
+              <a:rPr lang="en-US" sz="1600" dirty="0">
+                <a:solidFill>
+                  <a:srgbClr val="2F2F2F"/>
+                </a:solidFill>
+                <a:latin typeface="Segoe UI Symbol" panose="020B0502040204020203" pitchFamily="34" charset="0"/>
+                <a:ea typeface="Segoe UI Symbol" panose="020B0502040204020203" pitchFamily="34" charset="0"/>
+              </a:rPr>
+              <a:t>)</a:t>
+            </a:r>
+            <a:r>
+              <a:rPr lang="en-US" sz="1600" dirty="0">
+                <a:solidFill>
+                  <a:srgbClr val="2F2F2F"/>
+                </a:solidFill>
+                <a:latin typeface="Segoe UI Semibold"/>
+              </a:rPr>
+              <a:t>, a data range, and </a:t>
             </a:r>
             <a:r>
               <a:rPr lang="en-US" sz="1600" dirty="0" err="1">
@@ -20290,7 +20339,45 @@
                 </a:solidFill>
                 <a:latin typeface="Segoe UI Semibold"/>
               </a:rPr>
-              <a:t> (possible values include Auto, Scalar, Matrix).</a:t>
+              <a:t> </a:t>
+            </a:r>
+            <a:r>
+              <a:rPr lang="en-US" sz="1600" dirty="0">
+                <a:solidFill>
+                  <a:srgbClr val="2F2F2F"/>
+                </a:solidFill>
+                <a:latin typeface="Segoe UI Symbol" panose="020B0502040204020203" pitchFamily="34" charset="0"/>
+                <a:ea typeface="Segoe UI Symbol" panose="020B0502040204020203" pitchFamily="34" charset="0"/>
+              </a:rPr>
+              <a:t>(</a:t>
+            </a:r>
+            <a:r>
+              <a:rPr lang="en-US" sz="1600" dirty="0">
+                <a:solidFill>
+                  <a:srgbClr val="2F2F2F"/>
+                </a:solidFill>
+                <a:latin typeface="Segoe UI Semibold"/>
+              </a:rPr>
+              <a:t>possible values include Auto, Scalar, Matrix</a:t>
+            </a:r>
+            <a:r>
+              <a:rPr lang="en-US" sz="1600" dirty="0">
+                <a:solidFill>
+                  <a:srgbClr val="2F2F2F"/>
+                </a:solidFill>
+                <a:latin typeface="Segoe UI Symbol" panose="020B0502040204020203" pitchFamily="34" charset="0"/>
+                <a:ea typeface="Segoe UI Symbol" panose="020B0502040204020203" pitchFamily="34" charset="0"/>
+              </a:rPr>
+              <a:t>)</a:t>
+            </a:r>
+            <a:r>
+              <a:rPr lang="en-US" sz="1600" dirty="0">
+                <a:solidFill>
+                  <a:srgbClr val="2F2F2F"/>
+                </a:solidFill>
+                <a:latin typeface="Segoe UI Semibold"/>
+              </a:rPr>
+              <a:t>.</a:t>
             </a:r>
           </a:p>
         </p:txBody>
@@ -21848,7 +21935,7 @@
         </p:nvSpPr>
         <p:spPr>
           <a:xfrm>
-            <a:off x="10514947" y="2879591"/>
+            <a:off x="10351399" y="2879591"/>
             <a:ext cx="2057400" cy="3185487"/>
           </a:xfrm>
           <a:prstGeom prst="rect">
@@ -22264,14 +22351,14 @@
             <p:ph type="tbl" sz="quarter" idx="10"/>
             <p:extLst>
               <p:ext uri="{D42A27DB-BD31-4B8C-83A1-F6EECF244321}">
-                <p14:modId xmlns:p14="http://schemas.microsoft.com/office/powerpoint/2010/main" val="174529857"/>
+                <p14:modId xmlns:p14="http://schemas.microsoft.com/office/powerpoint/2010/main" val="1649844878"/>
               </p:ext>
             </p:extLst>
           </p:nvPr>
         </p:nvGraphicFramePr>
         <p:xfrm>
           <a:off x="465138" y="1391285"/>
-          <a:ext cx="10976811" cy="4175760"/>
+          <a:ext cx="10976811" cy="4480560"/>
         </p:xfrm>
         <a:graphic>
           <a:graphicData uri="http://schemas.openxmlformats.org/drawingml/2006/table">
@@ -22280,14 +22367,14 @@
                 <a:tableStyleId>{5C22544A-7EE6-4342-B048-85BDC9FD1C3A}</a:tableStyleId>
               </a:tblPr>
               <a:tblGrid>
-                <a:gridCol w="2478784">
+                <a:gridCol w="3251935">
                   <a:extLst>
                     <a:ext uri="{9D8B030D-6E8A-4147-A177-3AD203B41FA5}">
                       <a16:colId xmlns:a16="http://schemas.microsoft.com/office/drawing/2014/main" val="2486055764"/>
                     </a:ext>
                   </a:extLst>
                 </a:gridCol>
-                <a:gridCol w="8498027">
+                <a:gridCol w="7724876">
                   <a:extLst>
                     <a:ext uri="{9D8B030D-6E8A-4147-A177-3AD203B41FA5}">
                       <a16:colId xmlns:a16="http://schemas.microsoft.com/office/drawing/2014/main" val="3131693182"/>
@@ -22335,10 +22422,16 @@
                     <a:lstStyle/>
                     <a:p>
                       <a:r>
-                        <a:rPr lang="en-US" sz="2000" dirty="0" err="1"/>
+                        <a:rPr lang="en-US" sz="2000" dirty="0" err="1">
+                          <a:latin typeface="Courier New" panose="02070309020205020404" pitchFamily="49" charset="0"/>
+                          <a:cs typeface="Courier New" panose="02070309020205020404" pitchFamily="49" charset="0"/>
+                        </a:rPr>
                         <a:t>chartType</a:t>
                       </a:r>
-                      <a:endParaRPr lang="en-US" sz="2000" dirty="0"/>
+                      <a:endParaRPr lang="en-US" sz="2000" dirty="0">
+                        <a:latin typeface="Courier New" panose="02070309020205020404" pitchFamily="49" charset="0"/>
+                        <a:cs typeface="Courier New" panose="02070309020205020404" pitchFamily="49" charset="0"/>
+                      </a:endParaRPr>
                     </a:p>
                   </a:txBody>
                   <a:tcPr/>
@@ -22350,7 +22443,25 @@
                     <a:p>
                       <a:r>
                         <a:rPr lang="en-US" sz="2000" dirty="0"/>
-                        <a:t>Represents the type of the chart (possible values on previous slide)</a:t>
+                        <a:t>Represents the type of the chart </a:t>
+                      </a:r>
+                      <a:r>
+                        <a:rPr lang="en-US" sz="2000" dirty="0">
+                          <a:latin typeface="Segoe UI Symbol" panose="020B0502040204020203" pitchFamily="34" charset="0"/>
+                          <a:ea typeface="Segoe UI Symbol" panose="020B0502040204020203" pitchFamily="34" charset="0"/>
+                        </a:rPr>
+                        <a:t>(</a:t>
+                      </a:r>
+                      <a:r>
+                        <a:rPr lang="en-US" sz="2000" dirty="0"/>
+                        <a:t>possible values on previous slide</a:t>
+                      </a:r>
+                      <a:r>
+                        <a:rPr lang="en-US" sz="2000" dirty="0">
+                          <a:latin typeface="Segoe UI Symbol" panose="020B0502040204020203" pitchFamily="34" charset="0"/>
+                          <a:ea typeface="Segoe UI Symbol" panose="020B0502040204020203" pitchFamily="34" charset="0"/>
+                        </a:rPr>
+                        <a:t>)</a:t>
                       </a:r>
                     </a:p>
                   </a:txBody>
@@ -22369,7 +22480,10 @@
                     <a:lstStyle/>
                     <a:p>
                       <a:r>
-                        <a:rPr lang="en-US" sz="2000" dirty="0"/>
+                        <a:rPr lang="en-US" sz="2000" dirty="0">
+                          <a:latin typeface="Courier New" panose="02070309020205020404" pitchFamily="49" charset="0"/>
+                          <a:cs typeface="Courier New" panose="02070309020205020404" pitchFamily="49" charset="0"/>
+                        </a:rPr>
                         <a:t>height</a:t>
                       </a:r>
                     </a:p>
@@ -22402,7 +22516,10 @@
                     <a:lstStyle/>
                     <a:p>
                       <a:r>
-                        <a:rPr lang="en-US" sz="2000" dirty="0"/>
+                        <a:rPr lang="en-US" sz="2000" dirty="0">
+                          <a:latin typeface="Courier New" panose="02070309020205020404" pitchFamily="49" charset="0"/>
+                          <a:cs typeface="Courier New" panose="02070309020205020404" pitchFamily="49" charset="0"/>
+                        </a:rPr>
                         <a:t>id</a:t>
                       </a:r>
                     </a:p>
@@ -22435,7 +22552,10 @@
                     <a:lstStyle/>
                     <a:p>
                       <a:r>
-                        <a:rPr lang="en-US" sz="2000" dirty="0"/>
+                        <a:rPr lang="en-US" sz="2000" dirty="0">
+                          <a:latin typeface="Courier New" panose="02070309020205020404" pitchFamily="49" charset="0"/>
+                          <a:cs typeface="Courier New" panose="02070309020205020404" pitchFamily="49" charset="0"/>
+                        </a:rPr>
                         <a:t>left</a:t>
                       </a:r>
                     </a:p>
@@ -22468,7 +22588,10 @@
                     <a:lstStyle/>
                     <a:p>
                       <a:r>
-                        <a:rPr lang="en-US" sz="2000" dirty="0"/>
+                        <a:rPr lang="en-US" sz="2000" dirty="0">
+                          <a:latin typeface="Courier New" panose="02070309020205020404" pitchFamily="49" charset="0"/>
+                          <a:cs typeface="Courier New" panose="02070309020205020404" pitchFamily="49" charset="0"/>
+                        </a:rPr>
                         <a:t>name</a:t>
                       </a:r>
                     </a:p>
@@ -22501,10 +22624,16 @@
                     <a:lstStyle/>
                     <a:p>
                       <a:r>
-                        <a:rPr lang="en-US" sz="2000" dirty="0" err="1"/>
+                        <a:rPr lang="en-US" sz="2000" dirty="0" err="1">
+                          <a:latin typeface="Courier New" panose="02070309020205020404" pitchFamily="49" charset="0"/>
+                          <a:cs typeface="Courier New" panose="02070309020205020404" pitchFamily="49" charset="0"/>
+                        </a:rPr>
                         <a:t>showAllFieldButtons</a:t>
                       </a:r>
-                      <a:endParaRPr lang="en-US" sz="2000" dirty="0"/>
+                      <a:endParaRPr lang="en-US" sz="2000" dirty="0">
+                        <a:latin typeface="Courier New" panose="02070309020205020404" pitchFamily="49" charset="0"/>
+                        <a:cs typeface="Courier New" panose="02070309020205020404" pitchFamily="49" charset="0"/>
+                      </a:endParaRPr>
                     </a:p>
                   </a:txBody>
                   <a:tcPr/>
@@ -22535,7 +22664,10 @@
                     <a:lstStyle/>
                     <a:p>
                       <a:r>
-                        <a:rPr lang="en-US" sz="2000" dirty="0"/>
+                        <a:rPr lang="en-US" sz="2000" dirty="0">
+                          <a:latin typeface="Courier New" panose="02070309020205020404" pitchFamily="49" charset="0"/>
+                          <a:cs typeface="Courier New" panose="02070309020205020404" pitchFamily="49" charset="0"/>
+                        </a:rPr>
                         <a:t>top</a:t>
                       </a:r>
                     </a:p>
@@ -22549,7 +22681,47 @@
                     <a:p>
                       <a:r>
                         <a:rPr lang="en-US" sz="2000" dirty="0"/>
-                        <a:t>Represents the distance, in points, from the top edge of the object to the top of row 1 (on a worksheet) or the top of the chart area (on a chart)</a:t>
+                        <a:t>Represents the distance, in points, from the top edge of the object to the top of row 1 </a:t>
+                      </a:r>
+                      <a:r>
+                        <a:rPr lang="en-US" sz="2000" dirty="0">
+                          <a:latin typeface="Segoe UI Symbol" panose="020B0502040204020203" pitchFamily="34" charset="0"/>
+                          <a:ea typeface="Segoe UI Symbol" panose="020B0502040204020203" pitchFamily="34" charset="0"/>
+                        </a:rPr>
+                        <a:t>(</a:t>
+                      </a:r>
+                      <a:r>
+                        <a:rPr lang="en-US" sz="2000" dirty="0"/>
+                        <a:t>on a worksheet</a:t>
+                      </a:r>
+                      <a:r>
+                        <a:rPr lang="en-US" sz="2000" dirty="0">
+                          <a:latin typeface="Segoe UI Symbol" panose="020B0502040204020203" pitchFamily="34" charset="0"/>
+                          <a:ea typeface="Segoe UI Symbol" panose="020B0502040204020203" pitchFamily="34" charset="0"/>
+                        </a:rPr>
+                        <a:t>)</a:t>
+                      </a:r>
+                      <a:r>
+                        <a:rPr lang="en-US" sz="2000" dirty="0"/>
+                        <a:t> or the top of the chart area </a:t>
+                      </a:r>
+                      <a:r>
+                        <a:rPr lang="en-US" sz="2000" dirty="0">
+                          <a:latin typeface="Segoe UI Symbol" panose="020B0502040204020203" pitchFamily="34" charset="0"/>
+                          <a:ea typeface="Segoe UI Symbol" panose="020B0502040204020203" pitchFamily="34" charset="0"/>
+                        </a:rPr>
+                        <a:t>(</a:t>
+                      </a:r>
+                      <a:r>
+                        <a:rPr lang="en-US" sz="2000" dirty="0"/>
+                        <a:t>on a chart</a:t>
+                      </a:r>
+                      <a:r>
+                        <a:rPr lang="en-US" sz="2000" dirty="0">
+                          <a:latin typeface="Segoe UI Symbol" panose="020B0502040204020203" pitchFamily="34" charset="0"/>
+                          <a:ea typeface="Segoe UI Symbol" panose="020B0502040204020203" pitchFamily="34" charset="0"/>
+                        </a:rPr>
+                        <a:t>)</a:t>
                       </a:r>
                     </a:p>
                   </a:txBody>
@@ -22568,7 +22740,10 @@
                     <a:lstStyle/>
                     <a:p>
                       <a:r>
-                        <a:rPr lang="en-US" sz="2000" dirty="0"/>
+                        <a:rPr lang="en-US" sz="2000" dirty="0">
+                          <a:latin typeface="Courier New" panose="02070309020205020404" pitchFamily="49" charset="0"/>
+                          <a:cs typeface="Courier New" panose="02070309020205020404" pitchFamily="49" charset="0"/>
+                        </a:rPr>
                         <a:t>width</a:t>
                       </a:r>
                     </a:p>
@@ -22675,7 +22850,7 @@
             <p:ph type="tbl" sz="quarter" idx="10"/>
             <p:extLst>
               <p:ext uri="{D42A27DB-BD31-4B8C-83A1-F6EECF244321}">
-                <p14:modId xmlns:p14="http://schemas.microsoft.com/office/powerpoint/2010/main" val="1505741109"/>
+                <p14:modId xmlns:p14="http://schemas.microsoft.com/office/powerpoint/2010/main" val="2584630987"/>
               </p:ext>
             </p:extLst>
           </p:nvPr>
@@ -22691,21 +22866,21 @@
                 <a:tableStyleId>{5C22544A-7EE6-4342-B048-85BDC9FD1C3A}</a:tableStyleId>
               </a:tblPr>
               <a:tblGrid>
-                <a:gridCol w="1653594">
+                <a:gridCol w="1936092">
                   <a:extLst>
                     <a:ext uri="{9D8B030D-6E8A-4147-A177-3AD203B41FA5}">
                       <a16:colId xmlns:a16="http://schemas.microsoft.com/office/drawing/2014/main" val="3673307344"/>
                     </a:ext>
                   </a:extLst>
                 </a:gridCol>
-                <a:gridCol w="2497873">
+                <a:gridCol w="2683727">
                   <a:extLst>
                     <a:ext uri="{9D8B030D-6E8A-4147-A177-3AD203B41FA5}">
                       <a16:colId xmlns:a16="http://schemas.microsoft.com/office/drawing/2014/main" val="1672436492"/>
                     </a:ext>
                   </a:extLst>
                 </a:gridCol>
-                <a:gridCol w="7381721">
+                <a:gridCol w="6913369">
                   <a:extLst>
                     <a:ext uri="{9D8B030D-6E8A-4147-A177-3AD203B41FA5}">
                       <a16:colId xmlns:a16="http://schemas.microsoft.com/office/drawing/2014/main" val="123279570"/>
@@ -22787,6 +22962,8 @@
                       <a:r>
                         <a:rPr lang="en-US" sz="2000" dirty="0">
                           <a:effectLst/>
+                          <a:latin typeface="Courier New" panose="02070309020205020404" pitchFamily="49" charset="0"/>
+                          <a:cs typeface="Courier New" panose="02070309020205020404" pitchFamily="49" charset="0"/>
                         </a:rPr>
                         <a:t>axes</a:t>
                       </a:r>
@@ -22847,11 +23024,18 @@
                     <a:p>
                       <a:pPr algn="l"/>
                       <a:r>
-                        <a:rPr lang="en-US" sz="2000">
+                        <a:rPr lang="en-US" sz="2000" dirty="0" err="1">
                           <a:effectLst/>
+                          <a:latin typeface="Courier New" panose="02070309020205020404" pitchFamily="49" charset="0"/>
+                          <a:cs typeface="Courier New" panose="02070309020205020404" pitchFamily="49" charset="0"/>
                         </a:rPr>
                         <a:t>dataLabels</a:t>
                       </a:r>
+                      <a:endParaRPr lang="en-US" sz="2000" dirty="0">
+                        <a:effectLst/>
+                        <a:latin typeface="Courier New" panose="02070309020205020404" pitchFamily="49" charset="0"/>
+                        <a:cs typeface="Courier New" panose="02070309020205020404" pitchFamily="49" charset="0"/>
+                      </a:endParaRPr>
                     </a:p>
                   </a:txBody>
                   <a:tcPr marL="123825" marR="123825" marT="57150" marB="57150"/>
@@ -22909,8 +23093,10 @@
                     <a:p>
                       <a:pPr algn="l"/>
                       <a:r>
-                        <a:rPr lang="en-US" sz="2000">
+                        <a:rPr lang="en-US" sz="2000" dirty="0">
                           <a:effectLst/>
+                          <a:latin typeface="Courier New" panose="02070309020205020404" pitchFamily="49" charset="0"/>
+                          <a:cs typeface="Courier New" panose="02070309020205020404" pitchFamily="49" charset="0"/>
                         </a:rPr>
                         <a:t>format</a:t>
                       </a:r>
@@ -22971,8 +23157,10 @@
                     <a:p>
                       <a:pPr algn="l"/>
                       <a:r>
-                        <a:rPr lang="en-US" sz="2000">
+                        <a:rPr lang="en-US" sz="2000" dirty="0">
                           <a:effectLst/>
+                          <a:latin typeface="Courier New" panose="02070309020205020404" pitchFamily="49" charset="0"/>
+                          <a:cs typeface="Courier New" panose="02070309020205020404" pitchFamily="49" charset="0"/>
                         </a:rPr>
                         <a:t>legend</a:t>
                       </a:r>
@@ -23035,6 +23223,8 @@
                       <a:r>
                         <a:rPr lang="en-US" sz="2000" dirty="0">
                           <a:effectLst/>
+                          <a:latin typeface="Courier New" panose="02070309020205020404" pitchFamily="49" charset="0"/>
+                          <a:cs typeface="Courier New" panose="02070309020205020404" pitchFamily="49" charset="0"/>
                         </a:rPr>
                         <a:t>series</a:t>
                       </a:r>
@@ -23095,8 +23285,10 @@
                     <a:p>
                       <a:pPr algn="l"/>
                       <a:r>
-                        <a:rPr lang="en-US" sz="2000">
+                        <a:rPr lang="en-US" sz="2000" dirty="0">
                           <a:effectLst/>
+                          <a:latin typeface="Courier New" panose="02070309020205020404" pitchFamily="49" charset="0"/>
+                          <a:cs typeface="Courier New" panose="02070309020205020404" pitchFamily="49" charset="0"/>
                         </a:rPr>
                         <a:t>title</a:t>
                       </a:r>
@@ -23159,6 +23351,8 @@
                       <a:r>
                         <a:rPr lang="en-US" sz="2000" dirty="0">
                           <a:effectLst/>
+                          <a:latin typeface="Courier New" panose="02070309020205020404" pitchFamily="49" charset="0"/>
+                          <a:cs typeface="Courier New" panose="02070309020205020404" pitchFamily="49" charset="0"/>
                         </a:rPr>
                         <a:t>worksheet</a:t>
                       </a:r>
@@ -25829,7 +26023,7 @@
                   <a:srgbClr val="D83B01"/>
                 </a:solidFill>
               </a:rPr>
-              <a:t>Anatomy of Excel Add-in</a:t>
+              <a:t>Anatomy of Excel add-in</a:t>
             </a:r>
           </a:p>
           <a:p>
@@ -31618,7 +31812,7 @@
         <p159:morph option="byObject"/>
       </p:transition>
     </mc:Choice>
-    <mc:Fallback xmlns="" xmlns:a14="http://schemas.microsoft.com/office/drawing/2010/main" xmlns:p14="http://schemas.microsoft.com/office/powerpoint/2010/main">
+    <mc:Fallback xmlns:p14="http://schemas.microsoft.com/office/powerpoint/2010/main" xmlns:a14="http://schemas.microsoft.com/office/drawing/2010/main" xmlns="">
       <p:transition spd="slow">
         <p:fade/>
       </p:transition>
@@ -35598,7 +35792,7 @@
         <p:spPr>
           <a:xfrm>
             <a:off x="465139" y="1500487"/>
-            <a:ext cx="7291318" cy="3828740"/>
+            <a:ext cx="7291318" cy="4271939"/>
           </a:xfrm>
           <a:prstGeom prst="rect">
             <a:avLst/>
@@ -35874,6 +36068,8 @@
                 <a:solidFill>
                   <a:srgbClr val="2F2F2F"/>
                 </a:solidFill>
+                <a:latin typeface="Courier New" panose="02070309020205020404" pitchFamily="49" charset="0"/>
+                <a:cs typeface="Courier New" panose="02070309020205020404" pitchFamily="49" charset="0"/>
               </a:rPr>
               <a:t>Excel.run</a:t>
             </a:r>
@@ -35890,6 +36086,8 @@
                 <a:solidFill>
                   <a:srgbClr val="2F2F2F"/>
                 </a:solidFill>
+                <a:latin typeface="Courier New" panose="02070309020205020404" pitchFamily="49" charset="0"/>
+                <a:cs typeface="Courier New" panose="02070309020205020404" pitchFamily="49" charset="0"/>
               </a:rPr>
               <a:t>context.workbook</a:t>
             </a:r>
@@ -36039,25 +36237,27 @@
                 <a:solidFill>
                   <a:srgbClr val="2F2F2F"/>
                 </a:solidFill>
+                <a:latin typeface="Courier New" panose="02070309020205020404" pitchFamily="49" charset="0"/>
+                <a:cs typeface="Courier New" panose="02070309020205020404" pitchFamily="49" charset="0"/>
+              </a:rPr>
+              <a:t>getNext</a:t>
+            </a:r>
+            <a:r>
+              <a:rPr lang="en-US" sz="1600" dirty="0">
+                <a:solidFill>
+                  <a:srgbClr val="2F2F2F"/>
+                </a:solidFill>
                 <a:latin typeface="Segoe UI Semibold"/>
               </a:rPr>
-              <a:t>getNext</a:t>
-            </a:r>
-            <a:r>
-              <a:rPr lang="en-US" sz="1600" dirty="0">
+              <a:t> and </a:t>
+            </a:r>
+            <a:r>
+              <a:rPr lang="en-US" sz="1600" dirty="0" err="1">
                 <a:solidFill>
                   <a:srgbClr val="2F2F2F"/>
                 </a:solidFill>
-                <a:latin typeface="Segoe UI Semibold"/>
-              </a:rPr>
-              <a:t> and </a:t>
-            </a:r>
-            <a:r>
-              <a:rPr lang="en-US" sz="1600" dirty="0" err="1">
-                <a:solidFill>
-                  <a:srgbClr val="2F2F2F"/>
-                </a:solidFill>
-                <a:latin typeface="Segoe UI Semibold"/>
+                <a:latin typeface="Courier New" panose="02070309020205020404" pitchFamily="49" charset="0"/>
+                <a:cs typeface="Courier New" panose="02070309020205020404" pitchFamily="49" charset="0"/>
               </a:rPr>
               <a:t>getPrevious</a:t>
             </a:r>
@@ -36094,36 +36294,58 @@
                 <a:solidFill>
                   <a:srgbClr val="2F2F2F"/>
                 </a:solidFill>
+                <a:latin typeface="Courier New" panose="02070309020205020404" pitchFamily="49" charset="0"/>
+                <a:cs typeface="Courier New" panose="02070309020205020404" pitchFamily="49" charset="0"/>
+              </a:rPr>
+              <a:t>workbook.worksheets.getActiveWorksheet</a:t>
+            </a:r>
+            <a:r>
+              <a:rPr lang="en-US" sz="1600" dirty="0">
+                <a:solidFill>
+                  <a:srgbClr val="2F2F2F"/>
+                </a:solidFill>
+                <a:latin typeface="Courier New" panose="02070309020205020404" pitchFamily="49" charset="0"/>
+                <a:cs typeface="Courier New" panose="02070309020205020404" pitchFamily="49" charset="0"/>
+              </a:rPr>
+              <a:t>()</a:t>
+            </a:r>
+            <a:r>
+              <a:rPr lang="en-US" sz="1600" dirty="0">
+                <a:solidFill>
+                  <a:srgbClr val="2F2F2F"/>
+                </a:solidFill>
                 <a:latin typeface="Segoe UI Semibold"/>
               </a:rPr>
-              <a:t>workbook.worksheets.getActiveWorkshee</a:t>
+              <a:t> and set the active worksheet using </a:t>
+            </a:r>
+            <a:r>
+              <a:rPr lang="en-US" sz="1600" dirty="0" err="1">
+                <a:solidFill>
+                  <a:srgbClr val="2F2F2F"/>
+                </a:solidFill>
+                <a:latin typeface="Courier New" panose="02070309020205020404" pitchFamily="49" charset="0"/>
+                <a:cs typeface="Courier New" panose="02070309020205020404" pitchFamily="49" charset="0"/>
+              </a:rPr>
+              <a:t>worksheet.activate</a:t>
             </a:r>
             <a:r>
               <a:rPr lang="en-US" sz="1600" dirty="0">
                 <a:solidFill>
                   <a:srgbClr val="2F2F2F"/>
                 </a:solidFill>
+                <a:latin typeface="Courier New" panose="02070309020205020404" pitchFamily="49" charset="0"/>
+                <a:cs typeface="Courier New" panose="02070309020205020404" pitchFamily="49" charset="0"/>
+              </a:rPr>
+              <a:t>()</a:t>
+            </a:r>
+            <a:r>
+              <a:rPr lang="en-US" sz="1600" dirty="0">
+                <a:solidFill>
+                  <a:srgbClr val="2F2F2F"/>
+                </a:solidFill>
                 <a:latin typeface="Segoe UI Semibold"/>
               </a:rPr>
-              <a:t>() and set the active worksheet using </a:t>
-            </a:r>
-            <a:r>
-              <a:rPr lang="en-US" sz="1600" dirty="0" err="1">
-                <a:solidFill>
-                  <a:srgbClr val="2F2F2F"/>
-                </a:solidFill>
-                <a:latin typeface="Segoe UI Semibold"/>
-              </a:rPr>
-              <a:t>worksheet.activate</a:t>
-            </a:r>
-            <a:r>
-              <a:rPr lang="en-US" sz="1600" dirty="0">
-                <a:solidFill>
-                  <a:srgbClr val="2F2F2F"/>
-                </a:solidFill>
-                <a:latin typeface="Segoe UI Semibold"/>
-              </a:rPr>
-              <a:t>().</a:t>
+              <a:t>.</a:t>
             </a:r>
           </a:p>
           <a:p>
@@ -36158,9 +36380,29 @@
                 <a:solidFill>
                   <a:srgbClr val="2F2F2F"/>
                 </a:solidFill>
+                <a:latin typeface="Courier New" panose="02070309020205020404" pitchFamily="49" charset="0"/>
+                <a:cs typeface="Courier New" panose="02070309020205020404" pitchFamily="49" charset="0"/>
+              </a:rPr>
+              <a:t>onActivated</a:t>
+            </a:r>
+            <a:r>
+              <a:rPr lang="en-US" sz="1600" dirty="0">
+                <a:solidFill>
+                  <a:srgbClr val="2F2F2F"/>
+                </a:solidFill>
                 <a:latin typeface="Segoe UI Semibold"/>
               </a:rPr>
-              <a:t>onActivated</a:t>
+              <a:t>, </a:t>
+            </a:r>
+            <a:r>
+              <a:rPr lang="en-US" sz="1600" dirty="0" err="1">
+                <a:solidFill>
+                  <a:srgbClr val="2F2F2F"/>
+                </a:solidFill>
+                <a:latin typeface="Courier New" panose="02070309020205020404" pitchFamily="49" charset="0"/>
+                <a:cs typeface="Courier New" panose="02070309020205020404" pitchFamily="49" charset="0"/>
+              </a:rPr>
+              <a:t>onDeactivated</a:t>
             </a:r>
             <a:r>
               <a:rPr lang="en-US" sz="1600" dirty="0">
@@ -36176,25 +36418,8 @@
                 <a:solidFill>
                   <a:srgbClr val="2F2F2F"/>
                 </a:solidFill>
-                <a:latin typeface="Segoe UI Semibold"/>
-              </a:rPr>
-              <a:t>onDeactivated</a:t>
-            </a:r>
-            <a:r>
-              <a:rPr lang="en-US" sz="1600" dirty="0">
-                <a:solidFill>
-                  <a:srgbClr val="2F2F2F"/>
-                </a:solidFill>
-                <a:latin typeface="Segoe UI Semibold"/>
-              </a:rPr>
-              <a:t>, </a:t>
-            </a:r>
-            <a:r>
-              <a:rPr lang="en-US" sz="1600" dirty="0" err="1">
-                <a:solidFill>
-                  <a:srgbClr val="2F2F2F"/>
-                </a:solidFill>
-                <a:latin typeface="Segoe UI Semibold"/>
+                <a:latin typeface="Courier New" panose="02070309020205020404" pitchFamily="49" charset="0"/>
+                <a:cs typeface="Courier New" panose="02070309020205020404" pitchFamily="49" charset="0"/>
               </a:rPr>
               <a:t>onSelectionChanged</a:t>
             </a:r>
@@ -37168,7 +37393,7 @@
         <p:spPr>
           <a:xfrm>
             <a:off x="465139" y="1500487"/>
-            <a:ext cx="5905181" cy="5299912"/>
+            <a:ext cx="5905181" cy="5521512"/>
           </a:xfrm>
           <a:prstGeom prst="rect">
             <a:avLst/>
@@ -37464,15 +37689,17 @@
                   <a:srgbClr val="2F2F2F"/>
                 </a:solidFill>
               </a:rPr>
-              <a:t> using a worksheet and address (ex: “A1:D4” represents a range from </a:t>
-            </a:r>
-            <a:r>
-              <a:rPr lang="en-US" sz="1600" dirty="0" err="1">
+              <a:t> using a worksheet and address </a:t>
+            </a:r>
+            <a:r>
+              <a:rPr lang="en-US" sz="1600" dirty="0">
                 <a:solidFill>
                   <a:srgbClr val="2F2F2F"/>
                 </a:solidFill>
-              </a:rPr>
-              <a:t>topLeft</a:t>
+                <a:latin typeface="Segoe UI Symbol" panose="020B0502040204020203" pitchFamily="34" charset="0"/>
+                <a:ea typeface="Segoe UI Symbol" panose="020B0502040204020203" pitchFamily="34" charset="0"/>
+              </a:rPr>
+              <a:t>(</a:t>
             </a:r>
             <a:r>
               <a:rPr lang="en-US" sz="1600" dirty="0">
@@ -37480,23 +37707,17 @@
                   <a:srgbClr val="2F2F2F"/>
                 </a:solidFill>
               </a:rPr>
-              <a:t> to </a:t>
-            </a:r>
-            <a:r>
-              <a:rPr lang="en-US" sz="1600" dirty="0" err="1">
+              <a:t>ex: “A1:D4” represents a range from top-left to bottom-right cells</a:t>
+            </a:r>
+            <a:r>
+              <a:rPr lang="en-US" sz="1600" dirty="0">
                 <a:solidFill>
                   <a:srgbClr val="2F2F2F"/>
                 </a:solidFill>
-              </a:rPr>
-              <a:t>bottomRight</a:t>
-            </a:r>
-            <a:r>
-              <a:rPr lang="en-US" sz="1600" dirty="0">
-                <a:solidFill>
-                  <a:srgbClr val="2F2F2F"/>
-                </a:solidFill>
-              </a:rPr>
-              <a:t> cells)</a:t>
+                <a:latin typeface="Segoe UI Symbol" panose="020B0502040204020203" pitchFamily="34" charset="0"/>
+                <a:ea typeface="Segoe UI Symbol" panose="020B0502040204020203" pitchFamily="34" charset="0"/>
+              </a:rPr>
+              <a:t>)</a:t>
             </a:r>
           </a:p>
           <a:p>
@@ -37575,7 +37796,8 @@
                 <a:solidFill>
                   <a:srgbClr val="2F2F2F"/>
                 </a:solidFill>
-                <a:latin typeface="Segoe UI Semibold"/>
+                <a:latin typeface="Courier New" panose="02070309020205020404" pitchFamily="49" charset="0"/>
+                <a:cs typeface="Courier New" panose="02070309020205020404" pitchFamily="49" charset="0"/>
               </a:rPr>
               <a:t>tables.add</a:t>
             </a:r>
@@ -37605,7 +37827,7 @@
                 </a:solidFill>
                 <a:latin typeface="Segoe UI Semibold"/>
               </a:rPr>
-              <a:t>Existing tables can be retrieved by name/id or iterated through.</a:t>
+              <a:t>Existing tables can be retrieved by name/ID or iterated through.</a:t>
             </a:r>
           </a:p>
           <a:p>
@@ -37704,18 +37926,29 @@
                 <a:solidFill>
                   <a:srgbClr val="2F2F2F"/>
                 </a:solidFill>
+                <a:latin typeface="Courier New" panose="02070309020205020404" pitchFamily="49" charset="0"/>
+                <a:cs typeface="Courier New" panose="02070309020205020404" pitchFamily="49" charset="0"/>
+              </a:rPr>
+              <a:t>getHeaderRowRange</a:t>
+            </a:r>
+            <a:r>
+              <a:rPr lang="en-US" sz="1600" dirty="0">
+                <a:solidFill>
+                  <a:srgbClr val="2F2F2F"/>
+                </a:solidFill>
+                <a:latin typeface="Courier New" panose="02070309020205020404" pitchFamily="49" charset="0"/>
+                <a:cs typeface="Courier New" panose="02070309020205020404" pitchFamily="49" charset="0"/>
+              </a:rPr>
+              <a:t>().values</a:t>
+            </a:r>
+            <a:r>
+              <a:rPr lang="en-US" sz="1600" dirty="0">
+                <a:solidFill>
+                  <a:srgbClr val="2F2F2F"/>
+                </a:solidFill>
                 <a:latin typeface="Segoe UI Semibold"/>
               </a:rPr>
-              <a:t>getHeaderRowRange</a:t>
-            </a:r>
-            <a:r>
-              <a:rPr lang="en-US" sz="1600" dirty="0">
-                <a:solidFill>
-                  <a:srgbClr val="2F2F2F"/>
-                </a:solidFill>
-                <a:latin typeface="Segoe UI Semibold"/>
-              </a:rPr>
-              <a:t>().values property with a 2D array.</a:t>
+              <a:t> property with a 2D array.</a:t>
             </a:r>
           </a:p>
         </p:txBody>
@@ -38971,7 +39204,25 @@
           <a:p>
             <a:r>
               <a:rPr lang="en-US" dirty="0"/>
-              <a:t>Tables and headers (cont.)</a:t>
+              <a:t>Tables and headers </a:t>
+            </a:r>
+            <a:r>
+              <a:rPr lang="en-US" dirty="0">
+                <a:latin typeface="Segoe UI Symbol" panose="020B0502040204020203" pitchFamily="34" charset="0"/>
+                <a:ea typeface="Segoe UI Symbol" panose="020B0502040204020203" pitchFamily="34" charset="0"/>
+              </a:rPr>
+              <a:t>(</a:t>
+            </a:r>
+            <a:r>
+              <a:rPr lang="en-US" dirty="0"/>
+              <a:t>cont.</a:t>
+            </a:r>
+            <a:r>
+              <a:rPr lang="en-US" dirty="0">
+                <a:latin typeface="Segoe UI Symbol" panose="020B0502040204020203" pitchFamily="34" charset="0"/>
+                <a:ea typeface="Segoe UI Symbol" panose="020B0502040204020203" pitchFamily="34" charset="0"/>
+              </a:rPr>
+              <a:t>)</a:t>
             </a:r>
           </a:p>
         </p:txBody>
@@ -40216,7 +40467,7 @@
         <p:spPr>
           <a:xfrm>
             <a:off x="465139" y="1500487"/>
-            <a:ext cx="5905181" cy="3530197"/>
+            <a:ext cx="5905181" cy="3751796"/>
           </a:xfrm>
           <a:prstGeom prst="rect">
             <a:avLst/>
@@ -40518,8 +40769,20 @@
                 <a:solidFill>
                   <a:srgbClr val="2F2F2F"/>
                 </a:solidFill>
+                <a:latin typeface="Courier New" panose="02070309020205020404" pitchFamily="49" charset="0"/>
+                <a:cs typeface="Courier New" panose="02070309020205020404" pitchFamily="49" charset="0"/>
               </a:rPr>
               <a:t>applyValuesFilter</a:t>
+            </a:r>
+            <a:r>
+              <a:rPr lang="en-US" sz="1600" dirty="0">
+                <a:solidFill>
+                  <a:srgbClr val="2F2F2F"/>
+                </a:solidFill>
+                <a:latin typeface="Courier New" panose="02070309020205020404" pitchFamily="49" charset="0"/>
+                <a:cs typeface="Courier New" panose="02070309020205020404" pitchFamily="49" charset="0"/>
+              </a:rPr>
+              <a:t>()</a:t>
             </a:r>
             <a:r>
               <a:rPr lang="en-US" sz="1600" dirty="0">
@@ -40552,6 +40815,8 @@
                 <a:solidFill>
                   <a:srgbClr val="2F2F2F"/>
                 </a:solidFill>
+                <a:latin typeface="Courier New" panose="02070309020205020404" pitchFamily="49" charset="0"/>
+                <a:cs typeface="Courier New" panose="02070309020205020404" pitchFamily="49" charset="0"/>
               </a:rPr>
               <a:t>reapplyFilters</a:t>
             </a:r>
@@ -40560,6 +40825,16 @@
                 <a:solidFill>
                   <a:srgbClr val="2F2F2F"/>
                 </a:solidFill>
+                <a:latin typeface="Courier New" panose="02070309020205020404" pitchFamily="49" charset="0"/>
+                <a:cs typeface="Courier New" panose="02070309020205020404" pitchFamily="49" charset="0"/>
+              </a:rPr>
+              <a:t>()</a:t>
+            </a:r>
+            <a:r>
+              <a:rPr lang="en-US" sz="1600" dirty="0">
+                <a:solidFill>
+                  <a:srgbClr val="2F2F2F"/>
+                </a:solidFill>
               </a:rPr>
               <a:t> and </a:t>
             </a:r>
@@ -40568,8 +40843,20 @@
                 <a:solidFill>
                   <a:srgbClr val="2F2F2F"/>
                 </a:solidFill>
+                <a:latin typeface="Courier New" panose="02070309020205020404" pitchFamily="49" charset="0"/>
+                <a:cs typeface="Courier New" panose="02070309020205020404" pitchFamily="49" charset="0"/>
               </a:rPr>
               <a:t>clearFilters</a:t>
+            </a:r>
+            <a:r>
+              <a:rPr lang="en-US" sz="1600" dirty="0">
+                <a:solidFill>
+                  <a:srgbClr val="2F2F2F"/>
+                </a:solidFill>
+                <a:latin typeface="Courier New" panose="02070309020205020404" pitchFamily="49" charset="0"/>
+                <a:cs typeface="Courier New" panose="02070309020205020404" pitchFamily="49" charset="0"/>
+              </a:rPr>
+              <a:t>()</a:t>
             </a:r>
             <a:r>
               <a:rPr lang="en-US" sz="1600" dirty="0">
@@ -40637,6 +40924,8 @@
                 <a:solidFill>
                   <a:srgbClr val="2F2F2F"/>
                 </a:solidFill>
+                <a:latin typeface="Courier New" panose="02070309020205020404" pitchFamily="49" charset="0"/>
+                <a:cs typeface="Courier New" panose="02070309020205020404" pitchFamily="49" charset="0"/>
               </a:rPr>
               <a:t>SortFields</a:t>
             </a:r>
@@ -40653,6 +40942,8 @@
                 <a:solidFill>
                   <a:srgbClr val="2F2F2F"/>
                 </a:solidFill>
+                <a:latin typeface="Courier New" panose="02070309020205020404" pitchFamily="49" charset="0"/>
+                <a:cs typeface="Courier New" panose="02070309020205020404" pitchFamily="49" charset="0"/>
               </a:rPr>
               <a:t>table.sort.apply</a:t>
             </a:r>
@@ -40661,8 +40952,18 @@
                 <a:solidFill>
                   <a:srgbClr val="2F2F2F"/>
                 </a:solidFill>
-              </a:rPr>
-              <a:t>() function.</a:t>
+                <a:latin typeface="Courier New" panose="02070309020205020404" pitchFamily="49" charset="0"/>
+                <a:cs typeface="Courier New" panose="02070309020205020404" pitchFamily="49" charset="0"/>
+              </a:rPr>
+              <a:t>()</a:t>
+            </a:r>
+            <a:r>
+              <a:rPr lang="en-US" sz="1600" dirty="0">
+                <a:solidFill>
+                  <a:srgbClr val="2F2F2F"/>
+                </a:solidFill>
+              </a:rPr>
+              <a:t> function.</a:t>
             </a:r>
           </a:p>
           <a:p>
@@ -40687,6 +40988,8 @@
                 <a:solidFill>
                   <a:srgbClr val="2F2F2F"/>
                 </a:solidFill>
+                <a:latin typeface="Courier New" panose="02070309020205020404" pitchFamily="49" charset="0"/>
+                <a:cs typeface="Courier New" panose="02070309020205020404" pitchFamily="49" charset="0"/>
               </a:rPr>
               <a:t>table.sort.reapply</a:t>
             </a:r>
@@ -40695,14 +40998,26 @@
                 <a:solidFill>
                   <a:srgbClr val="2F2F2F"/>
                 </a:solidFill>
-              </a:rPr>
-              <a:t>() and </a:t>
+                <a:latin typeface="Courier New" panose="02070309020205020404" pitchFamily="49" charset="0"/>
+                <a:cs typeface="Courier New" panose="02070309020205020404" pitchFamily="49" charset="0"/>
+              </a:rPr>
+              <a:t>()</a:t>
+            </a:r>
+            <a:r>
+              <a:rPr lang="en-US" sz="1600" dirty="0">
+                <a:solidFill>
+                  <a:srgbClr val="2F2F2F"/>
+                </a:solidFill>
+              </a:rPr>
+              <a:t> and </a:t>
             </a:r>
             <a:r>
               <a:rPr lang="en-US" sz="1600" dirty="0" err="1">
                 <a:solidFill>
                   <a:srgbClr val="2F2F2F"/>
                 </a:solidFill>
+                <a:latin typeface="Courier New" panose="02070309020205020404" pitchFamily="49" charset="0"/>
+                <a:cs typeface="Courier New" panose="02070309020205020404" pitchFamily="49" charset="0"/>
               </a:rPr>
               <a:t>table.sort.clear</a:t>
             </a:r>
@@ -40711,8 +41026,18 @@
                 <a:solidFill>
                   <a:srgbClr val="2F2F2F"/>
                 </a:solidFill>
-              </a:rPr>
-              <a:t>() respectively.</a:t>
+                <a:latin typeface="Courier New" panose="02070309020205020404" pitchFamily="49" charset="0"/>
+                <a:cs typeface="Courier New" panose="02070309020205020404" pitchFamily="49" charset="0"/>
+              </a:rPr>
+              <a:t>()</a:t>
+            </a:r>
+            <a:r>
+              <a:rPr lang="en-US" sz="1600" dirty="0">
+                <a:solidFill>
+                  <a:srgbClr val="2F2F2F"/>
+                </a:solidFill>
+              </a:rPr>
+              <a:t> respectively.</a:t>
             </a:r>
           </a:p>
         </p:txBody>

</xml_diff>